<commit_message>
added social engineering slide
</commit_message>
<xml_diff>
--- a/Y10/Attacks/AttacksPresentation.pptx
+++ b/Y10/Attacks/AttacksPresentation.pptx
@@ -10107,8 +10107,8 @@
         </p:nvSpPr>
         <p:spPr>
           <a:xfrm>
-            <a:off x="1219200" y="4797097"/>
-            <a:ext cx="8356600" cy="7699703"/>
+            <a:off x="1219200" y="3325495"/>
+            <a:ext cx="8356600" cy="3176905"/>
           </a:xfrm>
           <a:prstGeom prst="rect">
             <a:avLst/>
@@ -10119,83 +10119,18 @@
           <a:lstStyle/>
           <a:p>
             <a:r>
-              <a:rPr b="0" dirty="0"/>
-              <a:t>In reality we don’t write programs in it very often*</a:t>
+              <a:rPr lang="en-GB" b="0" dirty="0"/>
+              <a:t>“Humans are the weakest point in a system”</a:t>
             </a:r>
           </a:p>
           <a:p>
             <a:r>
-              <a:rPr b="0" dirty="0"/>
-              <a:t>But we need to know it:</a:t>
+              <a:rPr lang="en-GB" b="0" dirty="0"/>
+              <a:t>Gaining information to networks by influencing people.</a:t>
             </a:r>
           </a:p>
           <a:p>
-            <a:pPr lvl="1"/>
-            <a:r>
-              <a:rPr b="0" dirty="0"/>
-              <a:t>Finding Bugs</a:t>
-            </a:r>
-          </a:p>
-          <a:p>
-            <a:pPr lvl="1"/>
-            <a:r>
-              <a:rPr b="0" dirty="0"/>
-              <a:t>Incredible Performance</a:t>
-            </a:r>
-          </a:p>
-          <a:p>
-            <a:pPr lvl="1"/>
-            <a:r>
-              <a:rPr b="0" dirty="0"/>
-              <a:t>System Software</a:t>
-            </a:r>
-          </a:p>
-          <a:p>
-            <a:pPr lvl="1"/>
-            <a:r>
-              <a:rPr b="0" dirty="0"/>
-              <a:t>Malware</a:t>
-            </a:r>
-          </a:p>
-        </p:txBody>
-      </p:sp>
-      <p:sp>
-        <p:nvSpPr>
-          <p:cNvPr id="154" name="*It’s in your exam"/>
-          <p:cNvSpPr txBox="1">
-            <a:spLocks noGrp="1"/>
-          </p:cNvSpPr>
-          <p:nvPr>
-            <p:ph type="title"/>
-          </p:nvPr>
-        </p:nvSpPr>
-        <p:spPr>
-          <a:xfrm>
-            <a:off x="11389659" y="3681094"/>
-            <a:ext cx="12317506" cy="3176905"/>
-          </a:xfrm>
-          <a:prstGeom prst="rect">
-            <a:avLst/>
-          </a:prstGeom>
-        </p:spPr>
-        <p:txBody>
-          <a:bodyPr>
-            <a:normAutofit fontScale="90000"/>
-          </a:bodyPr>
-          <a:lstStyle>
-            <a:lvl1pPr algn="ctr" defTabSz="379729">
-              <a:defRPr sz="14300" spc="-143">
-                <a:solidFill>
-                  <a:srgbClr val="FFD74C"/>
-                </a:solidFill>
-              </a:defRPr>
-            </a:lvl1pPr>
-          </a:lstStyle>
-          <a:p>
-            <a:r>
-              <a:rPr b="1" dirty="0"/>
-              <a:t>*It’s in your exam</a:t>
-            </a:r>
+            <a:endParaRPr b="0" dirty="0"/>
           </a:p>
         </p:txBody>
       </p:sp>
@@ -10211,8 +10146,8 @@
         </p:nvSpPr>
         <p:spPr>
           <a:xfrm>
-            <a:off x="1219200" y="1574800"/>
-            <a:ext cx="8356600" cy="2816938"/>
+            <a:off x="1219200" y="1219200"/>
+            <a:ext cx="8356600" cy="2106294"/>
           </a:xfrm>
           <a:prstGeom prst="rect">
             <a:avLst/>
@@ -10225,7 +10160,7 @@
         </p:spPr>
         <p:txBody>
           <a:bodyPr>
-            <a:normAutofit/>
+            <a:normAutofit fontScale="92500"/>
           </a:bodyPr>
           <a:lstStyle/>
           <a:p>
@@ -10233,40 +10168,641 @@
               <a:defRPr sz="3775"/>
             </a:pPr>
             <a:r>
-              <a:rPr b="1" dirty="0"/>
-              <a:t>Why are we even learning this?</a:t>
+              <a:rPr lang="en-GB" sz="6600" b="1" dirty="0"/>
+              <a:t>Social engineering</a:t>
             </a:r>
-          </a:p>
-          <a:p>
-            <a:pPr defTabSz="344677">
-              <a:defRPr sz="3775"/>
-            </a:pPr>
-            <a:r>
-              <a:rPr b="1" dirty="0"/>
-              <a:t>Why can’t we just use python? </a:t>
-            </a:r>
-          </a:p>
-          <a:p>
-            <a:pPr defTabSz="344677">
-              <a:defRPr sz="2655"/>
-            </a:pPr>
-            <a:r>
-              <a:rPr b="1" dirty="0"/>
-              <a:t>(Or whatever your favorite language is)</a:t>
-            </a:r>
+            <a:endParaRPr sz="6600" b="1" dirty="0"/>
           </a:p>
         </p:txBody>
       </p:sp>
       <p:sp>
         <p:nvSpPr>
-          <p:cNvPr id="156" name="And it will come up"/>
-          <p:cNvSpPr txBox="1"/>
+          <p:cNvPr id="2" name="Why are we even learning this?…">
+            <a:extLst>
+              <a:ext uri="{FF2B5EF4-FFF2-40B4-BE49-F238E27FC236}">
+                <a16:creationId xmlns:a16="http://schemas.microsoft.com/office/drawing/2014/main" id="{C72AEC73-80A6-2B5F-F694-E6E500EF16A1}"/>
+              </a:ext>
+            </a:extLst>
+          </p:cNvPr>
+          <p:cNvSpPr txBox="1">
+            <a:spLocks/>
+          </p:cNvSpPr>
           <p:nvPr/>
         </p:nvSpPr>
         <p:spPr>
           <a:xfrm>
-            <a:off x="13370112" y="7497617"/>
-            <a:ext cx="8356600" cy="3176905"/>
+            <a:off x="1489587" y="6160454"/>
+            <a:ext cx="8356600" cy="2106294"/>
+          </a:xfrm>
+          <a:prstGeom prst="rect">
+            <a:avLst/>
+          </a:prstGeom>
+          <a:ln w="12700">
+            <a:miter lim="400000"/>
+          </a:ln>
+          <a:extLst>
+            <a:ext uri="{C572A759-6A51-4108-AA02-DFA0A04FC94B}">
+              <ma14:wrappingTextBoxFlag xmlns="" xmlns:m="http://schemas.openxmlformats.org/officeDocument/2006/math" xmlns:a14="http://schemas.microsoft.com/office/drawing/2010/main" xmlns:ma14="http://schemas.microsoft.com/office/mac/drawingml/2011/main" val="1"/>
+            </a:ext>
+          </a:extLst>
+        </p:spPr>
+        <p:txBody>
+          <a:bodyPr lIns="50800" tIns="50800" rIns="50800" bIns="50800" anchor="ctr">
+            <a:normAutofit/>
+          </a:bodyPr>
+          <a:lstStyle>
+            <a:lvl1pPr marL="0" marR="0" indent="0" algn="l" defTabSz="584200" rtl="0" latinLnBrk="0">
+              <a:lnSpc>
+                <a:spcPct val="120000"/>
+              </a:lnSpc>
+              <a:spcBef>
+                <a:spcPts val="0"/>
+              </a:spcBef>
+              <a:spcAft>
+                <a:spcPts val="0"/>
+              </a:spcAft>
+              <a:buClrTx/>
+              <a:buSzTx/>
+              <a:buFontTx/>
+              <a:buNone/>
+              <a:tabLst/>
+              <a:defRPr sz="3600" b="0" i="0" u="none" strike="noStrike" cap="all" spc="0" baseline="0">
+                <a:solidFill>
+                  <a:srgbClr val="00C7FC"/>
+                </a:solidFill>
+                <a:uFillTx/>
+                <a:latin typeface="Proxima Nova Extrabold"/>
+                <a:ea typeface="Proxima Nova Extrabold"/>
+                <a:cs typeface="Proxima Nova Extrabold"/>
+                <a:sym typeface="Proxima Nova Extrabold"/>
+              </a:defRPr>
+            </a:lvl1pPr>
+            <a:lvl2pPr marL="1371600" marR="0" indent="-685800" algn="l" defTabSz="584200" rtl="0" latinLnBrk="0">
+              <a:lnSpc>
+                <a:spcPct val="80000"/>
+              </a:lnSpc>
+              <a:spcBef>
+                <a:spcPts val="2400"/>
+              </a:spcBef>
+              <a:spcAft>
+                <a:spcPts val="0"/>
+              </a:spcAft>
+              <a:buClr>
+                <a:srgbClr val="57BEF0"/>
+              </a:buClr>
+              <a:buSzPct val="250000"/>
+              <a:buFontTx/>
+              <a:buChar char="-"/>
+              <a:tabLst/>
+              <a:defRPr sz="4200" b="1" i="0" u="none" strike="noStrike" cap="none" spc="0" baseline="0">
+                <a:solidFill>
+                  <a:srgbClr val="53585F"/>
+                </a:solidFill>
+                <a:uFillTx/>
+                <a:latin typeface="Proxima Nova"/>
+                <a:ea typeface="Proxima Nova"/>
+                <a:cs typeface="Proxima Nova"/>
+                <a:sym typeface="Proxima Nova"/>
+              </a:defRPr>
+            </a:lvl2pPr>
+            <a:lvl3pPr marL="2057400" marR="0" indent="-685800" algn="l" defTabSz="584200" rtl="0" latinLnBrk="0">
+              <a:lnSpc>
+                <a:spcPct val="80000"/>
+              </a:lnSpc>
+              <a:spcBef>
+                <a:spcPts val="2400"/>
+              </a:spcBef>
+              <a:spcAft>
+                <a:spcPts val="0"/>
+              </a:spcAft>
+              <a:buClr>
+                <a:srgbClr val="57BEF0"/>
+              </a:buClr>
+              <a:buSzPct val="250000"/>
+              <a:buFontTx/>
+              <a:buChar char="-"/>
+              <a:tabLst/>
+              <a:defRPr sz="4200" b="1" i="0" u="none" strike="noStrike" cap="none" spc="0" baseline="0">
+                <a:solidFill>
+                  <a:srgbClr val="53585F"/>
+                </a:solidFill>
+                <a:uFillTx/>
+                <a:latin typeface="Proxima Nova"/>
+                <a:ea typeface="Proxima Nova"/>
+                <a:cs typeface="Proxima Nova"/>
+                <a:sym typeface="Proxima Nova"/>
+              </a:defRPr>
+            </a:lvl3pPr>
+            <a:lvl4pPr marL="2743200" marR="0" indent="-685800" algn="l" defTabSz="584200" rtl="0" latinLnBrk="0">
+              <a:lnSpc>
+                <a:spcPct val="80000"/>
+              </a:lnSpc>
+              <a:spcBef>
+                <a:spcPts val="2400"/>
+              </a:spcBef>
+              <a:spcAft>
+                <a:spcPts val="0"/>
+              </a:spcAft>
+              <a:buClr>
+                <a:srgbClr val="57BEF0"/>
+              </a:buClr>
+              <a:buSzPct val="250000"/>
+              <a:buFontTx/>
+              <a:buChar char="-"/>
+              <a:tabLst/>
+              <a:defRPr sz="4200" b="1" i="0" u="none" strike="noStrike" cap="none" spc="0" baseline="0">
+                <a:solidFill>
+                  <a:srgbClr val="53585F"/>
+                </a:solidFill>
+                <a:uFillTx/>
+                <a:latin typeface="Proxima Nova"/>
+                <a:ea typeface="Proxima Nova"/>
+                <a:cs typeface="Proxima Nova"/>
+                <a:sym typeface="Proxima Nova"/>
+              </a:defRPr>
+            </a:lvl4pPr>
+            <a:lvl5pPr marL="3429000" marR="0" indent="-685800" algn="l" defTabSz="584200" rtl="0" latinLnBrk="0">
+              <a:lnSpc>
+                <a:spcPct val="80000"/>
+              </a:lnSpc>
+              <a:spcBef>
+                <a:spcPts val="2400"/>
+              </a:spcBef>
+              <a:spcAft>
+                <a:spcPts val="0"/>
+              </a:spcAft>
+              <a:buClr>
+                <a:srgbClr val="57BEF0"/>
+              </a:buClr>
+              <a:buSzPct val="250000"/>
+              <a:buFontTx/>
+              <a:buChar char="-"/>
+              <a:tabLst/>
+              <a:defRPr sz="4200" b="1" i="0" u="none" strike="noStrike" cap="none" spc="0" baseline="0">
+                <a:solidFill>
+                  <a:srgbClr val="53585F"/>
+                </a:solidFill>
+                <a:uFillTx/>
+                <a:latin typeface="Proxima Nova"/>
+                <a:ea typeface="Proxima Nova"/>
+                <a:cs typeface="Proxima Nova"/>
+                <a:sym typeface="Proxima Nova"/>
+              </a:defRPr>
+            </a:lvl5pPr>
+            <a:lvl6pPr marL="4114800" marR="0" indent="-685800" algn="l" defTabSz="584200" rtl="0" latinLnBrk="0">
+              <a:lnSpc>
+                <a:spcPct val="80000"/>
+              </a:lnSpc>
+              <a:spcBef>
+                <a:spcPts val="2400"/>
+              </a:spcBef>
+              <a:spcAft>
+                <a:spcPts val="0"/>
+              </a:spcAft>
+              <a:buClr>
+                <a:srgbClr val="57BEF0"/>
+              </a:buClr>
+              <a:buSzPct val="250000"/>
+              <a:buFontTx/>
+              <a:buChar char="-"/>
+              <a:tabLst/>
+              <a:defRPr sz="4200" b="1" i="0" u="none" strike="noStrike" cap="none" spc="0" baseline="0">
+                <a:solidFill>
+                  <a:srgbClr val="53585F"/>
+                </a:solidFill>
+                <a:uFillTx/>
+                <a:latin typeface="Proxima Nova"/>
+                <a:ea typeface="Proxima Nova"/>
+                <a:cs typeface="Proxima Nova"/>
+                <a:sym typeface="Proxima Nova"/>
+              </a:defRPr>
+            </a:lvl6pPr>
+            <a:lvl7pPr marL="4800600" marR="0" indent="-685800" algn="l" defTabSz="584200" rtl="0" latinLnBrk="0">
+              <a:lnSpc>
+                <a:spcPct val="80000"/>
+              </a:lnSpc>
+              <a:spcBef>
+                <a:spcPts val="2400"/>
+              </a:spcBef>
+              <a:spcAft>
+                <a:spcPts val="0"/>
+              </a:spcAft>
+              <a:buClr>
+                <a:srgbClr val="57BEF0"/>
+              </a:buClr>
+              <a:buSzPct val="250000"/>
+              <a:buFontTx/>
+              <a:buChar char="-"/>
+              <a:tabLst/>
+              <a:defRPr sz="4200" b="1" i="0" u="none" strike="noStrike" cap="none" spc="0" baseline="0">
+                <a:solidFill>
+                  <a:srgbClr val="53585F"/>
+                </a:solidFill>
+                <a:uFillTx/>
+                <a:latin typeface="Proxima Nova"/>
+                <a:ea typeface="Proxima Nova"/>
+                <a:cs typeface="Proxima Nova"/>
+                <a:sym typeface="Proxima Nova"/>
+              </a:defRPr>
+            </a:lvl7pPr>
+            <a:lvl8pPr marL="5486400" marR="0" indent="-685800" algn="l" defTabSz="584200" rtl="0" latinLnBrk="0">
+              <a:lnSpc>
+                <a:spcPct val="80000"/>
+              </a:lnSpc>
+              <a:spcBef>
+                <a:spcPts val="2400"/>
+              </a:spcBef>
+              <a:spcAft>
+                <a:spcPts val="0"/>
+              </a:spcAft>
+              <a:buClr>
+                <a:srgbClr val="57BEF0"/>
+              </a:buClr>
+              <a:buSzPct val="250000"/>
+              <a:buFontTx/>
+              <a:buChar char="-"/>
+              <a:tabLst/>
+              <a:defRPr sz="4200" b="1" i="0" u="none" strike="noStrike" cap="none" spc="0" baseline="0">
+                <a:solidFill>
+                  <a:srgbClr val="53585F"/>
+                </a:solidFill>
+                <a:uFillTx/>
+                <a:latin typeface="Proxima Nova"/>
+                <a:ea typeface="Proxima Nova"/>
+                <a:cs typeface="Proxima Nova"/>
+                <a:sym typeface="Proxima Nova"/>
+              </a:defRPr>
+            </a:lvl8pPr>
+            <a:lvl9pPr marL="6172200" marR="0" indent="-685800" algn="l" defTabSz="584200" rtl="0" latinLnBrk="0">
+              <a:lnSpc>
+                <a:spcPct val="80000"/>
+              </a:lnSpc>
+              <a:spcBef>
+                <a:spcPts val="2400"/>
+              </a:spcBef>
+              <a:spcAft>
+                <a:spcPts val="0"/>
+              </a:spcAft>
+              <a:buClr>
+                <a:srgbClr val="57BEF0"/>
+              </a:buClr>
+              <a:buSzPct val="250000"/>
+              <a:buFontTx/>
+              <a:buChar char="-"/>
+              <a:tabLst/>
+              <a:defRPr sz="4200" b="1" i="0" u="none" strike="noStrike" cap="none" spc="0" baseline="0">
+                <a:solidFill>
+                  <a:srgbClr val="53585F"/>
+                </a:solidFill>
+                <a:uFillTx/>
+                <a:latin typeface="Proxima Nova"/>
+                <a:ea typeface="Proxima Nova"/>
+                <a:cs typeface="Proxima Nova"/>
+                <a:sym typeface="Proxima Nova"/>
+              </a:defRPr>
+            </a:lvl9pPr>
+          </a:lstStyle>
+          <a:p>
+            <a:pPr defTabSz="344677" hangingPunct="1">
+              <a:defRPr sz="3775"/>
+            </a:pPr>
+            <a:r>
+              <a:rPr lang="en-GB" sz="6600" b="1" dirty="0"/>
+              <a:t>phishing</a:t>
+            </a:r>
+          </a:p>
+        </p:txBody>
+      </p:sp>
+      <p:sp>
+        <p:nvSpPr>
+          <p:cNvPr id="3" name="In reality we don’t write programs in it very often*…">
+            <a:extLst>
+              <a:ext uri="{FF2B5EF4-FFF2-40B4-BE49-F238E27FC236}">
+                <a16:creationId xmlns:a16="http://schemas.microsoft.com/office/drawing/2014/main" id="{E282DA51-BA5B-FA69-8B7E-4A686849F7D6}"/>
+              </a:ext>
+            </a:extLst>
+          </p:cNvPr>
+          <p:cNvSpPr txBox="1">
+            <a:spLocks/>
+          </p:cNvSpPr>
+          <p:nvPr/>
+        </p:nvSpPr>
+        <p:spPr>
+          <a:xfrm>
+            <a:off x="1219200" y="8408229"/>
+            <a:ext cx="8356600" cy="4088571"/>
+          </a:xfrm>
+          <a:prstGeom prst="rect">
+            <a:avLst/>
+          </a:prstGeom>
+          <a:ln w="12700">
+            <a:miter lim="400000"/>
+          </a:ln>
+          <a:extLst>
+            <a:ext uri="{C572A759-6A51-4108-AA02-DFA0A04FC94B}">
+              <ma14:wrappingTextBoxFlag xmlns="" xmlns:m="http://schemas.openxmlformats.org/officeDocument/2006/math" xmlns:a14="http://schemas.microsoft.com/office/drawing/2010/main" xmlns:ma14="http://schemas.microsoft.com/office/mac/drawingml/2011/main" val="1"/>
+            </a:ext>
+          </a:extLst>
+        </p:spPr>
+        <p:txBody>
+          <a:bodyPr lIns="50800" tIns="50800" rIns="50800" bIns="50800">
+            <a:normAutofit lnSpcReduction="10000"/>
+          </a:bodyPr>
+          <a:lstStyle>
+            <a:lvl1pPr marL="685800" marR="0" indent="-685800" algn="l" defTabSz="584200" rtl="0" latinLnBrk="0">
+              <a:lnSpc>
+                <a:spcPct val="80000"/>
+              </a:lnSpc>
+              <a:spcBef>
+                <a:spcPts val="2400"/>
+              </a:spcBef>
+              <a:spcAft>
+                <a:spcPts val="0"/>
+              </a:spcAft>
+              <a:buClr>
+                <a:srgbClr val="57BEF0"/>
+              </a:buClr>
+              <a:buSzPct val="250000"/>
+              <a:buFontTx/>
+              <a:buChar char="-"/>
+              <a:tabLst/>
+              <a:defRPr sz="4200" b="1" i="0" u="none" strike="noStrike" cap="none" spc="0" baseline="0">
+                <a:solidFill>
+                  <a:srgbClr val="53585F"/>
+                </a:solidFill>
+                <a:uFillTx/>
+                <a:latin typeface="Proxima Nova"/>
+                <a:ea typeface="Proxima Nova"/>
+                <a:cs typeface="Proxima Nova"/>
+                <a:sym typeface="Proxima Nova"/>
+              </a:defRPr>
+            </a:lvl1pPr>
+            <a:lvl2pPr marL="1371600" marR="0" indent="-685800" algn="l" defTabSz="584200" rtl="0" latinLnBrk="0">
+              <a:lnSpc>
+                <a:spcPct val="80000"/>
+              </a:lnSpc>
+              <a:spcBef>
+                <a:spcPts val="2400"/>
+              </a:spcBef>
+              <a:spcAft>
+                <a:spcPts val="0"/>
+              </a:spcAft>
+              <a:buClr>
+                <a:srgbClr val="57BEF0"/>
+              </a:buClr>
+              <a:buSzPct val="250000"/>
+              <a:buFontTx/>
+              <a:buChar char="-"/>
+              <a:tabLst/>
+              <a:defRPr sz="4200" b="1" i="0" u="none" strike="noStrike" cap="none" spc="0" baseline="0">
+                <a:solidFill>
+                  <a:srgbClr val="53585F"/>
+                </a:solidFill>
+                <a:uFillTx/>
+                <a:latin typeface="Proxima Nova"/>
+                <a:ea typeface="Proxima Nova"/>
+                <a:cs typeface="Proxima Nova"/>
+                <a:sym typeface="Proxima Nova"/>
+              </a:defRPr>
+            </a:lvl2pPr>
+            <a:lvl3pPr marL="2057400" marR="0" indent="-685800" algn="l" defTabSz="584200" rtl="0" latinLnBrk="0">
+              <a:lnSpc>
+                <a:spcPct val="80000"/>
+              </a:lnSpc>
+              <a:spcBef>
+                <a:spcPts val="2400"/>
+              </a:spcBef>
+              <a:spcAft>
+                <a:spcPts val="0"/>
+              </a:spcAft>
+              <a:buClr>
+                <a:srgbClr val="57BEF0"/>
+              </a:buClr>
+              <a:buSzPct val="250000"/>
+              <a:buFontTx/>
+              <a:buChar char="-"/>
+              <a:tabLst/>
+              <a:defRPr sz="4200" b="1" i="0" u="none" strike="noStrike" cap="none" spc="0" baseline="0">
+                <a:solidFill>
+                  <a:srgbClr val="53585F"/>
+                </a:solidFill>
+                <a:uFillTx/>
+                <a:latin typeface="Proxima Nova"/>
+                <a:ea typeface="Proxima Nova"/>
+                <a:cs typeface="Proxima Nova"/>
+                <a:sym typeface="Proxima Nova"/>
+              </a:defRPr>
+            </a:lvl3pPr>
+            <a:lvl4pPr marL="2743200" marR="0" indent="-685800" algn="l" defTabSz="584200" rtl="0" latinLnBrk="0">
+              <a:lnSpc>
+                <a:spcPct val="80000"/>
+              </a:lnSpc>
+              <a:spcBef>
+                <a:spcPts val="2400"/>
+              </a:spcBef>
+              <a:spcAft>
+                <a:spcPts val="0"/>
+              </a:spcAft>
+              <a:buClr>
+                <a:srgbClr val="57BEF0"/>
+              </a:buClr>
+              <a:buSzPct val="250000"/>
+              <a:buFontTx/>
+              <a:buChar char="-"/>
+              <a:tabLst/>
+              <a:defRPr sz="4200" b="1" i="0" u="none" strike="noStrike" cap="none" spc="0" baseline="0">
+                <a:solidFill>
+                  <a:srgbClr val="53585F"/>
+                </a:solidFill>
+                <a:uFillTx/>
+                <a:latin typeface="Proxima Nova"/>
+                <a:ea typeface="Proxima Nova"/>
+                <a:cs typeface="Proxima Nova"/>
+                <a:sym typeface="Proxima Nova"/>
+              </a:defRPr>
+            </a:lvl4pPr>
+            <a:lvl5pPr marL="3429000" marR="0" indent="-685800" algn="l" defTabSz="584200" rtl="0" latinLnBrk="0">
+              <a:lnSpc>
+                <a:spcPct val="80000"/>
+              </a:lnSpc>
+              <a:spcBef>
+                <a:spcPts val="2400"/>
+              </a:spcBef>
+              <a:spcAft>
+                <a:spcPts val="0"/>
+              </a:spcAft>
+              <a:buClr>
+                <a:srgbClr val="57BEF0"/>
+              </a:buClr>
+              <a:buSzPct val="250000"/>
+              <a:buFontTx/>
+              <a:buChar char="-"/>
+              <a:tabLst/>
+              <a:defRPr sz="4200" b="1" i="0" u="none" strike="noStrike" cap="none" spc="0" baseline="0">
+                <a:solidFill>
+                  <a:srgbClr val="53585F"/>
+                </a:solidFill>
+                <a:uFillTx/>
+                <a:latin typeface="Proxima Nova"/>
+                <a:ea typeface="Proxima Nova"/>
+                <a:cs typeface="Proxima Nova"/>
+                <a:sym typeface="Proxima Nova"/>
+              </a:defRPr>
+            </a:lvl5pPr>
+            <a:lvl6pPr marL="4114800" marR="0" indent="-685800" algn="l" defTabSz="584200" rtl="0" latinLnBrk="0">
+              <a:lnSpc>
+                <a:spcPct val="80000"/>
+              </a:lnSpc>
+              <a:spcBef>
+                <a:spcPts val="2400"/>
+              </a:spcBef>
+              <a:spcAft>
+                <a:spcPts val="0"/>
+              </a:spcAft>
+              <a:buClr>
+                <a:srgbClr val="57BEF0"/>
+              </a:buClr>
+              <a:buSzPct val="250000"/>
+              <a:buFontTx/>
+              <a:buChar char="-"/>
+              <a:tabLst/>
+              <a:defRPr sz="4200" b="1" i="0" u="none" strike="noStrike" cap="none" spc="0" baseline="0">
+                <a:solidFill>
+                  <a:srgbClr val="53585F"/>
+                </a:solidFill>
+                <a:uFillTx/>
+                <a:latin typeface="Proxima Nova"/>
+                <a:ea typeface="Proxima Nova"/>
+                <a:cs typeface="Proxima Nova"/>
+                <a:sym typeface="Proxima Nova"/>
+              </a:defRPr>
+            </a:lvl6pPr>
+            <a:lvl7pPr marL="4800600" marR="0" indent="-685800" algn="l" defTabSz="584200" rtl="0" latinLnBrk="0">
+              <a:lnSpc>
+                <a:spcPct val="80000"/>
+              </a:lnSpc>
+              <a:spcBef>
+                <a:spcPts val="2400"/>
+              </a:spcBef>
+              <a:spcAft>
+                <a:spcPts val="0"/>
+              </a:spcAft>
+              <a:buClr>
+                <a:srgbClr val="57BEF0"/>
+              </a:buClr>
+              <a:buSzPct val="250000"/>
+              <a:buFontTx/>
+              <a:buChar char="-"/>
+              <a:tabLst/>
+              <a:defRPr sz="4200" b="1" i="0" u="none" strike="noStrike" cap="none" spc="0" baseline="0">
+                <a:solidFill>
+                  <a:srgbClr val="53585F"/>
+                </a:solidFill>
+                <a:uFillTx/>
+                <a:latin typeface="Proxima Nova"/>
+                <a:ea typeface="Proxima Nova"/>
+                <a:cs typeface="Proxima Nova"/>
+                <a:sym typeface="Proxima Nova"/>
+              </a:defRPr>
+            </a:lvl7pPr>
+            <a:lvl8pPr marL="5486400" marR="0" indent="-685800" algn="l" defTabSz="584200" rtl="0" latinLnBrk="0">
+              <a:lnSpc>
+                <a:spcPct val="80000"/>
+              </a:lnSpc>
+              <a:spcBef>
+                <a:spcPts val="2400"/>
+              </a:spcBef>
+              <a:spcAft>
+                <a:spcPts val="0"/>
+              </a:spcAft>
+              <a:buClr>
+                <a:srgbClr val="57BEF0"/>
+              </a:buClr>
+              <a:buSzPct val="250000"/>
+              <a:buFontTx/>
+              <a:buChar char="-"/>
+              <a:tabLst/>
+              <a:defRPr sz="4200" b="1" i="0" u="none" strike="noStrike" cap="none" spc="0" baseline="0">
+                <a:solidFill>
+                  <a:srgbClr val="53585F"/>
+                </a:solidFill>
+                <a:uFillTx/>
+                <a:latin typeface="Proxima Nova"/>
+                <a:ea typeface="Proxima Nova"/>
+                <a:cs typeface="Proxima Nova"/>
+                <a:sym typeface="Proxima Nova"/>
+              </a:defRPr>
+            </a:lvl8pPr>
+            <a:lvl9pPr marL="6172200" marR="0" indent="-685800" algn="l" defTabSz="584200" rtl="0" latinLnBrk="0">
+              <a:lnSpc>
+                <a:spcPct val="80000"/>
+              </a:lnSpc>
+              <a:spcBef>
+                <a:spcPts val="2400"/>
+              </a:spcBef>
+              <a:spcAft>
+                <a:spcPts val="0"/>
+              </a:spcAft>
+              <a:buClr>
+                <a:srgbClr val="57BEF0"/>
+              </a:buClr>
+              <a:buSzPct val="250000"/>
+              <a:buFontTx/>
+              <a:buChar char="-"/>
+              <a:tabLst/>
+              <a:defRPr sz="4200" b="1" i="0" u="none" strike="noStrike" cap="none" spc="0" baseline="0">
+                <a:solidFill>
+                  <a:srgbClr val="53585F"/>
+                </a:solidFill>
+                <a:uFillTx/>
+                <a:latin typeface="Proxima Nova"/>
+                <a:ea typeface="Proxima Nova"/>
+                <a:cs typeface="Proxima Nova"/>
+                <a:sym typeface="Proxima Nova"/>
+              </a:defRPr>
+            </a:lvl9pPr>
+          </a:lstStyle>
+          <a:p>
+            <a:pPr hangingPunct="1"/>
+            <a:r>
+              <a:rPr lang="en-GB" b="0" dirty="0"/>
+              <a:t>Commonly through email</a:t>
+            </a:r>
+          </a:p>
+          <a:p>
+            <a:pPr hangingPunct="1"/>
+            <a:r>
+              <a:rPr lang="en-GB" b="0" dirty="0"/>
+              <a:t>Designed to convince people to hand over confidential information e.g. usernames, passwords, card details.</a:t>
+            </a:r>
+          </a:p>
+          <a:p>
+            <a:pPr hangingPunct="1"/>
+            <a:r>
+              <a:rPr lang="en-GB" b="0" dirty="0"/>
+              <a:t>Usually sent to thousands of people.</a:t>
+            </a:r>
+          </a:p>
+        </p:txBody>
+      </p:sp>
+      <p:sp>
+        <p:nvSpPr>
+          <p:cNvPr id="6" name="In reality we don’t write programs in it very often*…">
+            <a:extLst>
+              <a:ext uri="{FF2B5EF4-FFF2-40B4-BE49-F238E27FC236}">
+                <a16:creationId xmlns:a16="http://schemas.microsoft.com/office/drawing/2014/main" id="{698E8DEC-9DE2-14AE-565E-39FE117695E6}"/>
+              </a:ext>
+            </a:extLst>
+          </p:cNvPr>
+          <p:cNvSpPr txBox="1">
+            <a:spLocks/>
+          </p:cNvSpPr>
+          <p:nvPr/>
+        </p:nvSpPr>
+        <p:spPr>
+          <a:xfrm>
+            <a:off x="12191998" y="8408229"/>
+            <a:ext cx="10702413" cy="3176905"/>
           </a:xfrm>
           <a:prstGeom prst="rect">
             <a:avLst/>
@@ -10285,25 +10821,581 @@
             <a:normAutofit/>
           </a:bodyPr>
           <a:lstStyle>
-            <a:lvl1pPr defTabSz="584200">
+            <a:lvl1pPr marL="685800" marR="0" indent="-685800" algn="l" defTabSz="584200" rtl="0" latinLnBrk="0">
               <a:lnSpc>
                 <a:spcPct val="80000"/>
               </a:lnSpc>
-              <a:defRPr sz="10000" cap="all" spc="-100">
-                <a:solidFill>
-                  <a:srgbClr val="FFD74C"/>
-                </a:solidFill>
-                <a:latin typeface="+mn-lt"/>
-                <a:ea typeface="+mn-ea"/>
-                <a:cs typeface="+mn-cs"/>
-                <a:sym typeface="Druk Medium"/>
+              <a:spcBef>
+                <a:spcPts val="2400"/>
+              </a:spcBef>
+              <a:spcAft>
+                <a:spcPts val="0"/>
+              </a:spcAft>
+              <a:buClr>
+                <a:srgbClr val="57BEF0"/>
+              </a:buClr>
+              <a:buSzPct val="250000"/>
+              <a:buFontTx/>
+              <a:buChar char="-"/>
+              <a:tabLst/>
+              <a:defRPr sz="4200" b="1" i="0" u="none" strike="noStrike" cap="none" spc="0" baseline="0">
+                <a:solidFill>
+                  <a:srgbClr val="53585F"/>
+                </a:solidFill>
+                <a:uFillTx/>
+                <a:latin typeface="Proxima Nova"/>
+                <a:ea typeface="Proxima Nova"/>
+                <a:cs typeface="Proxima Nova"/>
+                <a:sym typeface="Proxima Nova"/>
               </a:defRPr>
             </a:lvl1pPr>
+            <a:lvl2pPr marL="1371600" marR="0" indent="-685800" algn="l" defTabSz="584200" rtl="0" latinLnBrk="0">
+              <a:lnSpc>
+                <a:spcPct val="80000"/>
+              </a:lnSpc>
+              <a:spcBef>
+                <a:spcPts val="2400"/>
+              </a:spcBef>
+              <a:spcAft>
+                <a:spcPts val="0"/>
+              </a:spcAft>
+              <a:buClr>
+                <a:srgbClr val="57BEF0"/>
+              </a:buClr>
+              <a:buSzPct val="250000"/>
+              <a:buFontTx/>
+              <a:buChar char="-"/>
+              <a:tabLst/>
+              <a:defRPr sz="4200" b="1" i="0" u="none" strike="noStrike" cap="none" spc="0" baseline="0">
+                <a:solidFill>
+                  <a:srgbClr val="53585F"/>
+                </a:solidFill>
+                <a:uFillTx/>
+                <a:latin typeface="Proxima Nova"/>
+                <a:ea typeface="Proxima Nova"/>
+                <a:cs typeface="Proxima Nova"/>
+                <a:sym typeface="Proxima Nova"/>
+              </a:defRPr>
+            </a:lvl2pPr>
+            <a:lvl3pPr marL="2057400" marR="0" indent="-685800" algn="l" defTabSz="584200" rtl="0" latinLnBrk="0">
+              <a:lnSpc>
+                <a:spcPct val="80000"/>
+              </a:lnSpc>
+              <a:spcBef>
+                <a:spcPts val="2400"/>
+              </a:spcBef>
+              <a:spcAft>
+                <a:spcPts val="0"/>
+              </a:spcAft>
+              <a:buClr>
+                <a:srgbClr val="57BEF0"/>
+              </a:buClr>
+              <a:buSzPct val="250000"/>
+              <a:buFontTx/>
+              <a:buChar char="-"/>
+              <a:tabLst/>
+              <a:defRPr sz="4200" b="1" i="0" u="none" strike="noStrike" cap="none" spc="0" baseline="0">
+                <a:solidFill>
+                  <a:srgbClr val="53585F"/>
+                </a:solidFill>
+                <a:uFillTx/>
+                <a:latin typeface="Proxima Nova"/>
+                <a:ea typeface="Proxima Nova"/>
+                <a:cs typeface="Proxima Nova"/>
+                <a:sym typeface="Proxima Nova"/>
+              </a:defRPr>
+            </a:lvl3pPr>
+            <a:lvl4pPr marL="2743200" marR="0" indent="-685800" algn="l" defTabSz="584200" rtl="0" latinLnBrk="0">
+              <a:lnSpc>
+                <a:spcPct val="80000"/>
+              </a:lnSpc>
+              <a:spcBef>
+                <a:spcPts val="2400"/>
+              </a:spcBef>
+              <a:spcAft>
+                <a:spcPts val="0"/>
+              </a:spcAft>
+              <a:buClr>
+                <a:srgbClr val="57BEF0"/>
+              </a:buClr>
+              <a:buSzPct val="250000"/>
+              <a:buFontTx/>
+              <a:buChar char="-"/>
+              <a:tabLst/>
+              <a:defRPr sz="4200" b="1" i="0" u="none" strike="noStrike" cap="none" spc="0" baseline="0">
+                <a:solidFill>
+                  <a:srgbClr val="53585F"/>
+                </a:solidFill>
+                <a:uFillTx/>
+                <a:latin typeface="Proxima Nova"/>
+                <a:ea typeface="Proxima Nova"/>
+                <a:cs typeface="Proxima Nova"/>
+                <a:sym typeface="Proxima Nova"/>
+              </a:defRPr>
+            </a:lvl4pPr>
+            <a:lvl5pPr marL="3429000" marR="0" indent="-685800" algn="l" defTabSz="584200" rtl="0" latinLnBrk="0">
+              <a:lnSpc>
+                <a:spcPct val="80000"/>
+              </a:lnSpc>
+              <a:spcBef>
+                <a:spcPts val="2400"/>
+              </a:spcBef>
+              <a:spcAft>
+                <a:spcPts val="0"/>
+              </a:spcAft>
+              <a:buClr>
+                <a:srgbClr val="57BEF0"/>
+              </a:buClr>
+              <a:buSzPct val="250000"/>
+              <a:buFontTx/>
+              <a:buChar char="-"/>
+              <a:tabLst/>
+              <a:defRPr sz="4200" b="1" i="0" u="none" strike="noStrike" cap="none" spc="0" baseline="0">
+                <a:solidFill>
+                  <a:srgbClr val="53585F"/>
+                </a:solidFill>
+                <a:uFillTx/>
+                <a:latin typeface="Proxima Nova"/>
+                <a:ea typeface="Proxima Nova"/>
+                <a:cs typeface="Proxima Nova"/>
+                <a:sym typeface="Proxima Nova"/>
+              </a:defRPr>
+            </a:lvl5pPr>
+            <a:lvl6pPr marL="4114800" marR="0" indent="-685800" algn="l" defTabSz="584200" rtl="0" latinLnBrk="0">
+              <a:lnSpc>
+                <a:spcPct val="80000"/>
+              </a:lnSpc>
+              <a:spcBef>
+                <a:spcPts val="2400"/>
+              </a:spcBef>
+              <a:spcAft>
+                <a:spcPts val="0"/>
+              </a:spcAft>
+              <a:buClr>
+                <a:srgbClr val="57BEF0"/>
+              </a:buClr>
+              <a:buSzPct val="250000"/>
+              <a:buFontTx/>
+              <a:buChar char="-"/>
+              <a:tabLst/>
+              <a:defRPr sz="4200" b="1" i="0" u="none" strike="noStrike" cap="none" spc="0" baseline="0">
+                <a:solidFill>
+                  <a:srgbClr val="53585F"/>
+                </a:solidFill>
+                <a:uFillTx/>
+                <a:latin typeface="Proxima Nova"/>
+                <a:ea typeface="Proxima Nova"/>
+                <a:cs typeface="Proxima Nova"/>
+                <a:sym typeface="Proxima Nova"/>
+              </a:defRPr>
+            </a:lvl6pPr>
+            <a:lvl7pPr marL="4800600" marR="0" indent="-685800" algn="l" defTabSz="584200" rtl="0" latinLnBrk="0">
+              <a:lnSpc>
+                <a:spcPct val="80000"/>
+              </a:lnSpc>
+              <a:spcBef>
+                <a:spcPts val="2400"/>
+              </a:spcBef>
+              <a:spcAft>
+                <a:spcPts val="0"/>
+              </a:spcAft>
+              <a:buClr>
+                <a:srgbClr val="57BEF0"/>
+              </a:buClr>
+              <a:buSzPct val="250000"/>
+              <a:buFontTx/>
+              <a:buChar char="-"/>
+              <a:tabLst/>
+              <a:defRPr sz="4200" b="1" i="0" u="none" strike="noStrike" cap="none" spc="0" baseline="0">
+                <a:solidFill>
+                  <a:srgbClr val="53585F"/>
+                </a:solidFill>
+                <a:uFillTx/>
+                <a:latin typeface="Proxima Nova"/>
+                <a:ea typeface="Proxima Nova"/>
+                <a:cs typeface="Proxima Nova"/>
+                <a:sym typeface="Proxima Nova"/>
+              </a:defRPr>
+            </a:lvl7pPr>
+            <a:lvl8pPr marL="5486400" marR="0" indent="-685800" algn="l" defTabSz="584200" rtl="0" latinLnBrk="0">
+              <a:lnSpc>
+                <a:spcPct val="80000"/>
+              </a:lnSpc>
+              <a:spcBef>
+                <a:spcPts val="2400"/>
+              </a:spcBef>
+              <a:spcAft>
+                <a:spcPts val="0"/>
+              </a:spcAft>
+              <a:buClr>
+                <a:srgbClr val="57BEF0"/>
+              </a:buClr>
+              <a:buSzPct val="250000"/>
+              <a:buFontTx/>
+              <a:buChar char="-"/>
+              <a:tabLst/>
+              <a:defRPr sz="4200" b="1" i="0" u="none" strike="noStrike" cap="none" spc="0" baseline="0">
+                <a:solidFill>
+                  <a:srgbClr val="53585F"/>
+                </a:solidFill>
+                <a:uFillTx/>
+                <a:latin typeface="Proxima Nova"/>
+                <a:ea typeface="Proxima Nova"/>
+                <a:cs typeface="Proxima Nova"/>
+                <a:sym typeface="Proxima Nova"/>
+              </a:defRPr>
+            </a:lvl8pPr>
+            <a:lvl9pPr marL="6172200" marR="0" indent="-685800" algn="l" defTabSz="584200" rtl="0" latinLnBrk="0">
+              <a:lnSpc>
+                <a:spcPct val="80000"/>
+              </a:lnSpc>
+              <a:spcBef>
+                <a:spcPts val="2400"/>
+              </a:spcBef>
+              <a:spcAft>
+                <a:spcPts val="0"/>
+              </a:spcAft>
+              <a:buClr>
+                <a:srgbClr val="57BEF0"/>
+              </a:buClr>
+              <a:buSzPct val="250000"/>
+              <a:buFontTx/>
+              <a:buChar char="-"/>
+              <a:tabLst/>
+              <a:defRPr sz="4200" b="1" i="0" u="none" strike="noStrike" cap="none" spc="0" baseline="0">
+                <a:solidFill>
+                  <a:srgbClr val="53585F"/>
+                </a:solidFill>
+                <a:uFillTx/>
+                <a:latin typeface="Proxima Nova"/>
+                <a:ea typeface="Proxima Nova"/>
+                <a:cs typeface="Proxima Nova"/>
+                <a:sym typeface="Proxima Nova"/>
+              </a:defRPr>
+            </a:lvl9pPr>
           </a:lstStyle>
           <a:p>
+            <a:pPr hangingPunct="1"/>
             <a:r>
-              <a:rPr dirty="0"/>
-              <a:t>And it will come up</a:t>
+              <a:rPr lang="en-GB" b="0" dirty="0">
+                <a:solidFill>
+                  <a:srgbClr val="FFFFFF"/>
+                </a:solidFill>
+              </a:rPr>
+              <a:t>Someone rings up pretending to be someone else to convince you to give away secrets.</a:t>
+            </a:r>
+          </a:p>
+          <a:p>
+            <a:pPr hangingPunct="1"/>
+            <a:r>
+              <a:rPr lang="en-GB" b="0" dirty="0">
+                <a:solidFill>
+                  <a:srgbClr val="FFFFFF"/>
+                </a:solidFill>
+              </a:rPr>
+              <a:t>E.g. Network Administrator, Manager</a:t>
+            </a:r>
+          </a:p>
+        </p:txBody>
+      </p:sp>
+      <p:sp>
+        <p:nvSpPr>
+          <p:cNvPr id="7" name="Why are we even learning this?…">
+            <a:extLst>
+              <a:ext uri="{FF2B5EF4-FFF2-40B4-BE49-F238E27FC236}">
+                <a16:creationId xmlns:a16="http://schemas.microsoft.com/office/drawing/2014/main" id="{24A9D448-7191-27E4-5193-01F5AD4FCA98}"/>
+              </a:ext>
+            </a:extLst>
+          </p:cNvPr>
+          <p:cNvSpPr txBox="1">
+            <a:spLocks/>
+          </p:cNvSpPr>
+          <p:nvPr/>
+        </p:nvSpPr>
+        <p:spPr>
+          <a:xfrm>
+            <a:off x="12191999" y="6160454"/>
+            <a:ext cx="10702413" cy="2106294"/>
+          </a:xfrm>
+          <a:prstGeom prst="rect">
+            <a:avLst/>
+          </a:prstGeom>
+          <a:ln w="12700">
+            <a:miter lim="400000"/>
+          </a:ln>
+          <a:extLst>
+            <a:ext uri="{C572A759-6A51-4108-AA02-DFA0A04FC94B}">
+              <ma14:wrappingTextBoxFlag xmlns="" xmlns:m="http://schemas.openxmlformats.org/officeDocument/2006/math" xmlns:a14="http://schemas.microsoft.com/office/drawing/2010/main" xmlns:ma14="http://schemas.microsoft.com/office/mac/drawingml/2011/main" val="1"/>
+            </a:ext>
+          </a:extLst>
+        </p:spPr>
+        <p:txBody>
+          <a:bodyPr lIns="50800" tIns="50800" rIns="50800" bIns="50800" anchor="ctr">
+            <a:normAutofit fontScale="92500"/>
+          </a:bodyPr>
+          <a:lstStyle>
+            <a:lvl1pPr marL="0" marR="0" indent="0" algn="l" defTabSz="584200" rtl="0" latinLnBrk="0">
+              <a:lnSpc>
+                <a:spcPct val="120000"/>
+              </a:lnSpc>
+              <a:spcBef>
+                <a:spcPts val="0"/>
+              </a:spcBef>
+              <a:spcAft>
+                <a:spcPts val="0"/>
+              </a:spcAft>
+              <a:buClrTx/>
+              <a:buSzTx/>
+              <a:buFontTx/>
+              <a:buNone/>
+              <a:tabLst/>
+              <a:defRPr sz="3600" b="0" i="0" u="none" strike="noStrike" cap="all" spc="0" baseline="0">
+                <a:solidFill>
+                  <a:srgbClr val="00C7FC"/>
+                </a:solidFill>
+                <a:uFillTx/>
+                <a:latin typeface="Proxima Nova Extrabold"/>
+                <a:ea typeface="Proxima Nova Extrabold"/>
+                <a:cs typeface="Proxima Nova Extrabold"/>
+                <a:sym typeface="Proxima Nova Extrabold"/>
+              </a:defRPr>
+            </a:lvl1pPr>
+            <a:lvl2pPr marL="1371600" marR="0" indent="-685800" algn="l" defTabSz="584200" rtl="0" latinLnBrk="0">
+              <a:lnSpc>
+                <a:spcPct val="80000"/>
+              </a:lnSpc>
+              <a:spcBef>
+                <a:spcPts val="2400"/>
+              </a:spcBef>
+              <a:spcAft>
+                <a:spcPts val="0"/>
+              </a:spcAft>
+              <a:buClr>
+                <a:srgbClr val="57BEF0"/>
+              </a:buClr>
+              <a:buSzPct val="250000"/>
+              <a:buFontTx/>
+              <a:buChar char="-"/>
+              <a:tabLst/>
+              <a:defRPr sz="4200" b="1" i="0" u="none" strike="noStrike" cap="none" spc="0" baseline="0">
+                <a:solidFill>
+                  <a:srgbClr val="53585F"/>
+                </a:solidFill>
+                <a:uFillTx/>
+                <a:latin typeface="Proxima Nova"/>
+                <a:ea typeface="Proxima Nova"/>
+                <a:cs typeface="Proxima Nova"/>
+                <a:sym typeface="Proxima Nova"/>
+              </a:defRPr>
+            </a:lvl2pPr>
+            <a:lvl3pPr marL="2057400" marR="0" indent="-685800" algn="l" defTabSz="584200" rtl="0" latinLnBrk="0">
+              <a:lnSpc>
+                <a:spcPct val="80000"/>
+              </a:lnSpc>
+              <a:spcBef>
+                <a:spcPts val="2400"/>
+              </a:spcBef>
+              <a:spcAft>
+                <a:spcPts val="0"/>
+              </a:spcAft>
+              <a:buClr>
+                <a:srgbClr val="57BEF0"/>
+              </a:buClr>
+              <a:buSzPct val="250000"/>
+              <a:buFontTx/>
+              <a:buChar char="-"/>
+              <a:tabLst/>
+              <a:defRPr sz="4200" b="1" i="0" u="none" strike="noStrike" cap="none" spc="0" baseline="0">
+                <a:solidFill>
+                  <a:srgbClr val="53585F"/>
+                </a:solidFill>
+                <a:uFillTx/>
+                <a:latin typeface="Proxima Nova"/>
+                <a:ea typeface="Proxima Nova"/>
+                <a:cs typeface="Proxima Nova"/>
+                <a:sym typeface="Proxima Nova"/>
+              </a:defRPr>
+            </a:lvl3pPr>
+            <a:lvl4pPr marL="2743200" marR="0" indent="-685800" algn="l" defTabSz="584200" rtl="0" latinLnBrk="0">
+              <a:lnSpc>
+                <a:spcPct val="80000"/>
+              </a:lnSpc>
+              <a:spcBef>
+                <a:spcPts val="2400"/>
+              </a:spcBef>
+              <a:spcAft>
+                <a:spcPts val="0"/>
+              </a:spcAft>
+              <a:buClr>
+                <a:srgbClr val="57BEF0"/>
+              </a:buClr>
+              <a:buSzPct val="250000"/>
+              <a:buFontTx/>
+              <a:buChar char="-"/>
+              <a:tabLst/>
+              <a:defRPr sz="4200" b="1" i="0" u="none" strike="noStrike" cap="none" spc="0" baseline="0">
+                <a:solidFill>
+                  <a:srgbClr val="53585F"/>
+                </a:solidFill>
+                <a:uFillTx/>
+                <a:latin typeface="Proxima Nova"/>
+                <a:ea typeface="Proxima Nova"/>
+                <a:cs typeface="Proxima Nova"/>
+                <a:sym typeface="Proxima Nova"/>
+              </a:defRPr>
+            </a:lvl4pPr>
+            <a:lvl5pPr marL="3429000" marR="0" indent="-685800" algn="l" defTabSz="584200" rtl="0" latinLnBrk="0">
+              <a:lnSpc>
+                <a:spcPct val="80000"/>
+              </a:lnSpc>
+              <a:spcBef>
+                <a:spcPts val="2400"/>
+              </a:spcBef>
+              <a:spcAft>
+                <a:spcPts val="0"/>
+              </a:spcAft>
+              <a:buClr>
+                <a:srgbClr val="57BEF0"/>
+              </a:buClr>
+              <a:buSzPct val="250000"/>
+              <a:buFontTx/>
+              <a:buChar char="-"/>
+              <a:tabLst/>
+              <a:defRPr sz="4200" b="1" i="0" u="none" strike="noStrike" cap="none" spc="0" baseline="0">
+                <a:solidFill>
+                  <a:srgbClr val="53585F"/>
+                </a:solidFill>
+                <a:uFillTx/>
+                <a:latin typeface="Proxima Nova"/>
+                <a:ea typeface="Proxima Nova"/>
+                <a:cs typeface="Proxima Nova"/>
+                <a:sym typeface="Proxima Nova"/>
+              </a:defRPr>
+            </a:lvl5pPr>
+            <a:lvl6pPr marL="4114800" marR="0" indent="-685800" algn="l" defTabSz="584200" rtl="0" latinLnBrk="0">
+              <a:lnSpc>
+                <a:spcPct val="80000"/>
+              </a:lnSpc>
+              <a:spcBef>
+                <a:spcPts val="2400"/>
+              </a:spcBef>
+              <a:spcAft>
+                <a:spcPts val="0"/>
+              </a:spcAft>
+              <a:buClr>
+                <a:srgbClr val="57BEF0"/>
+              </a:buClr>
+              <a:buSzPct val="250000"/>
+              <a:buFontTx/>
+              <a:buChar char="-"/>
+              <a:tabLst/>
+              <a:defRPr sz="4200" b="1" i="0" u="none" strike="noStrike" cap="none" spc="0" baseline="0">
+                <a:solidFill>
+                  <a:srgbClr val="53585F"/>
+                </a:solidFill>
+                <a:uFillTx/>
+                <a:latin typeface="Proxima Nova"/>
+                <a:ea typeface="Proxima Nova"/>
+                <a:cs typeface="Proxima Nova"/>
+                <a:sym typeface="Proxima Nova"/>
+              </a:defRPr>
+            </a:lvl6pPr>
+            <a:lvl7pPr marL="4800600" marR="0" indent="-685800" algn="l" defTabSz="584200" rtl="0" latinLnBrk="0">
+              <a:lnSpc>
+                <a:spcPct val="80000"/>
+              </a:lnSpc>
+              <a:spcBef>
+                <a:spcPts val="2400"/>
+              </a:spcBef>
+              <a:spcAft>
+                <a:spcPts val="0"/>
+              </a:spcAft>
+              <a:buClr>
+                <a:srgbClr val="57BEF0"/>
+              </a:buClr>
+              <a:buSzPct val="250000"/>
+              <a:buFontTx/>
+              <a:buChar char="-"/>
+              <a:tabLst/>
+              <a:defRPr sz="4200" b="1" i="0" u="none" strike="noStrike" cap="none" spc="0" baseline="0">
+                <a:solidFill>
+                  <a:srgbClr val="53585F"/>
+                </a:solidFill>
+                <a:uFillTx/>
+                <a:latin typeface="Proxima Nova"/>
+                <a:ea typeface="Proxima Nova"/>
+                <a:cs typeface="Proxima Nova"/>
+                <a:sym typeface="Proxima Nova"/>
+              </a:defRPr>
+            </a:lvl7pPr>
+            <a:lvl8pPr marL="5486400" marR="0" indent="-685800" algn="l" defTabSz="584200" rtl="0" latinLnBrk="0">
+              <a:lnSpc>
+                <a:spcPct val="80000"/>
+              </a:lnSpc>
+              <a:spcBef>
+                <a:spcPts val="2400"/>
+              </a:spcBef>
+              <a:spcAft>
+                <a:spcPts val="0"/>
+              </a:spcAft>
+              <a:buClr>
+                <a:srgbClr val="57BEF0"/>
+              </a:buClr>
+              <a:buSzPct val="250000"/>
+              <a:buFontTx/>
+              <a:buChar char="-"/>
+              <a:tabLst/>
+              <a:defRPr sz="4200" b="1" i="0" u="none" strike="noStrike" cap="none" spc="0" baseline="0">
+                <a:solidFill>
+                  <a:srgbClr val="53585F"/>
+                </a:solidFill>
+                <a:uFillTx/>
+                <a:latin typeface="Proxima Nova"/>
+                <a:ea typeface="Proxima Nova"/>
+                <a:cs typeface="Proxima Nova"/>
+                <a:sym typeface="Proxima Nova"/>
+              </a:defRPr>
+            </a:lvl8pPr>
+            <a:lvl9pPr marL="6172200" marR="0" indent="-685800" algn="l" defTabSz="584200" rtl="0" latinLnBrk="0">
+              <a:lnSpc>
+                <a:spcPct val="80000"/>
+              </a:lnSpc>
+              <a:spcBef>
+                <a:spcPts val="2400"/>
+              </a:spcBef>
+              <a:spcAft>
+                <a:spcPts val="0"/>
+              </a:spcAft>
+              <a:buClr>
+                <a:srgbClr val="57BEF0"/>
+              </a:buClr>
+              <a:buSzPct val="250000"/>
+              <a:buFontTx/>
+              <a:buChar char="-"/>
+              <a:tabLst/>
+              <a:defRPr sz="4200" b="1" i="0" u="none" strike="noStrike" cap="none" spc="0" baseline="0">
+                <a:solidFill>
+                  <a:srgbClr val="53585F"/>
+                </a:solidFill>
+                <a:uFillTx/>
+                <a:latin typeface="Proxima Nova"/>
+                <a:ea typeface="Proxima Nova"/>
+                <a:cs typeface="Proxima Nova"/>
+                <a:sym typeface="Proxima Nova"/>
+              </a:defRPr>
+            </a:lvl9pPr>
+          </a:lstStyle>
+          <a:p>
+            <a:pPr defTabSz="344677" hangingPunct="1">
+              <a:defRPr sz="3775"/>
+            </a:pPr>
+            <a:r>
+              <a:rPr lang="en-GB" sz="6600" b="1" dirty="0">
+                <a:solidFill>
+                  <a:srgbClr val="FFFFFF"/>
+                </a:solidFill>
+              </a:rPr>
+              <a:t>Telephone (IVR) phishing</a:t>
             </a:r>
           </a:p>
         </p:txBody>

</xml_diff>

<commit_message>
added Brute Force & DoS
</commit_message>
<xml_diff>
--- a/Y10/Attacks/AttacksPresentation.pptx
+++ b/Y10/Attacks/AttacksPresentation.pptx
@@ -5,7 +5,7 @@
     <p:sldMasterId id="2147483648" r:id="rId1"/>
   </p:sldMasterIdLst>
   <p:notesMasterIdLst>
-    <p:notesMasterId r:id="rId15"/>
+    <p:notesMasterId r:id="rId11"/>
   </p:notesMasterIdLst>
   <p:sldIdLst>
     <p:sldId id="256" r:id="rId2"/>
@@ -13,14 +13,10 @@
     <p:sldId id="267" r:id="rId4"/>
     <p:sldId id="268" r:id="rId5"/>
     <p:sldId id="257" r:id="rId6"/>
-    <p:sldId id="258" r:id="rId7"/>
-    <p:sldId id="259" r:id="rId8"/>
-    <p:sldId id="260" r:id="rId9"/>
-    <p:sldId id="261" r:id="rId10"/>
-    <p:sldId id="262" r:id="rId11"/>
-    <p:sldId id="263" r:id="rId12"/>
-    <p:sldId id="264" r:id="rId13"/>
-    <p:sldId id="265" r:id="rId14"/>
+    <p:sldId id="269" r:id="rId7"/>
+    <p:sldId id="270" r:id="rId8"/>
+    <p:sldId id="271" r:id="rId9"/>
+    <p:sldId id="272" r:id="rId10"/>
   </p:sldIdLst>
   <p:sldSz cx="24384000" cy="13716000"/>
   <p:notesSz cx="9144000" cy="6858000"/>
@@ -579,292 +575,6 @@
 </p:notes>
 </file>
 
-<file path=ppt/notesSlides/notesSlide10.xml><?xml version="1.0" encoding="utf-8"?>
-<p:notes xmlns:a="http://schemas.openxmlformats.org/drawingml/2006/main" xmlns:r="http://schemas.openxmlformats.org/officeDocument/2006/relationships" xmlns:p="http://schemas.openxmlformats.org/presentationml/2006/main">
-  <p:cSld>
-    <p:spTree>
-      <p:nvGrpSpPr>
-        <p:cNvPr id="1" name=""/>
-        <p:cNvGrpSpPr/>
-        <p:nvPr/>
-      </p:nvGrpSpPr>
-      <p:grpSpPr>
-        <a:xfrm>
-          <a:off x="0" y="0"/>
-          <a:ext cx="0" cy="0"/>
-          <a:chOff x="0" y="0"/>
-          <a:chExt cx="0" cy="0"/>
-        </a:xfrm>
-      </p:grpSpPr>
-      <p:sp>
-        <p:nvSpPr>
-          <p:cNvPr id="201" name="Shape 201"/>
-          <p:cNvSpPr>
-            <a:spLocks noGrp="1" noRot="1" noChangeAspect="1"/>
-          </p:cNvSpPr>
-          <p:nvPr>
-            <p:ph type="sldImg"/>
-          </p:nvPr>
-        </p:nvSpPr>
-        <p:spPr>
-          <a:xfrm>
-            <a:off x="2286000" y="514350"/>
-            <a:ext cx="4572000" cy="2571750"/>
-          </a:xfrm>
-          <a:prstGeom prst="rect">
-            <a:avLst/>
-          </a:prstGeom>
-        </p:spPr>
-        <p:txBody>
-          <a:bodyPr/>
-          <a:lstStyle/>
-          <a:p>
-            <a:endParaRPr/>
-          </a:p>
-        </p:txBody>
-      </p:sp>
-      <p:sp>
-        <p:nvSpPr>
-          <p:cNvPr id="202" name="Shape 202"/>
-          <p:cNvSpPr>
-            <a:spLocks noGrp="1"/>
-          </p:cNvSpPr>
-          <p:nvPr>
-            <p:ph type="body" sz="quarter" idx="1"/>
-          </p:nvPr>
-        </p:nvSpPr>
-        <p:spPr>
-          <a:prstGeom prst="rect">
-            <a:avLst/>
-          </a:prstGeom>
-        </p:spPr>
-        <p:txBody>
-          <a:bodyPr/>
-          <a:lstStyle/>
-          <a:p>
-            <a:pPr marL="342900" indent="-342900">
-              <a:buFontTx/>
-              <a:buChar char="-"/>
-            </a:pPr>
-            <a:endParaRPr dirty="0"/>
-          </a:p>
-        </p:txBody>
-      </p:sp>
-    </p:spTree>
-  </p:cSld>
-  <p:clrMapOvr>
-    <a:masterClrMapping/>
-  </p:clrMapOvr>
-</p:notes>
-</file>
-
-<file path=ppt/notesSlides/notesSlide11.xml><?xml version="1.0" encoding="utf-8"?>
-<p:notes xmlns:a="http://schemas.openxmlformats.org/drawingml/2006/main" xmlns:r="http://schemas.openxmlformats.org/officeDocument/2006/relationships" xmlns:p="http://schemas.openxmlformats.org/presentationml/2006/main">
-  <p:cSld>
-    <p:spTree>
-      <p:nvGrpSpPr>
-        <p:cNvPr id="1" name=""/>
-        <p:cNvGrpSpPr/>
-        <p:nvPr/>
-      </p:nvGrpSpPr>
-      <p:grpSpPr>
-        <a:xfrm>
-          <a:off x="0" y="0"/>
-          <a:ext cx="0" cy="0"/>
-          <a:chOff x="0" y="0"/>
-          <a:chExt cx="0" cy="0"/>
-        </a:xfrm>
-      </p:grpSpPr>
-      <p:sp>
-        <p:nvSpPr>
-          <p:cNvPr id="210" name="Shape 210"/>
-          <p:cNvSpPr>
-            <a:spLocks noGrp="1" noRot="1" noChangeAspect="1"/>
-          </p:cNvSpPr>
-          <p:nvPr>
-            <p:ph type="sldImg"/>
-          </p:nvPr>
-        </p:nvSpPr>
-        <p:spPr>
-          <a:xfrm>
-            <a:off x="2286000" y="514350"/>
-            <a:ext cx="4572000" cy="2571750"/>
-          </a:xfrm>
-          <a:prstGeom prst="rect">
-            <a:avLst/>
-          </a:prstGeom>
-        </p:spPr>
-        <p:txBody>
-          <a:bodyPr/>
-          <a:lstStyle/>
-          <a:p>
-            <a:endParaRPr/>
-          </a:p>
-        </p:txBody>
-      </p:sp>
-      <p:sp>
-        <p:nvSpPr>
-          <p:cNvPr id="211" name="Shape 211"/>
-          <p:cNvSpPr>
-            <a:spLocks noGrp="1"/>
-          </p:cNvSpPr>
-          <p:nvPr>
-            <p:ph type="body" sz="quarter" idx="1"/>
-          </p:nvPr>
-        </p:nvSpPr>
-        <p:spPr>
-          <a:prstGeom prst="rect">
-            <a:avLst/>
-          </a:prstGeom>
-        </p:spPr>
-        <p:txBody>
-          <a:bodyPr/>
-          <a:lstStyle/>
-          <a:p>
-            <a:endParaRPr dirty="0"/>
-          </a:p>
-        </p:txBody>
-      </p:sp>
-    </p:spTree>
-  </p:cSld>
-  <p:clrMapOvr>
-    <a:masterClrMapping/>
-  </p:clrMapOvr>
-</p:notes>
-</file>
-
-<file path=ppt/notesSlides/notesSlide12.xml><?xml version="1.0" encoding="utf-8"?>
-<p:notes xmlns:a="http://schemas.openxmlformats.org/drawingml/2006/main" xmlns:r="http://schemas.openxmlformats.org/officeDocument/2006/relationships" xmlns:p="http://schemas.openxmlformats.org/presentationml/2006/main">
-  <p:cSld>
-    <p:spTree>
-      <p:nvGrpSpPr>
-        <p:cNvPr id="1" name=""/>
-        <p:cNvGrpSpPr/>
-        <p:nvPr/>
-      </p:nvGrpSpPr>
-      <p:grpSpPr>
-        <a:xfrm>
-          <a:off x="0" y="0"/>
-          <a:ext cx="0" cy="0"/>
-          <a:chOff x="0" y="0"/>
-          <a:chExt cx="0" cy="0"/>
-        </a:xfrm>
-      </p:grpSpPr>
-      <p:sp>
-        <p:nvSpPr>
-          <p:cNvPr id="2" name="Slide Image Placeholder 1"/>
-          <p:cNvSpPr>
-            <a:spLocks noGrp="1" noRot="1" noChangeAspect="1"/>
-          </p:cNvSpPr>
-          <p:nvPr>
-            <p:ph type="sldImg"/>
-          </p:nvPr>
-        </p:nvSpPr>
-        <p:spPr>
-          <a:xfrm>
-            <a:off x="2286000" y="514350"/>
-            <a:ext cx="4572000" cy="2571750"/>
-          </a:xfrm>
-        </p:spPr>
-      </p:sp>
-      <p:sp>
-        <p:nvSpPr>
-          <p:cNvPr id="3" name="Notes Placeholder 2"/>
-          <p:cNvSpPr>
-            <a:spLocks noGrp="1"/>
-          </p:cNvSpPr>
-          <p:nvPr>
-            <p:ph type="body" idx="1"/>
-          </p:nvPr>
-        </p:nvSpPr>
-        <p:spPr/>
-        <p:txBody>
-          <a:bodyPr/>
-          <a:lstStyle/>
-          <a:p>
-            <a:endParaRPr lang="en-US"/>
-          </a:p>
-        </p:txBody>
-      </p:sp>
-    </p:spTree>
-    <p:extLst>
-      <p:ext uri="{BB962C8B-B14F-4D97-AF65-F5344CB8AC3E}">
-        <p14:creationId xmlns:p14="http://schemas.microsoft.com/office/powerpoint/2010/main" val="2065978375"/>
-      </p:ext>
-    </p:extLst>
-  </p:cSld>
-  <p:clrMapOvr>
-    <a:masterClrMapping/>
-  </p:clrMapOvr>
-</p:notes>
-</file>
-
-<file path=ppt/notesSlides/notesSlide13.xml><?xml version="1.0" encoding="utf-8"?>
-<p:notes xmlns:a="http://schemas.openxmlformats.org/drawingml/2006/main" xmlns:r="http://schemas.openxmlformats.org/officeDocument/2006/relationships" xmlns:p="http://schemas.openxmlformats.org/presentationml/2006/main">
-  <p:cSld>
-    <p:spTree>
-      <p:nvGrpSpPr>
-        <p:cNvPr id="1" name=""/>
-        <p:cNvGrpSpPr/>
-        <p:nvPr/>
-      </p:nvGrpSpPr>
-      <p:grpSpPr>
-        <a:xfrm>
-          <a:off x="0" y="0"/>
-          <a:ext cx="0" cy="0"/>
-          <a:chOff x="0" y="0"/>
-          <a:chExt cx="0" cy="0"/>
-        </a:xfrm>
-      </p:grpSpPr>
-      <p:sp>
-        <p:nvSpPr>
-          <p:cNvPr id="2" name="Slide Image Placeholder 1"/>
-          <p:cNvSpPr>
-            <a:spLocks noGrp="1" noRot="1" noChangeAspect="1"/>
-          </p:cNvSpPr>
-          <p:nvPr>
-            <p:ph type="sldImg"/>
-          </p:nvPr>
-        </p:nvSpPr>
-        <p:spPr>
-          <a:xfrm>
-            <a:off x="2286000" y="514350"/>
-            <a:ext cx="4572000" cy="2571750"/>
-          </a:xfrm>
-        </p:spPr>
-      </p:sp>
-      <p:sp>
-        <p:nvSpPr>
-          <p:cNvPr id="3" name="Notes Placeholder 2"/>
-          <p:cNvSpPr>
-            <a:spLocks noGrp="1"/>
-          </p:cNvSpPr>
-          <p:nvPr>
-            <p:ph type="body" idx="1"/>
-          </p:nvPr>
-        </p:nvSpPr>
-        <p:spPr/>
-        <p:txBody>
-          <a:bodyPr/>
-          <a:lstStyle/>
-          <a:p>
-            <a:endParaRPr lang="en-US"/>
-          </a:p>
-        </p:txBody>
-      </p:sp>
-    </p:spTree>
-    <p:extLst>
-      <p:ext uri="{BB962C8B-B14F-4D97-AF65-F5344CB8AC3E}">
-        <p14:creationId xmlns:p14="http://schemas.microsoft.com/office/powerpoint/2010/main" val="1435227668"/>
-      </p:ext>
-    </p:extLst>
-  </p:cSld>
-  <p:clrMapOvr>
-    <a:masterClrMapping/>
-  </p:clrMapOvr>
-</p:notes>
-</file>
-
 <file path=ppt/notesSlides/notesSlide2.xml><?xml version="1.0" encoding="utf-8"?>
 <p:notes xmlns:a="http://schemas.openxmlformats.org/drawingml/2006/main" xmlns:r="http://schemas.openxmlformats.org/officeDocument/2006/relationships" xmlns:p="http://schemas.openxmlformats.org/presentationml/2006/main">
   <p:cSld>
@@ -1185,7 +895,7 @@
     </p:spTree>
     <p:extLst>
       <p:ext uri="{BB962C8B-B14F-4D97-AF65-F5344CB8AC3E}">
-        <p14:creationId xmlns:p14="http://schemas.microsoft.com/office/powerpoint/2010/main" val="1045556385"/>
+        <p14:creationId xmlns:p14="http://schemas.microsoft.com/office/powerpoint/2010/main" val="473569291"/>
       </p:ext>
     </p:extLst>
   </p:cSld>
@@ -1214,7 +924,7 @@
       </p:grpSpPr>
       <p:sp>
         <p:nvSpPr>
-          <p:cNvPr id="163" name="Shape 163"/>
+          <p:cNvPr id="2" name="Slide Image Placeholder 1"/>
           <p:cNvSpPr>
             <a:spLocks noGrp="1" noRot="1" noChangeAspect="1"/>
           </p:cNvSpPr>
@@ -1227,56 +937,33 @@
             <a:off x="2286000" y="514350"/>
             <a:ext cx="4572000" cy="2571750"/>
           </a:xfrm>
-          <a:prstGeom prst="rect">
-            <a:avLst/>
-          </a:prstGeom>
         </p:spPr>
-        <p:txBody>
-          <a:bodyPr/>
-          <a:lstStyle/>
-          <a:p>
-            <a:endParaRPr/>
-          </a:p>
-        </p:txBody>
       </p:sp>
       <p:sp>
         <p:nvSpPr>
-          <p:cNvPr id="164" name="Shape 164"/>
+          <p:cNvPr id="3" name="Notes Placeholder 2"/>
           <p:cNvSpPr>
             <a:spLocks noGrp="1"/>
           </p:cNvSpPr>
           <p:nvPr>
-            <p:ph type="body" sz="quarter" idx="1"/>
+            <p:ph type="body" idx="1"/>
           </p:nvPr>
         </p:nvSpPr>
-        <p:spPr>
-          <a:prstGeom prst="rect">
-            <a:avLst/>
-          </a:prstGeom>
-        </p:spPr>
+        <p:spPr/>
         <p:txBody>
           <a:bodyPr/>
-          <a:lstStyle>
-            <a:lvl1pPr>
-              <a:defRPr u="sng">
-                <a:hlinkClick r:id="rId3"/>
-              </a:defRPr>
-            </a:lvl1pPr>
-          </a:lstStyle>
-          <a:p>
-            <a:pPr>
-              <a:defRPr u="none"/>
-            </a:pPr>
-            <a:r>
-              <a:rPr u="sng">
-                <a:hlinkClick r:id="rId3"/>
-              </a:rPr>
-              <a:t>https://filestore.aqa.org.uk/resources/computing/AQA-75162-75172-ALI.PDF</a:t>
-            </a:r>
+          <a:lstStyle/>
+          <a:p>
+            <a:endParaRPr lang="en-US"/>
           </a:p>
         </p:txBody>
       </p:sp>
     </p:spTree>
+    <p:extLst>
+      <p:ext uri="{BB962C8B-B14F-4D97-AF65-F5344CB8AC3E}">
+        <p14:creationId xmlns:p14="http://schemas.microsoft.com/office/powerpoint/2010/main" val="3534540925"/>
+      </p:ext>
+    </p:extLst>
   </p:cSld>
   <p:clrMapOvr>
     <a:masterClrMapping/>
@@ -1303,7 +990,7 @@
       </p:grpSpPr>
       <p:sp>
         <p:nvSpPr>
-          <p:cNvPr id="176" name="Shape 176"/>
+          <p:cNvPr id="2" name="Slide Image Placeholder 1"/>
           <p:cNvSpPr>
             <a:spLocks noGrp="1" noRot="1" noChangeAspect="1"/>
           </p:cNvSpPr>
@@ -1316,42 +1003,33 @@
             <a:off x="2286000" y="514350"/>
             <a:ext cx="4572000" cy="2571750"/>
           </a:xfrm>
-          <a:prstGeom prst="rect">
-            <a:avLst/>
-          </a:prstGeom>
         </p:spPr>
-        <p:txBody>
-          <a:bodyPr/>
-          <a:lstStyle/>
-          <a:p>
-            <a:endParaRPr/>
-          </a:p>
-        </p:txBody>
       </p:sp>
       <p:sp>
         <p:nvSpPr>
-          <p:cNvPr id="177" name="Shape 177"/>
+          <p:cNvPr id="3" name="Notes Placeholder 2"/>
           <p:cNvSpPr>
             <a:spLocks noGrp="1"/>
           </p:cNvSpPr>
           <p:nvPr>
-            <p:ph type="body" sz="quarter" idx="1"/>
+            <p:ph type="body" idx="1"/>
           </p:nvPr>
         </p:nvSpPr>
-        <p:spPr>
-          <a:prstGeom prst="rect">
-            <a:avLst/>
-          </a:prstGeom>
-        </p:spPr>
+        <p:spPr/>
         <p:txBody>
           <a:bodyPr/>
           <a:lstStyle/>
           <a:p>
-            <a:endParaRPr dirty="0"/>
+            <a:endParaRPr lang="en-US"/>
           </a:p>
         </p:txBody>
       </p:sp>
     </p:spTree>
+    <p:extLst>
+      <p:ext uri="{BB962C8B-B14F-4D97-AF65-F5344CB8AC3E}">
+        <p14:creationId xmlns:p14="http://schemas.microsoft.com/office/powerpoint/2010/main" val="1473269543"/>
+      </p:ext>
+    </p:extLst>
   </p:cSld>
   <p:clrMapOvr>
     <a:masterClrMapping/>
@@ -1415,7 +1093,7 @@
     </p:spTree>
     <p:extLst>
       <p:ext uri="{BB962C8B-B14F-4D97-AF65-F5344CB8AC3E}">
-        <p14:creationId xmlns:p14="http://schemas.microsoft.com/office/powerpoint/2010/main" val="1398533321"/>
+        <p14:creationId xmlns:p14="http://schemas.microsoft.com/office/powerpoint/2010/main" val="2325568671"/>
       </p:ext>
     </p:extLst>
   </p:cSld>
@@ -1720,197 +1398,6 @@
 
 <file path=ppt/slideLayouts/slideLayout10.xml><?xml version="1.0" encoding="utf-8"?>
 <p:sldLayout xmlns:a="http://schemas.openxmlformats.org/drawingml/2006/main" xmlns:r="http://schemas.openxmlformats.org/officeDocument/2006/relationships" xmlns:p="http://schemas.openxmlformats.org/presentationml/2006/main" type="tx">
-  <p:cSld name="Statement">
-    <p:bg>
-      <p:bgPr>
-        <a:solidFill>
-          <a:schemeClr val="accent6"/>
-        </a:solidFill>
-        <a:effectLst/>
-      </p:bgPr>
-    </p:bg>
-    <p:spTree>
-      <p:nvGrpSpPr>
-        <p:cNvPr id="1" name=""/>
-        <p:cNvGrpSpPr/>
-        <p:nvPr/>
-      </p:nvGrpSpPr>
-      <p:grpSpPr>
-        <a:xfrm>
-          <a:off x="0" y="0"/>
-          <a:ext cx="0" cy="0"/>
-          <a:chOff x="0" y="0"/>
-          <a:chExt cx="0" cy="0"/>
-        </a:xfrm>
-      </p:grpSpPr>
-      <p:sp>
-        <p:nvSpPr>
-          <p:cNvPr id="97" name="Body Level One…"/>
-          <p:cNvSpPr txBox="1">
-            <a:spLocks noGrp="1"/>
-          </p:cNvSpPr>
-          <p:nvPr>
-            <p:ph type="body" sz="half" idx="1" hasCustomPrompt="1"/>
-          </p:nvPr>
-        </p:nvSpPr>
-        <p:spPr>
-          <a:xfrm>
-            <a:off x="1219200" y="4763675"/>
-            <a:ext cx="21945600" cy="4192883"/>
-          </a:xfrm>
-          <a:prstGeom prst="rect">
-            <a:avLst/>
-          </a:prstGeom>
-        </p:spPr>
-        <p:txBody>
-          <a:bodyPr anchor="ctr"/>
-          <a:lstStyle>
-            <a:lvl1pPr marL="0" indent="0" algn="ctr">
-              <a:spcBef>
-                <a:spcPts val="0"/>
-              </a:spcBef>
-              <a:buClrTx/>
-              <a:buSzTx/>
-              <a:buNone/>
-              <a:defRPr sz="14000" b="0" cap="all">
-                <a:solidFill>
-                  <a:srgbClr val="FFFFFF"/>
-                </a:solidFill>
-                <a:latin typeface="+mn-lt"/>
-                <a:ea typeface="+mn-ea"/>
-                <a:cs typeface="+mn-cs"/>
-                <a:sym typeface="Druk Medium"/>
-              </a:defRPr>
-            </a:lvl1pPr>
-            <a:lvl2pPr marL="0" indent="457200" algn="ctr">
-              <a:spcBef>
-                <a:spcPts val="0"/>
-              </a:spcBef>
-              <a:buClrTx/>
-              <a:buSzTx/>
-              <a:buNone/>
-              <a:defRPr sz="14000" b="0" cap="all">
-                <a:solidFill>
-                  <a:srgbClr val="FFFFFF"/>
-                </a:solidFill>
-                <a:latin typeface="+mn-lt"/>
-                <a:ea typeface="+mn-ea"/>
-                <a:cs typeface="+mn-cs"/>
-                <a:sym typeface="Druk Medium"/>
-              </a:defRPr>
-            </a:lvl2pPr>
-            <a:lvl3pPr marL="0" indent="914400" algn="ctr">
-              <a:spcBef>
-                <a:spcPts val="0"/>
-              </a:spcBef>
-              <a:buClrTx/>
-              <a:buSzTx/>
-              <a:buNone/>
-              <a:defRPr sz="14000" b="0" cap="all">
-                <a:solidFill>
-                  <a:srgbClr val="FFFFFF"/>
-                </a:solidFill>
-                <a:latin typeface="+mn-lt"/>
-                <a:ea typeface="+mn-ea"/>
-                <a:cs typeface="+mn-cs"/>
-                <a:sym typeface="Druk Medium"/>
-              </a:defRPr>
-            </a:lvl3pPr>
-            <a:lvl4pPr marL="0" indent="1371600" algn="ctr">
-              <a:spcBef>
-                <a:spcPts val="0"/>
-              </a:spcBef>
-              <a:buClrTx/>
-              <a:buSzTx/>
-              <a:buNone/>
-              <a:defRPr sz="14000" b="0" cap="all">
-                <a:solidFill>
-                  <a:srgbClr val="FFFFFF"/>
-                </a:solidFill>
-                <a:latin typeface="+mn-lt"/>
-                <a:ea typeface="+mn-ea"/>
-                <a:cs typeface="+mn-cs"/>
-                <a:sym typeface="Druk Medium"/>
-              </a:defRPr>
-            </a:lvl4pPr>
-            <a:lvl5pPr marL="0" indent="1828800" algn="ctr">
-              <a:spcBef>
-                <a:spcPts val="0"/>
-              </a:spcBef>
-              <a:buClrTx/>
-              <a:buSzTx/>
-              <a:buNone/>
-              <a:defRPr sz="14000" b="0" cap="all">
-                <a:solidFill>
-                  <a:srgbClr val="FFFFFF"/>
-                </a:solidFill>
-                <a:latin typeface="+mn-lt"/>
-                <a:ea typeface="+mn-ea"/>
-                <a:cs typeface="+mn-cs"/>
-                <a:sym typeface="Druk Medium"/>
-              </a:defRPr>
-            </a:lvl5pPr>
-          </a:lstStyle>
-          <a:p>
-            <a:r>
-              <a:t>Statement</a:t>
-            </a:r>
-          </a:p>
-          <a:p>
-            <a:pPr lvl="1"/>
-            <a:endParaRPr/>
-          </a:p>
-          <a:p>
-            <a:pPr lvl="2"/>
-            <a:endParaRPr/>
-          </a:p>
-          <a:p>
-            <a:pPr lvl="3"/>
-            <a:endParaRPr/>
-          </a:p>
-          <a:p>
-            <a:pPr lvl="4"/>
-            <a:endParaRPr/>
-          </a:p>
-        </p:txBody>
-      </p:sp>
-      <p:sp>
-        <p:nvSpPr>
-          <p:cNvPr id="98" name="Slide Number"/>
-          <p:cNvSpPr txBox="1">
-            <a:spLocks noGrp="1"/>
-          </p:cNvSpPr>
-          <p:nvPr>
-            <p:ph type="sldNum" sz="quarter" idx="2"/>
-          </p:nvPr>
-        </p:nvSpPr>
-        <p:spPr>
-          <a:prstGeom prst="rect">
-            <a:avLst/>
-          </a:prstGeom>
-        </p:spPr>
-        <p:txBody>
-          <a:bodyPr/>
-          <a:lstStyle/>
-          <a:p>
-            <a:fld id="{86CB4B4D-7CA3-9044-876B-883B54F8677D}" type="slidenum">
-              <a:t>‹#›</a:t>
-            </a:fld>
-            <a:endParaRPr/>
-          </a:p>
-        </p:txBody>
-      </p:sp>
-    </p:spTree>
-  </p:cSld>
-  <p:clrMapOvr>
-    <a:masterClrMapping/>
-  </p:clrMapOvr>
-  <p:transition spd="med"/>
-</p:sldLayout>
-</file>
-
-<file path=ppt/slideLayouts/slideLayout11.xml><?xml version="1.0" encoding="utf-8"?>
-<p:sldLayout xmlns:a="http://schemas.openxmlformats.org/drawingml/2006/main" xmlns:r="http://schemas.openxmlformats.org/officeDocument/2006/relationships" xmlns:p="http://schemas.openxmlformats.org/presentationml/2006/main" type="tx">
   <p:cSld name="Big Fact">
     <p:bg>
       <p:bgPr>
@@ -2165,7 +1652,7 @@
 </p:sldLayout>
 </file>
 
-<file path=ppt/slideLayouts/slideLayout12.xml><?xml version="1.0" encoding="utf-8"?>
+<file path=ppt/slideLayouts/slideLayout11.xml><?xml version="1.0" encoding="utf-8"?>
 <p:sldLayout xmlns:a="http://schemas.openxmlformats.org/drawingml/2006/main" xmlns:r="http://schemas.openxmlformats.org/officeDocument/2006/relationships" xmlns:p="http://schemas.openxmlformats.org/presentationml/2006/main" type="tx">
   <p:cSld name="Quote">
     <p:bg>
@@ -2406,7 +1893,7 @@
 </p:sldLayout>
 </file>
 
-<file path=ppt/slideLayouts/slideLayout13.xml><?xml version="1.0" encoding="utf-8"?>
+<file path=ppt/slideLayouts/slideLayout12.xml><?xml version="1.0" encoding="utf-8"?>
 <p:sldLayout xmlns:a="http://schemas.openxmlformats.org/drawingml/2006/main" xmlns:r="http://schemas.openxmlformats.org/officeDocument/2006/relationships" xmlns:p="http://schemas.openxmlformats.org/presentationml/2006/main" type="tx">
   <p:cSld name="Photo - 3 Up">
     <p:spTree>
@@ -2545,7 +2032,7 @@
 </p:sldLayout>
 </file>
 
-<file path=ppt/slideLayouts/slideLayout14.xml><?xml version="1.0" encoding="utf-8"?>
+<file path=ppt/slideLayouts/slideLayout13.xml><?xml version="1.0" encoding="utf-8"?>
 <p:sldLayout xmlns:a="http://schemas.openxmlformats.org/drawingml/2006/main" xmlns:r="http://schemas.openxmlformats.org/officeDocument/2006/relationships" xmlns:p="http://schemas.openxmlformats.org/presentationml/2006/main" type="tx">
   <p:cSld name="Photo">
     <p:spTree>
@@ -2594,58 +2081,6 @@
       <p:sp>
         <p:nvSpPr>
           <p:cNvPr id="134" name="Slide Number"/>
-          <p:cNvSpPr txBox="1">
-            <a:spLocks noGrp="1"/>
-          </p:cNvSpPr>
-          <p:nvPr>
-            <p:ph type="sldNum" sz="quarter" idx="2"/>
-          </p:nvPr>
-        </p:nvSpPr>
-        <p:spPr>
-          <a:prstGeom prst="rect">
-            <a:avLst/>
-          </a:prstGeom>
-        </p:spPr>
-        <p:txBody>
-          <a:bodyPr/>
-          <a:lstStyle/>
-          <a:p>
-            <a:fld id="{86CB4B4D-7CA3-9044-876B-883B54F8677D}" type="slidenum">
-              <a:t>‹#›</a:t>
-            </a:fld>
-            <a:endParaRPr/>
-          </a:p>
-        </p:txBody>
-      </p:sp>
-    </p:spTree>
-  </p:cSld>
-  <p:clrMapOvr>
-    <a:masterClrMapping/>
-  </p:clrMapOvr>
-  <p:transition spd="med"/>
-</p:sldLayout>
-</file>
-
-<file path=ppt/slideLayouts/slideLayout15.xml><?xml version="1.0" encoding="utf-8"?>
-<p:sldLayout xmlns:a="http://schemas.openxmlformats.org/drawingml/2006/main" xmlns:r="http://schemas.openxmlformats.org/officeDocument/2006/relationships" xmlns:p="http://schemas.openxmlformats.org/presentationml/2006/main" type="tx">
-  <p:cSld name="Blank">
-    <p:spTree>
-      <p:nvGrpSpPr>
-        <p:cNvPr id="1" name=""/>
-        <p:cNvGrpSpPr/>
-        <p:nvPr/>
-      </p:nvGrpSpPr>
-      <p:grpSpPr>
-        <a:xfrm>
-          <a:off x="0" y="0"/>
-          <a:ext cx="0" cy="0"/>
-          <a:chOff x="0" y="0"/>
-          <a:chExt cx="0" cy="0"/>
-        </a:xfrm>
-      </p:grpSpPr>
-      <p:sp>
-        <p:nvSpPr>
-          <p:cNvPr id="141" name="Slide Number"/>
           <p:cNvSpPr txBox="1">
             <a:spLocks noGrp="1"/>
           </p:cNvSpPr>
@@ -3315,124 +2750,6 @@
 
 <file path=ppt/slideLayouts/slideLayout4.xml><?xml version="1.0" encoding="utf-8"?>
 <p:sldLayout xmlns:a="http://schemas.openxmlformats.org/drawingml/2006/main" xmlns:r="http://schemas.openxmlformats.org/officeDocument/2006/relationships" xmlns:p="http://schemas.openxmlformats.org/presentationml/2006/main" type="tx">
-  <p:cSld name="Title &amp; Bullets">
-    <p:spTree>
-      <p:nvGrpSpPr>
-        <p:cNvPr id="1" name=""/>
-        <p:cNvGrpSpPr/>
-        <p:nvPr/>
-      </p:nvGrpSpPr>
-      <p:grpSpPr>
-        <a:xfrm>
-          <a:off x="0" y="0"/>
-          <a:ext cx="0" cy="0"/>
-          <a:chOff x="0" y="0"/>
-          <a:chExt cx="0" cy="0"/>
-        </a:xfrm>
-      </p:grpSpPr>
-      <p:sp>
-        <p:nvSpPr>
-          <p:cNvPr id="43" name="Body Level One…"/>
-          <p:cNvSpPr txBox="1">
-            <a:spLocks noGrp="1"/>
-          </p:cNvSpPr>
-          <p:nvPr>
-            <p:ph type="body" idx="1" hasCustomPrompt="1"/>
-          </p:nvPr>
-        </p:nvSpPr>
-        <p:spPr>
-          <a:prstGeom prst="rect">
-            <a:avLst/>
-          </a:prstGeom>
-        </p:spPr>
-        <p:txBody>
-          <a:bodyPr/>
-          <a:lstStyle/>
-          <a:p>
-            <a:r>
-              <a:t>Slide bullet text</a:t>
-            </a:r>
-          </a:p>
-          <a:p>
-            <a:pPr lvl="1"/>
-            <a:endParaRPr/>
-          </a:p>
-          <a:p>
-            <a:pPr lvl="2"/>
-            <a:endParaRPr/>
-          </a:p>
-          <a:p>
-            <a:pPr lvl="3"/>
-            <a:endParaRPr/>
-          </a:p>
-          <a:p>
-            <a:pPr lvl="4"/>
-            <a:endParaRPr/>
-          </a:p>
-        </p:txBody>
-      </p:sp>
-      <p:sp>
-        <p:nvSpPr>
-          <p:cNvPr id="44" name="Slide Title"/>
-          <p:cNvSpPr txBox="1">
-            <a:spLocks noGrp="1"/>
-          </p:cNvSpPr>
-          <p:nvPr>
-            <p:ph type="title" hasCustomPrompt="1"/>
-          </p:nvPr>
-        </p:nvSpPr>
-        <p:spPr>
-          <a:prstGeom prst="rect">
-            <a:avLst/>
-          </a:prstGeom>
-        </p:spPr>
-        <p:txBody>
-          <a:bodyPr/>
-          <a:lstStyle/>
-          <a:p>
-            <a:r>
-              <a:t>Slide Title</a:t>
-            </a:r>
-          </a:p>
-        </p:txBody>
-      </p:sp>
-      <p:sp>
-        <p:nvSpPr>
-          <p:cNvPr id="45" name="Slide Number"/>
-          <p:cNvSpPr txBox="1">
-            <a:spLocks noGrp="1"/>
-          </p:cNvSpPr>
-          <p:nvPr>
-            <p:ph type="sldNum" sz="quarter" idx="2"/>
-          </p:nvPr>
-        </p:nvSpPr>
-        <p:spPr>
-          <a:prstGeom prst="rect">
-            <a:avLst/>
-          </a:prstGeom>
-        </p:spPr>
-        <p:txBody>
-          <a:bodyPr/>
-          <a:lstStyle/>
-          <a:p>
-            <a:fld id="{86CB4B4D-7CA3-9044-876B-883B54F8677D}" type="slidenum">
-              <a:t>‹#›</a:t>
-            </a:fld>
-            <a:endParaRPr/>
-          </a:p>
-        </p:txBody>
-      </p:sp>
-    </p:spTree>
-  </p:cSld>
-  <p:clrMapOvr>
-    <a:masterClrMapping/>
-  </p:clrMapOvr>
-  <p:transition spd="med"/>
-</p:sldLayout>
-</file>
-
-<file path=ppt/slideLayouts/slideLayout5.xml><?xml version="1.0" encoding="utf-8"?>
-<p:sldLayout xmlns:a="http://schemas.openxmlformats.org/drawingml/2006/main" xmlns:r="http://schemas.openxmlformats.org/officeDocument/2006/relationships" xmlns:p="http://schemas.openxmlformats.org/presentationml/2006/main" type="tx">
   <p:cSld name="Bullets">
     <p:spTree>
       <p:nvGrpSpPr>
@@ -3524,7 +2841,7 @@
 </p:sldLayout>
 </file>
 
-<file path=ppt/slideLayouts/slideLayout6.xml><?xml version="1.0" encoding="utf-8"?>
+<file path=ppt/slideLayouts/slideLayout5.xml><?xml version="1.0" encoding="utf-8"?>
 <p:sldLayout xmlns:a="http://schemas.openxmlformats.org/drawingml/2006/main" xmlns:r="http://schemas.openxmlformats.org/officeDocument/2006/relationships" xmlns:p="http://schemas.openxmlformats.org/presentationml/2006/main" type="tx">
   <p:cSld name="Title, Bullets &amp; Photo">
     <p:spTree>
@@ -3772,7 +3089,7 @@
 </p:sldLayout>
 </file>
 
-<file path=ppt/slideLayouts/slideLayout7.xml><?xml version="1.0" encoding="utf-8"?>
+<file path=ppt/slideLayouts/slideLayout6.xml><?xml version="1.0" encoding="utf-8"?>
 <p:sldLayout xmlns:a="http://schemas.openxmlformats.org/drawingml/2006/main" xmlns:r="http://schemas.openxmlformats.org/officeDocument/2006/relationships" xmlns:p="http://schemas.openxmlformats.org/presentationml/2006/main" type="tx">
   <p:cSld name="Section">
     <p:bg>
@@ -3869,7 +3186,7 @@
 </p:sldLayout>
 </file>
 
-<file path=ppt/slideLayouts/slideLayout8.xml><?xml version="1.0" encoding="utf-8"?>
+<file path=ppt/slideLayouts/slideLayout7.xml><?xml version="1.0" encoding="utf-8"?>
 <p:sldLayout xmlns:a="http://schemas.openxmlformats.org/drawingml/2006/main" xmlns:r="http://schemas.openxmlformats.org/officeDocument/2006/relationships" xmlns:p="http://schemas.openxmlformats.org/presentationml/2006/main" type="tx">
   <p:cSld name="Title Only">
     <p:spTree>
@@ -3946,7 +3263,7 @@
 </p:sldLayout>
 </file>
 
-<file path=ppt/slideLayouts/slideLayout9.xml><?xml version="1.0" encoding="utf-8"?>
+<file path=ppt/slideLayouts/slideLayout8.xml><?xml version="1.0" encoding="utf-8"?>
 <p:sldLayout xmlns:a="http://schemas.openxmlformats.org/drawingml/2006/main" xmlns:r="http://schemas.openxmlformats.org/officeDocument/2006/relationships" xmlns:p="http://schemas.openxmlformats.org/presentationml/2006/main" type="tx">
   <p:cSld name="Agenda">
     <p:bg>
@@ -4133,6 +3450,197 @@
       <p:sp>
         <p:nvSpPr>
           <p:cNvPr id="90" name="Slide Number"/>
+          <p:cNvSpPr txBox="1">
+            <a:spLocks noGrp="1"/>
+          </p:cNvSpPr>
+          <p:nvPr>
+            <p:ph type="sldNum" sz="quarter" idx="2"/>
+          </p:nvPr>
+        </p:nvSpPr>
+        <p:spPr>
+          <a:prstGeom prst="rect">
+            <a:avLst/>
+          </a:prstGeom>
+        </p:spPr>
+        <p:txBody>
+          <a:bodyPr/>
+          <a:lstStyle/>
+          <a:p>
+            <a:fld id="{86CB4B4D-7CA3-9044-876B-883B54F8677D}" type="slidenum">
+              <a:t>‹#›</a:t>
+            </a:fld>
+            <a:endParaRPr/>
+          </a:p>
+        </p:txBody>
+      </p:sp>
+    </p:spTree>
+  </p:cSld>
+  <p:clrMapOvr>
+    <a:masterClrMapping/>
+  </p:clrMapOvr>
+  <p:transition spd="med"/>
+</p:sldLayout>
+</file>
+
+<file path=ppt/slideLayouts/slideLayout9.xml><?xml version="1.0" encoding="utf-8"?>
+<p:sldLayout xmlns:a="http://schemas.openxmlformats.org/drawingml/2006/main" xmlns:r="http://schemas.openxmlformats.org/officeDocument/2006/relationships" xmlns:p="http://schemas.openxmlformats.org/presentationml/2006/main" type="tx">
+  <p:cSld name="Statement">
+    <p:bg>
+      <p:bgPr>
+        <a:solidFill>
+          <a:schemeClr val="accent6"/>
+        </a:solidFill>
+        <a:effectLst/>
+      </p:bgPr>
+    </p:bg>
+    <p:spTree>
+      <p:nvGrpSpPr>
+        <p:cNvPr id="1" name=""/>
+        <p:cNvGrpSpPr/>
+        <p:nvPr/>
+      </p:nvGrpSpPr>
+      <p:grpSpPr>
+        <a:xfrm>
+          <a:off x="0" y="0"/>
+          <a:ext cx="0" cy="0"/>
+          <a:chOff x="0" y="0"/>
+          <a:chExt cx="0" cy="0"/>
+        </a:xfrm>
+      </p:grpSpPr>
+      <p:sp>
+        <p:nvSpPr>
+          <p:cNvPr id="97" name="Body Level One…"/>
+          <p:cNvSpPr txBox="1">
+            <a:spLocks noGrp="1"/>
+          </p:cNvSpPr>
+          <p:nvPr>
+            <p:ph type="body" sz="half" idx="1" hasCustomPrompt="1"/>
+          </p:nvPr>
+        </p:nvSpPr>
+        <p:spPr>
+          <a:xfrm>
+            <a:off x="1219200" y="4763675"/>
+            <a:ext cx="21945600" cy="4192883"/>
+          </a:xfrm>
+          <a:prstGeom prst="rect">
+            <a:avLst/>
+          </a:prstGeom>
+        </p:spPr>
+        <p:txBody>
+          <a:bodyPr anchor="ctr"/>
+          <a:lstStyle>
+            <a:lvl1pPr marL="0" indent="0" algn="ctr">
+              <a:spcBef>
+                <a:spcPts val="0"/>
+              </a:spcBef>
+              <a:buClrTx/>
+              <a:buSzTx/>
+              <a:buNone/>
+              <a:defRPr sz="14000" b="0" cap="all">
+                <a:solidFill>
+                  <a:srgbClr val="FFFFFF"/>
+                </a:solidFill>
+                <a:latin typeface="+mn-lt"/>
+                <a:ea typeface="+mn-ea"/>
+                <a:cs typeface="+mn-cs"/>
+                <a:sym typeface="Druk Medium"/>
+              </a:defRPr>
+            </a:lvl1pPr>
+            <a:lvl2pPr marL="0" indent="457200" algn="ctr">
+              <a:spcBef>
+                <a:spcPts val="0"/>
+              </a:spcBef>
+              <a:buClrTx/>
+              <a:buSzTx/>
+              <a:buNone/>
+              <a:defRPr sz="14000" b="0" cap="all">
+                <a:solidFill>
+                  <a:srgbClr val="FFFFFF"/>
+                </a:solidFill>
+                <a:latin typeface="+mn-lt"/>
+                <a:ea typeface="+mn-ea"/>
+                <a:cs typeface="+mn-cs"/>
+                <a:sym typeface="Druk Medium"/>
+              </a:defRPr>
+            </a:lvl2pPr>
+            <a:lvl3pPr marL="0" indent="914400" algn="ctr">
+              <a:spcBef>
+                <a:spcPts val="0"/>
+              </a:spcBef>
+              <a:buClrTx/>
+              <a:buSzTx/>
+              <a:buNone/>
+              <a:defRPr sz="14000" b="0" cap="all">
+                <a:solidFill>
+                  <a:srgbClr val="FFFFFF"/>
+                </a:solidFill>
+                <a:latin typeface="+mn-lt"/>
+                <a:ea typeface="+mn-ea"/>
+                <a:cs typeface="+mn-cs"/>
+                <a:sym typeface="Druk Medium"/>
+              </a:defRPr>
+            </a:lvl3pPr>
+            <a:lvl4pPr marL="0" indent="1371600" algn="ctr">
+              <a:spcBef>
+                <a:spcPts val="0"/>
+              </a:spcBef>
+              <a:buClrTx/>
+              <a:buSzTx/>
+              <a:buNone/>
+              <a:defRPr sz="14000" b="0" cap="all">
+                <a:solidFill>
+                  <a:srgbClr val="FFFFFF"/>
+                </a:solidFill>
+                <a:latin typeface="+mn-lt"/>
+                <a:ea typeface="+mn-ea"/>
+                <a:cs typeface="+mn-cs"/>
+                <a:sym typeface="Druk Medium"/>
+              </a:defRPr>
+            </a:lvl4pPr>
+            <a:lvl5pPr marL="0" indent="1828800" algn="ctr">
+              <a:spcBef>
+                <a:spcPts val="0"/>
+              </a:spcBef>
+              <a:buClrTx/>
+              <a:buSzTx/>
+              <a:buNone/>
+              <a:defRPr sz="14000" b="0" cap="all">
+                <a:solidFill>
+                  <a:srgbClr val="FFFFFF"/>
+                </a:solidFill>
+                <a:latin typeface="+mn-lt"/>
+                <a:ea typeface="+mn-ea"/>
+                <a:cs typeface="+mn-cs"/>
+                <a:sym typeface="Druk Medium"/>
+              </a:defRPr>
+            </a:lvl5pPr>
+          </a:lstStyle>
+          <a:p>
+            <a:r>
+              <a:t>Statement</a:t>
+            </a:r>
+          </a:p>
+          <a:p>
+            <a:pPr lvl="1"/>
+            <a:endParaRPr/>
+          </a:p>
+          <a:p>
+            <a:pPr lvl="2"/>
+            <a:endParaRPr/>
+          </a:p>
+          <a:p>
+            <a:pPr lvl="3"/>
+            <a:endParaRPr/>
+          </a:p>
+          <a:p>
+            <a:pPr lvl="4"/>
+            <a:endParaRPr/>
+          </a:p>
+        </p:txBody>
+      </p:sp>
+      <p:sp>
+        <p:nvSpPr>
+          <p:cNvPr id="98" name="Slide Number"/>
           <p:cNvSpPr txBox="1">
             <a:spLocks noGrp="1"/>
           </p:cNvSpPr>
@@ -4338,18 +3846,16 @@
     <p:sldLayoutId id="2147483649" r:id="rId1"/>
     <p:sldLayoutId id="2147483650" r:id="rId2"/>
     <p:sldLayoutId id="2147483651" r:id="rId3"/>
-    <p:sldLayoutId id="2147483652" r:id="rId4"/>
-    <p:sldLayoutId id="2147483653" r:id="rId5"/>
-    <p:sldLayoutId id="2147483654" r:id="rId6"/>
-    <p:sldLayoutId id="2147483655" r:id="rId7"/>
-    <p:sldLayoutId id="2147483656" r:id="rId8"/>
-    <p:sldLayoutId id="2147483657" r:id="rId9"/>
-    <p:sldLayoutId id="2147483658" r:id="rId10"/>
-    <p:sldLayoutId id="2147483659" r:id="rId11"/>
-    <p:sldLayoutId id="2147483660" r:id="rId12"/>
-    <p:sldLayoutId id="2147483661" r:id="rId13"/>
-    <p:sldLayoutId id="2147483662" r:id="rId14"/>
-    <p:sldLayoutId id="2147483663" r:id="rId15"/>
+    <p:sldLayoutId id="2147483653" r:id="rId4"/>
+    <p:sldLayoutId id="2147483654" r:id="rId5"/>
+    <p:sldLayoutId id="2147483655" r:id="rId6"/>
+    <p:sldLayoutId id="2147483656" r:id="rId7"/>
+    <p:sldLayoutId id="2147483657" r:id="rId8"/>
+    <p:sldLayoutId id="2147483658" r:id="rId9"/>
+    <p:sldLayoutId id="2147483659" r:id="rId10"/>
+    <p:sldLayoutId id="2147483660" r:id="rId11"/>
+    <p:sldLayoutId id="2147483661" r:id="rId12"/>
+    <p:sldLayoutId id="2147483662" r:id="rId13"/>
   </p:sldLayoutIdLst>
   <p:transition spd="med"/>
   <p:txStyles>
@@ -5188,1809 +4694,6 @@
 </p:sld>
 </file>
 
-<file path=ppt/slides/slide10.xml><?xml version="1.0" encoding="utf-8"?>
-<p:sld xmlns:a="http://schemas.openxmlformats.org/drawingml/2006/main" xmlns:r="http://schemas.openxmlformats.org/officeDocument/2006/relationships" xmlns:p="http://schemas.openxmlformats.org/presentationml/2006/main">
-  <p:cSld>
-    <p:spTree>
-      <p:nvGrpSpPr>
-        <p:cNvPr id="1" name=""/>
-        <p:cNvGrpSpPr/>
-        <p:nvPr/>
-      </p:nvGrpSpPr>
-      <p:grpSpPr>
-        <a:xfrm>
-          <a:off x="0" y="0"/>
-          <a:ext cx="0" cy="0"/>
-          <a:chOff x="0" y="0"/>
-          <a:chExt cx="0" cy="0"/>
-        </a:xfrm>
-      </p:grpSpPr>
-      <p:sp>
-        <p:nvSpPr>
-          <p:cNvPr id="186" name="WHILE  LOOPS"/>
-          <p:cNvSpPr txBox="1">
-            <a:spLocks noGrp="1"/>
-          </p:cNvSpPr>
-          <p:nvPr>
-            <p:ph type="title"/>
-          </p:nvPr>
-        </p:nvSpPr>
-        <p:spPr>
-          <a:prstGeom prst="rect">
-            <a:avLst/>
-          </a:prstGeom>
-        </p:spPr>
-        <p:txBody>
-          <a:bodyPr/>
-          <a:lstStyle/>
-          <a:p>
-            <a:r>
-              <a:rPr b="1" dirty="0"/>
-              <a:t>WHILE  LOOPS</a:t>
-            </a:r>
-          </a:p>
-        </p:txBody>
-      </p:sp>
-      <p:sp>
-        <p:nvSpPr>
-          <p:cNvPr id="187" name="Rounded Rectangle"/>
-          <p:cNvSpPr/>
-          <p:nvPr/>
-        </p:nvSpPr>
-        <p:spPr>
-          <a:xfrm>
-            <a:off x="1495804" y="3384668"/>
-            <a:ext cx="10833724" cy="8898465"/>
-          </a:xfrm>
-          <a:prstGeom prst="roundRect">
-            <a:avLst>
-              <a:gd name="adj" fmla="val 11402"/>
-            </a:avLst>
-          </a:prstGeom>
-          <a:solidFill>
-            <a:schemeClr val="accent4"/>
-          </a:solidFill>
-          <a:ln w="12700">
-            <a:miter lim="400000"/>
-          </a:ln>
-        </p:spPr>
-        <p:txBody>
-          <a:bodyPr lIns="50800" tIns="50800" rIns="50800" bIns="50800" anchor="ctr"/>
-          <a:lstStyle/>
-          <a:p>
-            <a:pPr>
-              <a:lnSpc>
-                <a:spcPct val="120000"/>
-              </a:lnSpc>
-              <a:defRPr sz="3000" cap="all">
-                <a:latin typeface="Proxima Nova Extrabold"/>
-                <a:ea typeface="Proxima Nova Extrabold"/>
-                <a:cs typeface="Proxima Nova Extrabold"/>
-                <a:sym typeface="Proxima Nova Extrabold"/>
-              </a:defRPr>
-            </a:pPr>
-            <a:endParaRPr/>
-          </a:p>
-        </p:txBody>
-      </p:sp>
-      <p:sp>
-        <p:nvSpPr>
-          <p:cNvPr id="189" name="while ...:…"/>
-          <p:cNvSpPr txBox="1"/>
-          <p:nvPr/>
-        </p:nvSpPr>
-        <p:spPr>
-          <a:xfrm>
-            <a:off x="4082551" y="4036381"/>
-            <a:ext cx="5601519" cy="1701801"/>
-          </a:xfrm>
-          <a:prstGeom prst="rect">
-            <a:avLst/>
-          </a:prstGeom>
-          <a:ln w="12700">
-            <a:miter lim="400000"/>
-          </a:ln>
-          <a:extLst>
-            <a:ext uri="{C572A759-6A51-4108-AA02-DFA0A04FC94B}">
-              <ma14:wrappingTextBoxFlag xmlns="" xmlns:m="http://schemas.openxmlformats.org/officeDocument/2006/math" xmlns:a14="http://schemas.microsoft.com/office/drawing/2010/main" xmlns:ma14="http://schemas.microsoft.com/office/mac/drawingml/2011/main" val="1"/>
-            </a:ext>
-          </a:extLst>
-        </p:spPr>
-        <p:txBody>
-          <a:bodyPr wrap="none" lIns="50800" tIns="50800" rIns="50800" bIns="50800" anchor="ctr">
-            <a:spAutoFit/>
-          </a:bodyPr>
-          <a:lstStyle>
-            <a:lvl1pPr algn="l">
-              <a:defRPr sz="5500" b="1">
-                <a:latin typeface="Courier New"/>
-                <a:ea typeface="Courier New"/>
-                <a:cs typeface="Courier New"/>
-                <a:sym typeface="Courier New"/>
-              </a:defRPr>
-            </a:lvl1pPr>
-            <a:lvl2pPr algn="l">
-              <a:defRPr sz="5500" b="1">
-                <a:latin typeface="Courier New"/>
-                <a:ea typeface="Courier New"/>
-                <a:cs typeface="Courier New"/>
-                <a:sym typeface="Courier New"/>
-              </a:defRPr>
-            </a:lvl2pPr>
-          </a:lstStyle>
-          <a:p>
-            <a:r>
-              <a:rPr dirty="0"/>
-              <a:t>while ...:</a:t>
-            </a:r>
-          </a:p>
-          <a:p>
-            <a:pPr lvl="1"/>
-            <a:r>
-              <a:rPr dirty="0"/>
-              <a:t># INNER CODE</a:t>
-            </a:r>
-          </a:p>
-        </p:txBody>
-      </p:sp>
-      <p:sp>
-        <p:nvSpPr>
-          <p:cNvPr id="191" name="Rounded Rectangle"/>
-          <p:cNvSpPr/>
-          <p:nvPr/>
-        </p:nvSpPr>
-        <p:spPr>
-          <a:xfrm>
-            <a:off x="13093177" y="3384668"/>
-            <a:ext cx="9761020" cy="8898465"/>
-          </a:xfrm>
-          <a:prstGeom prst="roundRect">
-            <a:avLst>
-              <a:gd name="adj" fmla="val 11402"/>
-            </a:avLst>
-          </a:prstGeom>
-          <a:solidFill>
-            <a:schemeClr val="accent4"/>
-          </a:solidFill>
-          <a:ln w="12700">
-            <a:miter lim="400000"/>
-          </a:ln>
-        </p:spPr>
-        <p:txBody>
-          <a:bodyPr lIns="50800" tIns="50800" rIns="50800" bIns="50800" anchor="ctr"/>
-          <a:lstStyle/>
-          <a:p>
-            <a:pPr>
-              <a:lnSpc>
-                <a:spcPct val="120000"/>
-              </a:lnSpc>
-              <a:defRPr sz="3000" cap="all">
-                <a:latin typeface="Proxima Nova Extrabold"/>
-                <a:ea typeface="Proxima Nova Extrabold"/>
-                <a:cs typeface="Proxima Nova Extrabold"/>
-                <a:sym typeface="Proxima Nova Extrabold"/>
-              </a:defRPr>
-            </a:pPr>
-            <a:endParaRPr/>
-          </a:p>
-        </p:txBody>
-      </p:sp>
-      <p:sp>
-        <p:nvSpPr>
-          <p:cNvPr id="192" name="while ...:…"/>
-          <p:cNvSpPr txBox="1"/>
-          <p:nvPr/>
-        </p:nvSpPr>
-        <p:spPr>
-          <a:xfrm>
-            <a:off x="15412505" y="4036381"/>
-            <a:ext cx="5601520" cy="1701801"/>
-          </a:xfrm>
-          <a:prstGeom prst="rect">
-            <a:avLst/>
-          </a:prstGeom>
-          <a:ln w="12700">
-            <a:miter lim="400000"/>
-          </a:ln>
-          <a:extLst>
-            <a:ext uri="{C572A759-6A51-4108-AA02-DFA0A04FC94B}">
-              <ma14:wrappingTextBoxFlag xmlns="" xmlns:m="http://schemas.openxmlformats.org/officeDocument/2006/math" xmlns:a14="http://schemas.microsoft.com/office/drawing/2010/main" xmlns:ma14="http://schemas.microsoft.com/office/mac/drawingml/2011/main" val="1"/>
-            </a:ext>
-          </a:extLst>
-        </p:spPr>
-        <p:txBody>
-          <a:bodyPr wrap="none" lIns="50800" tIns="50800" rIns="50800" bIns="50800" anchor="ctr">
-            <a:spAutoFit/>
-          </a:bodyPr>
-          <a:lstStyle>
-            <a:lvl1pPr algn="l">
-              <a:defRPr sz="5500" b="1">
-                <a:latin typeface="Courier New"/>
-                <a:ea typeface="Courier New"/>
-                <a:cs typeface="Courier New"/>
-                <a:sym typeface="Courier New"/>
-              </a:defRPr>
-            </a:lvl1pPr>
-            <a:lvl2pPr algn="l">
-              <a:defRPr sz="5500" b="1">
-                <a:latin typeface="Courier New"/>
-                <a:ea typeface="Courier New"/>
-                <a:cs typeface="Courier New"/>
-                <a:sym typeface="Courier New"/>
-              </a:defRPr>
-            </a:lvl2pPr>
-          </a:lstStyle>
-          <a:p>
-            <a:r>
-              <a:t>while ...:</a:t>
-            </a:r>
-          </a:p>
-          <a:p>
-            <a:pPr lvl="1"/>
-            <a:r>
-              <a:t># INNER CODE</a:t>
-            </a:r>
-          </a:p>
-        </p:txBody>
-      </p:sp>
-      <p:grpSp>
-        <p:nvGrpSpPr>
-          <p:cNvPr id="2" name="Group 1">
-            <a:extLst>
-              <a:ext uri="{FF2B5EF4-FFF2-40B4-BE49-F238E27FC236}">
-                <a16:creationId xmlns:a16="http://schemas.microsoft.com/office/drawing/2014/main" id="{5DE65689-2608-4718-1F4A-EE6DD32218EC}"/>
-              </a:ext>
-            </a:extLst>
-          </p:cNvPr>
-          <p:cNvGrpSpPr/>
-          <p:nvPr/>
-        </p:nvGrpSpPr>
-        <p:grpSpPr>
-          <a:xfrm>
-            <a:off x="1727638" y="6841679"/>
-            <a:ext cx="10249898" cy="4635501"/>
-            <a:chOff x="1727638" y="6841679"/>
-            <a:chExt cx="10249898" cy="4635501"/>
-          </a:xfrm>
-        </p:grpSpPr>
-        <p:sp>
-          <p:nvSpPr>
-            <p:cNvPr id="188" name="loopStart:…"/>
-            <p:cNvSpPr txBox="1"/>
-            <p:nvPr/>
-          </p:nvSpPr>
-          <p:spPr>
-            <a:xfrm>
-              <a:off x="2339968" y="6841679"/>
-              <a:ext cx="9145396" cy="4635501"/>
-            </a:xfrm>
-            <a:prstGeom prst="rect">
-              <a:avLst/>
-            </a:prstGeom>
-            <a:ln w="12700">
-              <a:miter lim="400000"/>
-            </a:ln>
-            <a:extLst>
-              <a:ext uri="{C572A759-6A51-4108-AA02-DFA0A04FC94B}">
-                <ma14:wrappingTextBoxFlag xmlns="" xmlns:m="http://schemas.openxmlformats.org/officeDocument/2006/math" xmlns:a14="http://schemas.microsoft.com/office/drawing/2010/main" xmlns:ma14="http://schemas.microsoft.com/office/mac/drawingml/2011/main" val="1"/>
-              </a:ext>
-            </a:extLst>
-          </p:spPr>
-          <p:txBody>
-            <a:bodyPr wrap="none" lIns="50800" tIns="50800" rIns="50800" bIns="50800" anchor="ctr">
-              <a:spAutoFit/>
-            </a:bodyPr>
-            <a:lstStyle/>
-            <a:p>
-              <a:pPr algn="l">
-                <a:defRPr sz="4500" b="1">
-                  <a:latin typeface="Courier New"/>
-                  <a:ea typeface="Courier New"/>
-                  <a:cs typeface="Courier New"/>
-                  <a:sym typeface="Courier New"/>
-                </a:defRPr>
-              </a:pPr>
-              <a:r>
-                <a:rPr dirty="0" err="1"/>
-                <a:t>loopStart</a:t>
-              </a:r>
-              <a:r>
-                <a:rPr dirty="0"/>
-                <a:t>:</a:t>
-              </a:r>
-            </a:p>
-            <a:p>
-              <a:pPr lvl="1" algn="l">
-                <a:defRPr sz="4500" b="1">
-                  <a:latin typeface="Courier New"/>
-                  <a:ea typeface="Courier New"/>
-                  <a:cs typeface="Courier New"/>
-                  <a:sym typeface="Courier New"/>
-                </a:defRPr>
-              </a:pPr>
-              <a:r>
-                <a:rPr dirty="0"/>
-                <a:t>CMP ...</a:t>
-              </a:r>
-            </a:p>
-            <a:p>
-              <a:pPr lvl="1" algn="l">
-                <a:defRPr sz="4500" b="1">
-                  <a:latin typeface="Courier New"/>
-                  <a:ea typeface="Courier New"/>
-                  <a:cs typeface="Courier New"/>
-                  <a:sym typeface="Courier New"/>
-                </a:defRPr>
-              </a:pPr>
-              <a:r>
-                <a:rPr dirty="0"/>
-                <a:t>B&lt;NOT Condition&gt; </a:t>
-              </a:r>
-              <a:r>
-                <a:rPr dirty="0" err="1"/>
-                <a:t>loopDone</a:t>
-              </a:r>
-              <a:endParaRPr dirty="0"/>
-            </a:p>
-            <a:p>
-              <a:pPr lvl="1" algn="l">
-                <a:defRPr sz="4500" b="1">
-                  <a:latin typeface="Courier New"/>
-                  <a:ea typeface="Courier New"/>
-                  <a:cs typeface="Courier New"/>
-                  <a:sym typeface="Courier New"/>
-                </a:defRPr>
-              </a:pPr>
-              <a:r>
-                <a:rPr dirty="0"/>
-                <a:t># Inner Code</a:t>
-              </a:r>
-            </a:p>
-            <a:p>
-              <a:pPr lvl="1" algn="l">
-                <a:defRPr sz="4500" b="1">
-                  <a:latin typeface="Courier New"/>
-                  <a:ea typeface="Courier New"/>
-                  <a:cs typeface="Courier New"/>
-                  <a:sym typeface="Courier New"/>
-                </a:defRPr>
-              </a:pPr>
-              <a:r>
-                <a:rPr dirty="0"/>
-                <a:t>B </a:t>
-              </a:r>
-              <a:r>
-                <a:rPr dirty="0" err="1"/>
-                <a:t>loopStart</a:t>
-              </a:r>
-              <a:endParaRPr dirty="0"/>
-            </a:p>
-            <a:p>
-              <a:pPr algn="l">
-                <a:defRPr sz="4500" b="1">
-                  <a:latin typeface="Courier New"/>
-                  <a:ea typeface="Courier New"/>
-                  <a:cs typeface="Courier New"/>
-                  <a:sym typeface="Courier New"/>
-                </a:defRPr>
-              </a:pPr>
-              <a:r>
-                <a:rPr dirty="0" err="1"/>
-                <a:t>loopDone</a:t>
-              </a:r>
-              <a:r>
-                <a:rPr dirty="0"/>
-                <a:t>:</a:t>
-              </a:r>
-            </a:p>
-            <a:p>
-              <a:pPr lvl="1" algn="l">
-                <a:defRPr sz="4500" b="1">
-                  <a:latin typeface="Courier New"/>
-                  <a:ea typeface="Courier New"/>
-                  <a:cs typeface="Courier New"/>
-                  <a:sym typeface="Courier New"/>
-                </a:defRPr>
-              </a:pPr>
-              <a:r>
-                <a:rPr dirty="0"/>
-                <a:t># After</a:t>
-              </a:r>
-            </a:p>
-          </p:txBody>
-        </p:sp>
-        <p:sp>
-          <p:nvSpPr>
-            <p:cNvPr id="197" name="Connection Line"/>
-            <p:cNvSpPr/>
-            <p:nvPr/>
-          </p:nvSpPr>
-          <p:spPr>
-            <a:xfrm>
-              <a:off x="1727638" y="8492187"/>
-              <a:ext cx="1044041" cy="1929768"/>
-            </a:xfrm>
-            <a:custGeom>
-              <a:avLst/>
-              <a:gdLst/>
-              <a:ahLst/>
-              <a:cxnLst>
-                <a:cxn ang="0">
-                  <a:pos x="wd2" y="hd2"/>
-                </a:cxn>
-                <a:cxn ang="5400000">
-                  <a:pos x="wd2" y="hd2"/>
-                </a:cxn>
-                <a:cxn ang="10800000">
-                  <a:pos x="wd2" y="hd2"/>
-                </a:cxn>
-                <a:cxn ang="16200000">
-                  <a:pos x="wd2" y="hd2"/>
-                </a:cxn>
-              </a:cxnLst>
-              <a:rect l="0" t="0" r="r" b="b"/>
-              <a:pathLst>
-                <a:path w="16532" h="21600" extrusionOk="0">
-                  <a:moveTo>
-                    <a:pt x="16532" y="0"/>
-                  </a:moveTo>
-                  <a:cubicBezTo>
-                    <a:pt x="-2387" y="3818"/>
-                    <a:pt x="-5068" y="11018"/>
-                    <a:pt x="8488" y="21600"/>
-                  </a:cubicBezTo>
-                </a:path>
-              </a:pathLst>
-            </a:custGeom>
-            <a:ln w="101600">
-              <a:solidFill>
-                <a:schemeClr val="accent5"/>
-              </a:solidFill>
-              <a:miter lim="400000"/>
-              <a:tailEnd type="triangle"/>
-            </a:ln>
-          </p:spPr>
-          <p:txBody>
-            <a:bodyPr/>
-            <a:lstStyle/>
-            <a:p>
-              <a:endParaRPr/>
-            </a:p>
-          </p:txBody>
-        </p:sp>
-        <p:sp>
-          <p:nvSpPr>
-            <p:cNvPr id="198" name="Connection Line"/>
-            <p:cNvSpPr/>
-            <p:nvPr/>
-          </p:nvSpPr>
-          <p:spPr>
-            <a:xfrm>
-              <a:off x="6273800" y="7188200"/>
-              <a:ext cx="5703736" cy="2575178"/>
-            </a:xfrm>
-            <a:custGeom>
-              <a:avLst/>
-              <a:gdLst/>
-              <a:ahLst/>
-              <a:cxnLst>
-                <a:cxn ang="0">
-                  <a:pos x="wd2" y="hd2"/>
-                </a:cxn>
-                <a:cxn ang="5400000">
-                  <a:pos x="wd2" y="hd2"/>
-                </a:cxn>
-                <a:cxn ang="10800000">
-                  <a:pos x="wd2" y="hd2"/>
-                </a:cxn>
-                <a:cxn ang="16200000">
-                  <a:pos x="wd2" y="hd2"/>
-                </a:cxn>
-              </a:cxnLst>
-              <a:rect l="0" t="0" r="r" b="b"/>
-              <a:pathLst>
-                <a:path w="16228" h="21600" extrusionOk="0">
-                  <a:moveTo>
-                    <a:pt x="2565" y="21600"/>
-                  </a:moveTo>
-                  <a:cubicBezTo>
-                    <a:pt x="21600" y="14702"/>
-                    <a:pt x="20745" y="7502"/>
-                    <a:pt x="0" y="0"/>
-                  </a:cubicBezTo>
-                </a:path>
-              </a:pathLst>
-            </a:custGeom>
-            <a:ln w="101600">
-              <a:solidFill>
-                <a:schemeClr val="accent2">
-                  <a:hueOff val="312616"/>
-                  <a:satOff val="21048"/>
-                  <a:lumOff val="-29411"/>
-                </a:schemeClr>
-              </a:solidFill>
-              <a:miter lim="400000"/>
-              <a:tailEnd type="triangle"/>
-            </a:ln>
-          </p:spPr>
-          <p:txBody>
-            <a:bodyPr/>
-            <a:lstStyle/>
-            <a:p>
-              <a:endParaRPr/>
-            </a:p>
-          </p:txBody>
-        </p:sp>
-      </p:grpSp>
-      <p:grpSp>
-        <p:nvGrpSpPr>
-          <p:cNvPr id="3" name="Group 2">
-            <a:extLst>
-              <a:ext uri="{FF2B5EF4-FFF2-40B4-BE49-F238E27FC236}">
-                <a16:creationId xmlns:a16="http://schemas.microsoft.com/office/drawing/2014/main" id="{3483BA19-D589-517A-4E0A-3A81FCA7F798}"/>
-              </a:ext>
-            </a:extLst>
-          </p:cNvPr>
-          <p:cNvGrpSpPr/>
-          <p:nvPr/>
-        </p:nvGrpSpPr>
-        <p:grpSpPr>
-          <a:xfrm>
-            <a:off x="13730253" y="6841679"/>
-            <a:ext cx="8796349" cy="4635501"/>
-            <a:chOff x="13730253" y="6841679"/>
-            <a:chExt cx="8796349" cy="4635501"/>
-          </a:xfrm>
-        </p:grpSpPr>
-        <p:sp>
-          <p:nvSpPr>
-            <p:cNvPr id="194" name="B test…"/>
-            <p:cNvSpPr txBox="1"/>
-            <p:nvPr/>
-          </p:nvSpPr>
-          <p:spPr>
-            <a:xfrm>
-              <a:off x="14497956" y="6841679"/>
-              <a:ext cx="7430618" cy="4635501"/>
-            </a:xfrm>
-            <a:prstGeom prst="rect">
-              <a:avLst/>
-            </a:prstGeom>
-            <a:ln w="12700">
-              <a:miter lim="400000"/>
-            </a:ln>
-            <a:extLst>
-              <a:ext uri="{C572A759-6A51-4108-AA02-DFA0A04FC94B}">
-                <ma14:wrappingTextBoxFlag xmlns="" xmlns:m="http://schemas.openxmlformats.org/officeDocument/2006/math" xmlns:a14="http://schemas.microsoft.com/office/drawing/2010/main" xmlns:ma14="http://schemas.microsoft.com/office/mac/drawingml/2011/main" val="1"/>
-              </a:ext>
-            </a:extLst>
-          </p:spPr>
-          <p:txBody>
-            <a:bodyPr wrap="none" lIns="50800" tIns="50800" rIns="50800" bIns="50800" anchor="ctr">
-              <a:spAutoFit/>
-            </a:bodyPr>
-            <a:lstStyle/>
-            <a:p>
-              <a:pPr lvl="1" algn="l">
-                <a:defRPr sz="4500" b="1">
-                  <a:latin typeface="Courier New"/>
-                  <a:ea typeface="Courier New"/>
-                  <a:cs typeface="Courier New"/>
-                  <a:sym typeface="Courier New"/>
-                </a:defRPr>
-              </a:pPr>
-              <a:r>
-                <a:rPr dirty="0"/>
-                <a:t>B test</a:t>
-              </a:r>
-            </a:p>
-            <a:p>
-              <a:pPr algn="l">
-                <a:defRPr sz="4500" b="1">
-                  <a:latin typeface="Courier New"/>
-                  <a:ea typeface="Courier New"/>
-                  <a:cs typeface="Courier New"/>
-                  <a:sym typeface="Courier New"/>
-                </a:defRPr>
-              </a:pPr>
-              <a:r>
-                <a:rPr dirty="0" err="1"/>
-                <a:t>loopTop</a:t>
-              </a:r>
-              <a:r>
-                <a:rPr dirty="0"/>
-                <a:t>:</a:t>
-              </a:r>
-            </a:p>
-            <a:p>
-              <a:pPr lvl="1" algn="l">
-                <a:defRPr sz="4500" b="1">
-                  <a:latin typeface="Courier New"/>
-                  <a:ea typeface="Courier New"/>
-                  <a:cs typeface="Courier New"/>
-                  <a:sym typeface="Courier New"/>
-                </a:defRPr>
-              </a:pPr>
-              <a:r>
-                <a:rPr dirty="0"/>
-                <a:t># Inner Code</a:t>
-              </a:r>
-            </a:p>
-            <a:p>
-              <a:pPr algn="l">
-                <a:defRPr sz="4500" b="1">
-                  <a:latin typeface="Courier New"/>
-                  <a:ea typeface="Courier New"/>
-                  <a:cs typeface="Courier New"/>
-                  <a:sym typeface="Courier New"/>
-                </a:defRPr>
-              </a:pPr>
-              <a:r>
-                <a:rPr dirty="0"/>
-                <a:t>test:</a:t>
-              </a:r>
-            </a:p>
-            <a:p>
-              <a:pPr lvl="1" algn="l">
-                <a:defRPr sz="4500" b="1">
-                  <a:latin typeface="Courier New"/>
-                  <a:ea typeface="Courier New"/>
-                  <a:cs typeface="Courier New"/>
-                  <a:sym typeface="Courier New"/>
-                </a:defRPr>
-              </a:pPr>
-              <a:r>
-                <a:rPr dirty="0"/>
-                <a:t>CMP …</a:t>
-              </a:r>
-            </a:p>
-            <a:p>
-              <a:pPr lvl="1" algn="l">
-                <a:defRPr sz="4500" b="1">
-                  <a:latin typeface="Courier New"/>
-                  <a:ea typeface="Courier New"/>
-                  <a:cs typeface="Courier New"/>
-                  <a:sym typeface="Courier New"/>
-                </a:defRPr>
-              </a:pPr>
-              <a:r>
-                <a:rPr dirty="0"/>
-                <a:t>B&lt;Condition&gt; </a:t>
-              </a:r>
-              <a:r>
-                <a:rPr dirty="0" err="1"/>
-                <a:t>loopTop</a:t>
-              </a:r>
-              <a:endParaRPr dirty="0"/>
-            </a:p>
-            <a:p>
-              <a:pPr lvl="1" algn="l">
-                <a:defRPr sz="4500" b="1">
-                  <a:latin typeface="Courier New"/>
-                  <a:ea typeface="Courier New"/>
-                  <a:cs typeface="Courier New"/>
-                  <a:sym typeface="Courier New"/>
-                </a:defRPr>
-              </a:pPr>
-              <a:r>
-                <a:rPr dirty="0"/>
-                <a:t># After Code</a:t>
-              </a:r>
-            </a:p>
-          </p:txBody>
-        </p:sp>
-        <p:sp>
-          <p:nvSpPr>
-            <p:cNvPr id="199" name="Connection Line"/>
-            <p:cNvSpPr/>
-            <p:nvPr/>
-          </p:nvSpPr>
-          <p:spPr>
-            <a:xfrm>
-              <a:off x="13730253" y="7201968"/>
-              <a:ext cx="973778" cy="2031369"/>
-            </a:xfrm>
-            <a:custGeom>
-              <a:avLst/>
-              <a:gdLst/>
-              <a:ahLst/>
-              <a:cxnLst>
-                <a:cxn ang="0">
-                  <a:pos x="wd2" y="hd2"/>
-                </a:cxn>
-                <a:cxn ang="5400000">
-                  <a:pos x="wd2" y="hd2"/>
-                </a:cxn>
-                <a:cxn ang="10800000">
-                  <a:pos x="wd2" y="hd2"/>
-                </a:cxn>
-                <a:cxn ang="16200000">
-                  <a:pos x="wd2" y="hd2"/>
-                </a:cxn>
-              </a:cxnLst>
-              <a:rect l="0" t="0" r="r" b="b"/>
-              <a:pathLst>
-                <a:path w="16430" h="21600" extrusionOk="0">
-                  <a:moveTo>
-                    <a:pt x="16430" y="0"/>
-                  </a:moveTo>
-                  <a:cubicBezTo>
-                    <a:pt x="-2884" y="5572"/>
-                    <a:pt x="-5170" y="12772"/>
-                    <a:pt x="9573" y="21600"/>
-                  </a:cubicBezTo>
-                </a:path>
-              </a:pathLst>
-            </a:custGeom>
-            <a:ln w="101600">
-              <a:solidFill>
-                <a:schemeClr val="accent5"/>
-              </a:solidFill>
-              <a:miter lim="400000"/>
-              <a:tailEnd type="triangle"/>
-            </a:ln>
-          </p:spPr>
-          <p:txBody>
-            <a:bodyPr/>
-            <a:lstStyle/>
-            <a:p>
-              <a:endParaRPr/>
-            </a:p>
-          </p:txBody>
-        </p:sp>
-        <p:sp>
-          <p:nvSpPr>
-            <p:cNvPr id="200" name="Connection Line"/>
-            <p:cNvSpPr/>
-            <p:nvPr/>
-          </p:nvSpPr>
-          <p:spPr>
-            <a:xfrm>
-              <a:off x="17526000" y="7874000"/>
-              <a:ext cx="5000602" cy="2586921"/>
-            </a:xfrm>
-            <a:custGeom>
-              <a:avLst/>
-              <a:gdLst/>
-              <a:ahLst/>
-              <a:cxnLst>
-                <a:cxn ang="0">
-                  <a:pos x="wd2" y="hd2"/>
-                </a:cxn>
-                <a:cxn ang="5400000">
-                  <a:pos x="wd2" y="hd2"/>
-                </a:cxn>
-                <a:cxn ang="10800000">
-                  <a:pos x="wd2" y="hd2"/>
-                </a:cxn>
-                <a:cxn ang="16200000">
-                  <a:pos x="wd2" y="hd2"/>
-                </a:cxn>
-              </a:cxnLst>
-              <a:rect l="0" t="0" r="r" b="b"/>
-              <a:pathLst>
-                <a:path w="18362" h="21600" extrusionOk="0">
-                  <a:moveTo>
-                    <a:pt x="16555" y="21600"/>
-                  </a:moveTo>
-                  <a:cubicBezTo>
-                    <a:pt x="21600" y="13036"/>
-                    <a:pt x="16082" y="5836"/>
-                    <a:pt x="0" y="0"/>
-                  </a:cubicBezTo>
-                </a:path>
-              </a:pathLst>
-            </a:custGeom>
-            <a:ln w="101600">
-              <a:solidFill>
-                <a:schemeClr val="accent2">
-                  <a:hueOff val="312616"/>
-                  <a:satOff val="21048"/>
-                  <a:lumOff val="-29411"/>
-                </a:schemeClr>
-              </a:solidFill>
-              <a:miter lim="400000"/>
-              <a:tailEnd type="triangle"/>
-            </a:ln>
-          </p:spPr>
-          <p:txBody>
-            <a:bodyPr/>
-            <a:lstStyle/>
-            <a:p>
-              <a:endParaRPr/>
-            </a:p>
-          </p:txBody>
-        </p:sp>
-      </p:grpSp>
-    </p:spTree>
-  </p:cSld>
-  <p:clrMapOvr>
-    <a:masterClrMapping/>
-  </p:clrMapOvr>
-  <p:transition spd="med"/>
-  <p:timing>
-    <p:tnLst>
-      <p:par>
-        <p:cTn id="1" dur="indefinite" restart="never" nodeType="tmRoot">
-          <p:childTnLst>
-            <p:seq concurrent="1" nextAc="seek">
-              <p:cTn id="2" dur="indefinite" nodeType="mainSeq">
-                <p:childTnLst>
-                  <p:par>
-                    <p:cTn id="3" fill="hold">
-                      <p:stCondLst>
-                        <p:cond delay="indefinite"/>
-                      </p:stCondLst>
-                      <p:childTnLst>
-                        <p:par>
-                          <p:cTn id="4" fill="hold">
-                            <p:stCondLst>
-                              <p:cond delay="0"/>
-                            </p:stCondLst>
-                            <p:childTnLst>
-                              <p:par>
-                                <p:cTn id="5" presetID="1" presetClass="entr" presetSubtype="0" fill="hold" nodeType="clickEffect">
-                                  <p:stCondLst>
-                                    <p:cond delay="0"/>
-                                  </p:stCondLst>
-                                  <p:childTnLst>
-                                    <p:set>
-                                      <p:cBhvr>
-                                        <p:cTn id="6" dur="1" fill="hold">
-                                          <p:stCondLst>
-                                            <p:cond delay="0"/>
-                                          </p:stCondLst>
-                                        </p:cTn>
-                                        <p:tgtEl>
-                                          <p:spTgt spid="2"/>
-                                        </p:tgtEl>
-                                        <p:attrNameLst>
-                                          <p:attrName>style.visibility</p:attrName>
-                                        </p:attrNameLst>
-                                      </p:cBhvr>
-                                      <p:to>
-                                        <p:strVal val="visible"/>
-                                      </p:to>
-                                    </p:set>
-                                  </p:childTnLst>
-                                </p:cTn>
-                              </p:par>
-                            </p:childTnLst>
-                          </p:cTn>
-                        </p:par>
-                      </p:childTnLst>
-                    </p:cTn>
-                  </p:par>
-                  <p:par>
-                    <p:cTn id="7" fill="hold">
-                      <p:stCondLst>
-                        <p:cond delay="indefinite"/>
-                      </p:stCondLst>
-                      <p:childTnLst>
-                        <p:par>
-                          <p:cTn id="8" fill="hold">
-                            <p:stCondLst>
-                              <p:cond delay="0"/>
-                            </p:stCondLst>
-                            <p:childTnLst>
-                              <p:par>
-                                <p:cTn id="9" presetID="1" presetClass="entr" presetSubtype="0" fill="hold" nodeType="clickEffect">
-                                  <p:stCondLst>
-                                    <p:cond delay="0"/>
-                                  </p:stCondLst>
-                                  <p:childTnLst>
-                                    <p:set>
-                                      <p:cBhvr>
-                                        <p:cTn id="10" dur="1" fill="hold">
-                                          <p:stCondLst>
-                                            <p:cond delay="0"/>
-                                          </p:stCondLst>
-                                        </p:cTn>
-                                        <p:tgtEl>
-                                          <p:spTgt spid="3"/>
-                                        </p:tgtEl>
-                                        <p:attrNameLst>
-                                          <p:attrName>style.visibility</p:attrName>
-                                        </p:attrNameLst>
-                                      </p:cBhvr>
-                                      <p:to>
-                                        <p:strVal val="visible"/>
-                                      </p:to>
-                                    </p:set>
-                                  </p:childTnLst>
-                                </p:cTn>
-                              </p:par>
-                            </p:childTnLst>
-                          </p:cTn>
-                        </p:par>
-                      </p:childTnLst>
-                    </p:cTn>
-                  </p:par>
-                </p:childTnLst>
-              </p:cTn>
-              <p:prevCondLst>
-                <p:cond evt="onPrev" delay="0">
-                  <p:tgtEl>
-                    <p:sldTgt/>
-                  </p:tgtEl>
-                </p:cond>
-              </p:prevCondLst>
-              <p:nextCondLst>
-                <p:cond evt="onNext" delay="0">
-                  <p:tgtEl>
-                    <p:sldTgt/>
-                  </p:tgtEl>
-                </p:cond>
-              </p:nextCondLst>
-            </p:seq>
-          </p:childTnLst>
-        </p:cTn>
-      </p:par>
-    </p:tnLst>
-  </p:timing>
-</p:sld>
-</file>
-
-<file path=ppt/slides/slide11.xml><?xml version="1.0" encoding="utf-8"?>
-<p:sld xmlns:a="http://schemas.openxmlformats.org/drawingml/2006/main" xmlns:r="http://schemas.openxmlformats.org/officeDocument/2006/relationships" xmlns:p="http://schemas.openxmlformats.org/presentationml/2006/main">
-  <p:cSld>
-    <p:spTree>
-      <p:nvGrpSpPr>
-        <p:cNvPr id="1" name=""/>
-        <p:cNvGrpSpPr/>
-        <p:nvPr/>
-      </p:nvGrpSpPr>
-      <p:grpSpPr>
-        <a:xfrm>
-          <a:off x="0" y="0"/>
-          <a:ext cx="0" cy="0"/>
-          <a:chOff x="0" y="0"/>
-          <a:chExt cx="0" cy="0"/>
-        </a:xfrm>
-      </p:grpSpPr>
-      <p:sp>
-        <p:nvSpPr>
-          <p:cNvPr id="204" name="Rounded Rectangle"/>
-          <p:cNvSpPr/>
-          <p:nvPr/>
-        </p:nvSpPr>
-        <p:spPr>
-          <a:xfrm>
-            <a:off x="1495804" y="3384668"/>
-            <a:ext cx="10833724" cy="8898465"/>
-          </a:xfrm>
-          <a:prstGeom prst="roundRect">
-            <a:avLst>
-              <a:gd name="adj" fmla="val 11402"/>
-            </a:avLst>
-          </a:prstGeom>
-          <a:solidFill>
-            <a:schemeClr val="accent4"/>
-          </a:solidFill>
-          <a:ln w="12700">
-            <a:miter lim="400000"/>
-          </a:ln>
-        </p:spPr>
-        <p:txBody>
-          <a:bodyPr lIns="50800" tIns="50800" rIns="50800" bIns="50800" anchor="ctr"/>
-          <a:lstStyle/>
-          <a:p>
-            <a:pPr>
-              <a:lnSpc>
-                <a:spcPct val="120000"/>
-              </a:lnSpc>
-              <a:defRPr sz="3000" cap="all">
-                <a:latin typeface="Proxima Nova Extrabold"/>
-                <a:ea typeface="Proxima Nova Extrabold"/>
-                <a:cs typeface="Proxima Nova Extrabold"/>
-                <a:sym typeface="Proxima Nova Extrabold"/>
-              </a:defRPr>
-            </a:pPr>
-            <a:endParaRPr/>
-          </a:p>
-        </p:txBody>
-      </p:sp>
-      <p:sp>
-        <p:nvSpPr>
-          <p:cNvPr id="206" name="sum = 0…"/>
-          <p:cNvSpPr txBox="1"/>
-          <p:nvPr/>
-        </p:nvSpPr>
-        <p:spPr>
-          <a:xfrm>
-            <a:off x="3902322" y="4262265"/>
-            <a:ext cx="6020688" cy="3302001"/>
-          </a:xfrm>
-          <a:prstGeom prst="rect">
-            <a:avLst/>
-          </a:prstGeom>
-          <a:ln w="12700">
-            <a:miter lim="400000"/>
-          </a:ln>
-          <a:extLst>
-            <a:ext uri="{C572A759-6A51-4108-AA02-DFA0A04FC94B}">
-              <ma14:wrappingTextBoxFlag xmlns="" xmlns:m="http://schemas.openxmlformats.org/officeDocument/2006/math" xmlns:a14="http://schemas.microsoft.com/office/drawing/2010/main" xmlns:ma14="http://schemas.microsoft.com/office/mac/drawingml/2011/main" val="1"/>
-            </a:ext>
-          </a:extLst>
-        </p:spPr>
-        <p:txBody>
-          <a:bodyPr wrap="none" lIns="50800" tIns="50800" rIns="50800" bIns="50800" anchor="ctr">
-            <a:spAutoFit/>
-          </a:bodyPr>
-          <a:lstStyle/>
-          <a:p>
-            <a:pPr algn="l">
-              <a:defRPr sz="5500" b="1">
-                <a:latin typeface="Courier New"/>
-                <a:ea typeface="Courier New"/>
-                <a:cs typeface="Courier New"/>
-                <a:sym typeface="Courier New"/>
-              </a:defRPr>
-            </a:pPr>
-            <a:r>
-              <a:rPr dirty="0"/>
-              <a:t>sum = 0</a:t>
-            </a:r>
-          </a:p>
-          <a:p>
-            <a:pPr algn="l">
-              <a:defRPr sz="5500" b="1">
-                <a:latin typeface="Courier New"/>
-                <a:ea typeface="Courier New"/>
-                <a:cs typeface="Courier New"/>
-                <a:sym typeface="Courier New"/>
-              </a:defRPr>
-            </a:pPr>
-            <a:r>
-              <a:rPr dirty="0"/>
-              <a:t>while x &gt; 1:</a:t>
-            </a:r>
-          </a:p>
-          <a:p>
-            <a:pPr lvl="1" algn="l">
-              <a:defRPr sz="5500" b="1">
-                <a:latin typeface="Courier New"/>
-                <a:ea typeface="Courier New"/>
-                <a:cs typeface="Courier New"/>
-                <a:sym typeface="Courier New"/>
-              </a:defRPr>
-            </a:pPr>
-            <a:r>
-              <a:rPr dirty="0"/>
-              <a:t>sum = sum + x</a:t>
-            </a:r>
-          </a:p>
-          <a:p>
-            <a:pPr lvl="1" algn="l">
-              <a:defRPr sz="5500" b="1">
-                <a:latin typeface="Courier New"/>
-                <a:ea typeface="Courier New"/>
-                <a:cs typeface="Courier New"/>
-                <a:sym typeface="Courier New"/>
-              </a:defRPr>
-            </a:pPr>
-            <a:r>
-              <a:rPr dirty="0"/>
-              <a:t>x = x - 1 </a:t>
-            </a:r>
-          </a:p>
-        </p:txBody>
-      </p:sp>
-      <p:sp>
-        <p:nvSpPr>
-          <p:cNvPr id="207" name="Store the result of sum in location 42.…"/>
-          <p:cNvSpPr txBox="1"/>
-          <p:nvPr/>
-        </p:nvSpPr>
-        <p:spPr>
-          <a:xfrm>
-            <a:off x="1971276" y="8647000"/>
-            <a:ext cx="10612580" cy="3213101"/>
-          </a:xfrm>
-          <a:prstGeom prst="rect">
-            <a:avLst/>
-          </a:prstGeom>
-          <a:ln w="12700">
-            <a:miter lim="400000"/>
-          </a:ln>
-          <a:extLst>
-            <a:ext uri="{C572A759-6A51-4108-AA02-DFA0A04FC94B}">
-              <ma14:wrappingTextBoxFlag xmlns="" xmlns:m="http://schemas.openxmlformats.org/officeDocument/2006/math" xmlns:a14="http://schemas.microsoft.com/office/drawing/2010/main" xmlns:ma14="http://schemas.microsoft.com/office/mac/drawingml/2011/main" val="1"/>
-            </a:ext>
-          </a:extLst>
-        </p:spPr>
-        <p:txBody>
-          <a:bodyPr lIns="50800" tIns="50800" rIns="50800" bIns="50800" anchor="ctr">
-            <a:spAutoFit/>
-          </a:bodyPr>
-          <a:lstStyle/>
-          <a:p>
-            <a:pPr algn="l">
-              <a:defRPr sz="4300" b="1">
-                <a:latin typeface="Courier New"/>
-                <a:ea typeface="Courier New"/>
-                <a:cs typeface="Courier New"/>
-                <a:sym typeface="Courier New"/>
-              </a:defRPr>
-            </a:pPr>
-            <a:r>
-              <a:t>Store the result of sum in location 42.</a:t>
-            </a:r>
-          </a:p>
-          <a:p>
-            <a:pPr algn="l">
-              <a:defRPr sz="4300" b="1">
-                <a:latin typeface="Courier New"/>
-                <a:ea typeface="Courier New"/>
-                <a:cs typeface="Courier New"/>
-                <a:sym typeface="Courier New"/>
-              </a:defRPr>
-            </a:pPr>
-            <a:r>
-              <a:t>Assume R0 contains the value x</a:t>
-            </a:r>
-          </a:p>
-          <a:p>
-            <a:pPr algn="l">
-              <a:defRPr sz="4300" b="1">
-                <a:latin typeface="Courier New"/>
-                <a:ea typeface="Courier New"/>
-                <a:cs typeface="Courier New"/>
-                <a:sym typeface="Courier New"/>
-              </a:defRPr>
-            </a:pPr>
-            <a:r>
-              <a:t>You may use R1 for other steps</a:t>
-            </a:r>
-          </a:p>
-        </p:txBody>
-      </p:sp>
-      <p:sp>
-        <p:nvSpPr>
-          <p:cNvPr id="208" name="Your Turn"/>
-          <p:cNvSpPr txBox="1">
-            <a:spLocks noGrp="1"/>
-          </p:cNvSpPr>
-          <p:nvPr>
-            <p:ph type="title"/>
-          </p:nvPr>
-        </p:nvSpPr>
-        <p:spPr>
-          <a:prstGeom prst="rect">
-            <a:avLst/>
-          </a:prstGeom>
-        </p:spPr>
-        <p:txBody>
-          <a:bodyPr/>
-          <a:lstStyle/>
-          <a:p>
-            <a:r>
-              <a:rPr b="1" dirty="0"/>
-              <a:t>Your Turn</a:t>
-            </a:r>
-          </a:p>
-        </p:txBody>
-      </p:sp>
-    </p:spTree>
-  </p:cSld>
-  <p:clrMapOvr>
-    <a:masterClrMapping/>
-  </p:clrMapOvr>
-  <p:transition spd="med"/>
-</p:sld>
-</file>
-
-<file path=ppt/slides/slide12.xml><?xml version="1.0" encoding="utf-8"?>
-<p:sld xmlns:a="http://schemas.openxmlformats.org/drawingml/2006/main" xmlns:r="http://schemas.openxmlformats.org/officeDocument/2006/relationships" xmlns:p="http://schemas.openxmlformats.org/presentationml/2006/main">
-  <p:cSld>
-    <p:spTree>
-      <p:nvGrpSpPr>
-        <p:cNvPr id="1" name=""/>
-        <p:cNvGrpSpPr/>
-        <p:nvPr/>
-      </p:nvGrpSpPr>
-      <p:grpSpPr>
-        <a:xfrm>
-          <a:off x="0" y="0"/>
-          <a:ext cx="0" cy="0"/>
-          <a:chOff x="0" y="0"/>
-          <a:chExt cx="0" cy="0"/>
-        </a:xfrm>
-      </p:grpSpPr>
-      <p:sp>
-        <p:nvSpPr>
-          <p:cNvPr id="213" name="Your exam"/>
-          <p:cNvSpPr txBox="1">
-            <a:spLocks noGrp="1"/>
-          </p:cNvSpPr>
-          <p:nvPr>
-            <p:ph type="title"/>
-          </p:nvPr>
-        </p:nvSpPr>
-        <p:spPr>
-          <a:prstGeom prst="rect">
-            <a:avLst/>
-          </a:prstGeom>
-        </p:spPr>
-        <p:txBody>
-          <a:bodyPr/>
-          <a:lstStyle/>
-          <a:p>
-            <a:r>
-              <a:rPr b="1" dirty="0"/>
-              <a:t>Your exam</a:t>
-            </a:r>
-          </a:p>
-        </p:txBody>
-      </p:sp>
-      <p:sp>
-        <p:nvSpPr>
-          <p:cNvPr id="214" name="Types of Question:…"/>
-          <p:cNvSpPr txBox="1">
-            <a:spLocks noGrp="1"/>
-          </p:cNvSpPr>
-          <p:nvPr>
-            <p:ph type="body" sz="half" idx="1"/>
-          </p:nvPr>
-        </p:nvSpPr>
-        <p:spPr>
-          <a:xfrm>
-            <a:off x="11674768" y="3594100"/>
-            <a:ext cx="11490032" cy="8902700"/>
-          </a:xfrm>
-          <a:prstGeom prst="rect">
-            <a:avLst/>
-          </a:prstGeom>
-        </p:spPr>
-        <p:txBody>
-          <a:bodyPr/>
-          <a:lstStyle/>
-          <a:p>
-            <a:r>
-              <a:rPr dirty="0"/>
-              <a:t>Types of Question:</a:t>
-            </a:r>
-          </a:p>
-          <a:p>
-            <a:r>
-              <a:rPr dirty="0"/>
-              <a:t>- Values in Registers + Tracing.</a:t>
-            </a:r>
-          </a:p>
-          <a:p>
-            <a:r>
-              <a:rPr dirty="0"/>
-              <a:t>- Write small assembly programs.</a:t>
-            </a:r>
-          </a:p>
-          <a:p>
-            <a:r>
-              <a:rPr dirty="0"/>
-              <a:t>- Operand vs Opcode.</a:t>
-            </a:r>
-          </a:p>
-        </p:txBody>
-      </p:sp>
-      <p:pic>
-        <p:nvPicPr>
-          <p:cNvPr id="215" name="Image" descr="Image"/>
-          <p:cNvPicPr>
-            <a:picLocks noChangeAspect="1"/>
-          </p:cNvPicPr>
-          <p:nvPr/>
-        </p:nvPicPr>
-        <p:blipFill>
-          <a:blip r:embed="rId3"/>
-          <a:stretch>
-            <a:fillRect/>
-          </a:stretch>
-        </p:blipFill>
-        <p:spPr>
-          <a:xfrm>
-            <a:off x="1226230" y="3304040"/>
-            <a:ext cx="9883649" cy="9164503"/>
-          </a:xfrm>
-          <a:prstGeom prst="rect">
-            <a:avLst/>
-          </a:prstGeom>
-          <a:ln w="12700">
-            <a:miter lim="400000"/>
-          </a:ln>
-        </p:spPr>
-      </p:pic>
-    </p:spTree>
-  </p:cSld>
-  <p:clrMapOvr>
-    <a:masterClrMapping/>
-  </p:clrMapOvr>
-  <p:transition spd="med"/>
-  <p:timing>
-    <p:tnLst>
-      <p:par>
-        <p:cTn id="1" dur="indefinite" restart="never" nodeType="tmRoot">
-          <p:childTnLst>
-            <p:seq concurrent="1" nextAc="seek">
-              <p:cTn id="2" dur="indefinite" nodeType="mainSeq">
-                <p:childTnLst>
-                  <p:par>
-                    <p:cTn id="3" fill="hold">
-                      <p:stCondLst>
-                        <p:cond delay="indefinite"/>
-                      </p:stCondLst>
-                      <p:childTnLst>
-                        <p:par>
-                          <p:cTn id="4" fill="hold">
-                            <p:stCondLst>
-                              <p:cond delay="0"/>
-                            </p:stCondLst>
-                            <p:childTnLst>
-                              <p:par>
-                                <p:cTn id="5" presetID="1" presetClass="entr" presetSubtype="0" fill="hold" grpId="0" nodeType="clickEffect">
-                                  <p:stCondLst>
-                                    <p:cond delay="0"/>
-                                  </p:stCondLst>
-                                  <p:childTnLst>
-                                    <p:set>
-                                      <p:cBhvr>
-                                        <p:cTn id="6" dur="1" fill="hold">
-                                          <p:stCondLst>
-                                            <p:cond delay="0"/>
-                                          </p:stCondLst>
-                                        </p:cTn>
-                                        <p:tgtEl>
-                                          <p:spTgt spid="214">
-                                            <p:txEl>
-                                              <p:pRg st="1" end="1"/>
-                                            </p:txEl>
-                                          </p:spTgt>
-                                        </p:tgtEl>
-                                        <p:attrNameLst>
-                                          <p:attrName>style.visibility</p:attrName>
-                                        </p:attrNameLst>
-                                      </p:cBhvr>
-                                      <p:to>
-                                        <p:strVal val="visible"/>
-                                      </p:to>
-                                    </p:set>
-                                  </p:childTnLst>
-                                </p:cTn>
-                              </p:par>
-                            </p:childTnLst>
-                          </p:cTn>
-                        </p:par>
-                      </p:childTnLst>
-                    </p:cTn>
-                  </p:par>
-                  <p:par>
-                    <p:cTn id="7" fill="hold">
-                      <p:stCondLst>
-                        <p:cond delay="indefinite"/>
-                      </p:stCondLst>
-                      <p:childTnLst>
-                        <p:par>
-                          <p:cTn id="8" fill="hold">
-                            <p:stCondLst>
-                              <p:cond delay="0"/>
-                            </p:stCondLst>
-                            <p:childTnLst>
-                              <p:par>
-                                <p:cTn id="9" presetID="1" presetClass="entr" presetSubtype="0" fill="hold" grpId="0" nodeType="clickEffect">
-                                  <p:stCondLst>
-                                    <p:cond delay="0"/>
-                                  </p:stCondLst>
-                                  <p:childTnLst>
-                                    <p:set>
-                                      <p:cBhvr>
-                                        <p:cTn id="10" dur="1" fill="hold">
-                                          <p:stCondLst>
-                                            <p:cond delay="0"/>
-                                          </p:stCondLst>
-                                        </p:cTn>
-                                        <p:tgtEl>
-                                          <p:spTgt spid="214">
-                                            <p:txEl>
-                                              <p:pRg st="2" end="2"/>
-                                            </p:txEl>
-                                          </p:spTgt>
-                                        </p:tgtEl>
-                                        <p:attrNameLst>
-                                          <p:attrName>style.visibility</p:attrName>
-                                        </p:attrNameLst>
-                                      </p:cBhvr>
-                                      <p:to>
-                                        <p:strVal val="visible"/>
-                                      </p:to>
-                                    </p:set>
-                                  </p:childTnLst>
-                                </p:cTn>
-                              </p:par>
-                            </p:childTnLst>
-                          </p:cTn>
-                        </p:par>
-                      </p:childTnLst>
-                    </p:cTn>
-                  </p:par>
-                  <p:par>
-                    <p:cTn id="11" fill="hold">
-                      <p:stCondLst>
-                        <p:cond delay="indefinite"/>
-                      </p:stCondLst>
-                      <p:childTnLst>
-                        <p:par>
-                          <p:cTn id="12" fill="hold">
-                            <p:stCondLst>
-                              <p:cond delay="0"/>
-                            </p:stCondLst>
-                            <p:childTnLst>
-                              <p:par>
-                                <p:cTn id="13" presetID="1" presetClass="entr" presetSubtype="0" fill="hold" grpId="0" nodeType="clickEffect">
-                                  <p:stCondLst>
-                                    <p:cond delay="0"/>
-                                  </p:stCondLst>
-                                  <p:childTnLst>
-                                    <p:set>
-                                      <p:cBhvr>
-                                        <p:cTn id="14" dur="1" fill="hold">
-                                          <p:stCondLst>
-                                            <p:cond delay="0"/>
-                                          </p:stCondLst>
-                                        </p:cTn>
-                                        <p:tgtEl>
-                                          <p:spTgt spid="214">
-                                            <p:txEl>
-                                              <p:pRg st="3" end="3"/>
-                                            </p:txEl>
-                                          </p:spTgt>
-                                        </p:tgtEl>
-                                        <p:attrNameLst>
-                                          <p:attrName>style.visibility</p:attrName>
-                                        </p:attrNameLst>
-                                      </p:cBhvr>
-                                      <p:to>
-                                        <p:strVal val="visible"/>
-                                      </p:to>
-                                    </p:set>
-                                  </p:childTnLst>
-                                </p:cTn>
-                              </p:par>
-                            </p:childTnLst>
-                          </p:cTn>
-                        </p:par>
-                      </p:childTnLst>
-                    </p:cTn>
-                  </p:par>
-                </p:childTnLst>
-              </p:cTn>
-              <p:prevCondLst>
-                <p:cond evt="onPrev" delay="0">
-                  <p:tgtEl>
-                    <p:sldTgt/>
-                  </p:tgtEl>
-                </p:cond>
-              </p:prevCondLst>
-              <p:nextCondLst>
-                <p:cond evt="onNext" delay="0">
-                  <p:tgtEl>
-                    <p:sldTgt/>
-                  </p:tgtEl>
-                </p:cond>
-              </p:nextCondLst>
-            </p:seq>
-          </p:childTnLst>
-        </p:cTn>
-      </p:par>
-    </p:tnLst>
-    <p:bldLst>
-      <p:bldP spid="214" grpId="0" uiExpand="1" build="p"/>
-    </p:bldLst>
-  </p:timing>
-</p:sld>
-</file>
-
-<file path=ppt/slides/slide13.xml><?xml version="1.0" encoding="utf-8"?>
-<p:sld xmlns:a="http://schemas.openxmlformats.org/drawingml/2006/main" xmlns:r="http://schemas.openxmlformats.org/officeDocument/2006/relationships" xmlns:p="http://schemas.openxmlformats.org/presentationml/2006/main">
-  <p:cSld>
-    <p:spTree>
-      <p:nvGrpSpPr>
-        <p:cNvPr id="1" name=""/>
-        <p:cNvGrpSpPr/>
-        <p:nvPr/>
-      </p:nvGrpSpPr>
-      <p:grpSpPr>
-        <a:xfrm>
-          <a:off x="0" y="0"/>
-          <a:ext cx="0" cy="0"/>
-          <a:chOff x="0" y="0"/>
-          <a:chExt cx="0" cy="0"/>
-        </a:xfrm>
-      </p:grpSpPr>
-      <p:sp>
-        <p:nvSpPr>
-          <p:cNvPr id="217" name="Treat each variable as a register.…"/>
-          <p:cNvSpPr txBox="1">
-            <a:spLocks noGrp="1"/>
-          </p:cNvSpPr>
-          <p:nvPr>
-            <p:ph type="body" sz="quarter" idx="1"/>
-          </p:nvPr>
-        </p:nvSpPr>
-        <p:spPr>
-          <a:xfrm>
-            <a:off x="1219200" y="5016710"/>
-            <a:ext cx="8910918" cy="7480090"/>
-          </a:xfrm>
-          <a:prstGeom prst="rect">
-            <a:avLst/>
-          </a:prstGeom>
-        </p:spPr>
-        <p:txBody>
-          <a:bodyPr/>
-          <a:lstStyle/>
-          <a:p>
-            <a:r>
-              <a:rPr b="0" dirty="0"/>
-              <a:t>Treat each variable as a register.</a:t>
-            </a:r>
-          </a:p>
-          <a:p>
-            <a:r>
-              <a:rPr b="0" dirty="0"/>
-              <a:t>Treat each register as a variable.</a:t>
-            </a:r>
-          </a:p>
-          <a:p>
-            <a:r>
-              <a:rPr b="0" dirty="0"/>
-              <a:t>Draw arrows on Assembly Code.</a:t>
-            </a:r>
-          </a:p>
-          <a:p>
-            <a:r>
-              <a:rPr b="0" dirty="0" err="1"/>
-              <a:t>Memorise</a:t>
-            </a:r>
-            <a:r>
-              <a:rPr b="0" dirty="0"/>
-              <a:t> the common If and While structure.</a:t>
-            </a:r>
-          </a:p>
-          <a:p>
-            <a:r>
-              <a:rPr b="0" dirty="0"/>
-              <a:t>Think about your code in a language you’re used to.</a:t>
-            </a:r>
-          </a:p>
-          <a:p>
-            <a:r>
-              <a:rPr b="0" dirty="0"/>
-              <a:t>Practice, Practice, Practice.</a:t>
-            </a:r>
-          </a:p>
-        </p:txBody>
-      </p:sp>
-      <p:sp>
-        <p:nvSpPr>
-          <p:cNvPr id="218" name="Tips for solving questions"/>
-          <p:cNvSpPr txBox="1">
-            <a:spLocks noGrp="1"/>
-          </p:cNvSpPr>
-          <p:nvPr>
-            <p:ph type="title"/>
-          </p:nvPr>
-        </p:nvSpPr>
-        <p:spPr>
-          <a:xfrm>
-            <a:off x="1219200" y="554252"/>
-            <a:ext cx="8356600" cy="3068291"/>
-          </a:xfrm>
-          <a:prstGeom prst="rect">
-            <a:avLst/>
-          </a:prstGeom>
-        </p:spPr>
-        <p:txBody>
-          <a:bodyPr>
-            <a:normAutofit fontScale="90000"/>
-          </a:bodyPr>
-          <a:lstStyle/>
-          <a:p>
-            <a:r>
-              <a:rPr b="1" dirty="0"/>
-              <a:t>Tips for solving questions</a:t>
-            </a:r>
-          </a:p>
-        </p:txBody>
-      </p:sp>
-      <p:pic>
-        <p:nvPicPr>
-          <p:cNvPr id="219" name="Image" descr="Image"/>
-          <p:cNvPicPr>
-            <a:picLocks noChangeAspect="1"/>
-          </p:cNvPicPr>
-          <p:nvPr/>
-        </p:nvPicPr>
-        <p:blipFill>
-          <a:blip r:embed="rId3"/>
-          <a:stretch>
-            <a:fillRect/>
-          </a:stretch>
-        </p:blipFill>
-        <p:spPr>
-          <a:xfrm>
-            <a:off x="13766475" y="2337619"/>
-            <a:ext cx="7671450" cy="10841090"/>
-          </a:xfrm>
-          <a:prstGeom prst="rect">
-            <a:avLst/>
-          </a:prstGeom>
-          <a:ln w="12700">
-            <a:miter lim="400000"/>
-          </a:ln>
-        </p:spPr>
-      </p:pic>
-      <p:sp>
-        <p:nvSpPr>
-          <p:cNvPr id="220" name="Bubble sort"/>
-          <p:cNvSpPr txBox="1"/>
-          <p:nvPr/>
-        </p:nvSpPr>
-        <p:spPr>
-          <a:xfrm>
-            <a:off x="11088892" y="554252"/>
-            <a:ext cx="13026616" cy="1674324"/>
-          </a:xfrm>
-          <a:prstGeom prst="rect">
-            <a:avLst/>
-          </a:prstGeom>
-          <a:ln w="12700">
-            <a:miter lim="400000"/>
-          </a:ln>
-          <a:extLst>
-            <a:ext uri="{C572A759-6A51-4108-AA02-DFA0A04FC94B}">
-              <ma14:wrappingTextBoxFlag xmlns="" xmlns:m="http://schemas.openxmlformats.org/officeDocument/2006/math" xmlns:a14="http://schemas.microsoft.com/office/drawing/2010/main" xmlns:ma14="http://schemas.microsoft.com/office/mac/drawingml/2011/main" val="1"/>
-            </a:ext>
-          </a:extLst>
-        </p:spPr>
-        <p:txBody>
-          <a:bodyPr lIns="50800" tIns="50800" rIns="50800" bIns="50800" anchor="ctr">
-            <a:normAutofit/>
-          </a:bodyPr>
-          <a:lstStyle>
-            <a:lvl1pPr defTabSz="514095">
-              <a:lnSpc>
-                <a:spcPct val="80000"/>
-              </a:lnSpc>
-              <a:defRPr sz="12320" cap="all">
-                <a:solidFill>
-                  <a:srgbClr val="FFFFFF"/>
-                </a:solidFill>
-                <a:latin typeface="+mn-lt"/>
-                <a:ea typeface="+mn-ea"/>
-                <a:cs typeface="+mn-cs"/>
-                <a:sym typeface="Druk Medium"/>
-              </a:defRPr>
-            </a:lvl1pPr>
-          </a:lstStyle>
-          <a:p>
-            <a:r>
-              <a:t>Bubble sort</a:t>
-            </a:r>
-          </a:p>
-        </p:txBody>
-      </p:sp>
-    </p:spTree>
-  </p:cSld>
-  <p:clrMapOvr>
-    <a:masterClrMapping/>
-  </p:clrMapOvr>
-  <p:transition spd="med"/>
-  <p:timing>
-    <p:tnLst>
-      <p:par>
-        <p:cTn id="1" dur="indefinite" restart="never" nodeType="tmRoot">
-          <p:childTnLst>
-            <p:seq concurrent="1" nextAc="seek">
-              <p:cTn id="2" dur="indefinite" nodeType="mainSeq">
-                <p:childTnLst>
-                  <p:par>
-                    <p:cTn id="3" fill="hold">
-                      <p:stCondLst>
-                        <p:cond delay="indefinite"/>
-                      </p:stCondLst>
-                      <p:childTnLst>
-                        <p:par>
-                          <p:cTn id="4" fill="hold">
-                            <p:stCondLst>
-                              <p:cond delay="0"/>
-                            </p:stCondLst>
-                            <p:childTnLst>
-                              <p:par>
-                                <p:cTn id="5" presetID="1" presetClass="entr" presetSubtype="0" fill="hold" nodeType="clickEffect">
-                                  <p:stCondLst>
-                                    <p:cond delay="0"/>
-                                  </p:stCondLst>
-                                  <p:childTnLst>
-                                    <p:set>
-                                      <p:cBhvr>
-                                        <p:cTn id="6" dur="1" fill="hold">
-                                          <p:stCondLst>
-                                            <p:cond delay="0"/>
-                                          </p:stCondLst>
-                                        </p:cTn>
-                                        <p:tgtEl>
-                                          <p:spTgt spid="219"/>
-                                        </p:tgtEl>
-                                        <p:attrNameLst>
-                                          <p:attrName>style.visibility</p:attrName>
-                                        </p:attrNameLst>
-                                      </p:cBhvr>
-                                      <p:to>
-                                        <p:strVal val="visible"/>
-                                      </p:to>
-                                    </p:set>
-                                  </p:childTnLst>
-                                </p:cTn>
-                              </p:par>
-                              <p:par>
-                                <p:cTn id="7" presetID="1" presetClass="entr" presetSubtype="0" fill="hold" grpId="0" nodeType="withEffect">
-                                  <p:stCondLst>
-                                    <p:cond delay="0"/>
-                                  </p:stCondLst>
-                                  <p:childTnLst>
-                                    <p:set>
-                                      <p:cBhvr>
-                                        <p:cTn id="8" dur="1" fill="hold">
-                                          <p:stCondLst>
-                                            <p:cond delay="0"/>
-                                          </p:stCondLst>
-                                        </p:cTn>
-                                        <p:tgtEl>
-                                          <p:spTgt spid="220"/>
-                                        </p:tgtEl>
-                                        <p:attrNameLst>
-                                          <p:attrName>style.visibility</p:attrName>
-                                        </p:attrNameLst>
-                                      </p:cBhvr>
-                                      <p:to>
-                                        <p:strVal val="visible"/>
-                                      </p:to>
-                                    </p:set>
-                                  </p:childTnLst>
-                                </p:cTn>
-                              </p:par>
-                            </p:childTnLst>
-                          </p:cTn>
-                        </p:par>
-                      </p:childTnLst>
-                    </p:cTn>
-                  </p:par>
-                </p:childTnLst>
-              </p:cTn>
-              <p:prevCondLst>
-                <p:cond evt="onPrev" delay="0">
-                  <p:tgtEl>
-                    <p:sldTgt/>
-                  </p:tgtEl>
-                </p:cond>
-              </p:prevCondLst>
-              <p:nextCondLst>
-                <p:cond evt="onNext" delay="0">
-                  <p:tgtEl>
-                    <p:sldTgt/>
-                  </p:tgtEl>
-                </p:cond>
-              </p:nextCondLst>
-            </p:seq>
-          </p:childTnLst>
-        </p:cTn>
-      </p:par>
-    </p:tnLst>
-    <p:bldLst>
-      <p:bldP spid="220" grpId="0" animBg="1"/>
-    </p:bldLst>
-  </p:timing>
-</p:sld>
-</file>
-
 <file path=ppt/slides/slide2.xml><?xml version="1.0" encoding="utf-8"?>
 <p:sld xmlns:a="http://schemas.openxmlformats.org/drawingml/2006/main" xmlns:r="http://schemas.openxmlformats.org/officeDocument/2006/relationships" xmlns:p="http://schemas.openxmlformats.org/presentationml/2006/main">
   <p:cSld>
@@ -11426,24 +9129,127 @@
           <a:chExt cx="0" cy="0"/>
         </a:xfrm>
       </p:grpSpPr>
-      <p:pic>
-        <p:nvPicPr>
-          <p:cNvPr id="158" name="Image" descr="Image"/>
-          <p:cNvPicPr>
-            <a:picLocks noChangeAspect="1"/>
-          </p:cNvPicPr>
-          <p:nvPr/>
-        </p:nvPicPr>
-        <p:blipFill>
-          <a:blip r:embed="rId3"/>
-          <a:stretch>
-            <a:fillRect/>
-          </a:stretch>
-        </p:blipFill>
+      <p:sp>
+        <p:nvSpPr>
+          <p:cNvPr id="153" name="In reality we don’t write programs in it very often*…"/>
+          <p:cNvSpPr txBox="1">
+            <a:spLocks noGrp="1"/>
+          </p:cNvSpPr>
+          <p:nvPr>
+            <p:ph type="body" sz="quarter" idx="1"/>
+          </p:nvPr>
+        </p:nvSpPr>
         <p:spPr>
           <a:xfrm>
-            <a:off x="2905861" y="309992"/>
-            <a:ext cx="18572278" cy="13096016"/>
+            <a:off x="1219200" y="3681095"/>
+            <a:ext cx="8356600" cy="8206105"/>
+          </a:xfrm>
+          <a:prstGeom prst="rect">
+            <a:avLst/>
+          </a:prstGeom>
+        </p:spPr>
+        <p:txBody>
+          <a:bodyPr>
+            <a:normAutofit/>
+          </a:bodyPr>
+          <a:lstStyle/>
+          <a:p>
+            <a:r>
+              <a:rPr lang="en-GB" b="0" dirty="0"/>
+              <a:t>Trial and error method.</a:t>
+            </a:r>
+          </a:p>
+          <a:p>
+            <a:r>
+              <a:rPr lang="en-GB" b="0" dirty="0"/>
+              <a:t>Usually used for access to password-based systems.</a:t>
+            </a:r>
+          </a:p>
+          <a:p>
+            <a:r>
+              <a:rPr lang="en-GB" b="0" dirty="0"/>
+              <a:t>Try many possible passwords until a correct one is found.</a:t>
+            </a:r>
+          </a:p>
+          <a:p>
+            <a:endParaRPr lang="en-GB" b="0" dirty="0"/>
+          </a:p>
+          <a:p>
+            <a:r>
+              <a:rPr lang="en-GB" b="0" dirty="0"/>
+              <a:t>Dictionary Attack: Words from a Dictionary are tried first.</a:t>
+            </a:r>
+          </a:p>
+          <a:p>
+            <a:endParaRPr lang="en-GB" b="0" dirty="0"/>
+          </a:p>
+          <a:p>
+            <a:r>
+              <a:rPr lang="en-GB" b="0" dirty="0"/>
+              <a:t>Can you think of some common passwords?</a:t>
+            </a:r>
+          </a:p>
+        </p:txBody>
+      </p:sp>
+      <p:sp>
+        <p:nvSpPr>
+          <p:cNvPr id="155" name="Why are we even learning this?…"/>
+          <p:cNvSpPr txBox="1">
+            <a:spLocks noGrp="1"/>
+          </p:cNvSpPr>
+          <p:nvPr>
+            <p:ph type="body" idx="22"/>
+          </p:nvPr>
+        </p:nvSpPr>
+        <p:spPr>
+          <a:xfrm>
+            <a:off x="1219200" y="1219200"/>
+            <a:ext cx="8356600" cy="2106294"/>
+          </a:xfrm>
+          <a:prstGeom prst="rect">
+            <a:avLst/>
+          </a:prstGeom>
+          <a:extLst>
+            <a:ext uri="{C572A759-6A51-4108-AA02-DFA0A04FC94B}">
+              <ma14:wrappingTextBoxFlag xmlns="" xmlns:m="http://schemas.openxmlformats.org/officeDocument/2006/math" xmlns:a14="http://schemas.microsoft.com/office/drawing/2010/main" xmlns:ma14="http://schemas.microsoft.com/office/mac/drawingml/2011/main" val="1"/>
+            </a:ext>
+          </a:extLst>
+        </p:spPr>
+        <p:txBody>
+          <a:bodyPr>
+            <a:normAutofit fontScale="92500" lnSpcReduction="10000"/>
+          </a:bodyPr>
+          <a:lstStyle/>
+          <a:p>
+            <a:pPr defTabSz="344677">
+              <a:defRPr sz="3775"/>
+            </a:pPr>
+            <a:r>
+              <a:rPr lang="en-GB" sz="6600" b="1" dirty="0"/>
+              <a:t>Brute-force attacks</a:t>
+            </a:r>
+            <a:endParaRPr sz="6600" b="1" dirty="0"/>
+          </a:p>
+        </p:txBody>
+      </p:sp>
+      <p:sp>
+        <p:nvSpPr>
+          <p:cNvPr id="7" name="Why are we even learning this?…">
+            <a:extLst>
+              <a:ext uri="{FF2B5EF4-FFF2-40B4-BE49-F238E27FC236}">
+                <a16:creationId xmlns:a16="http://schemas.microsoft.com/office/drawing/2014/main" id="{24A9D448-7191-27E4-5193-01F5AD4FCA98}"/>
+              </a:ext>
+            </a:extLst>
+          </p:cNvPr>
+          <p:cNvSpPr txBox="1">
+            <a:spLocks/>
+          </p:cNvSpPr>
+          <p:nvPr/>
+        </p:nvSpPr>
+        <p:spPr>
+          <a:xfrm>
+            <a:off x="12192000" y="1219200"/>
+            <a:ext cx="10702413" cy="2106294"/>
           </a:xfrm>
           <a:prstGeom prst="rect">
             <a:avLst/>
@@ -11451,9 +9257,289 @@
           <a:ln w="12700">
             <a:miter lim="400000"/>
           </a:ln>
+          <a:extLst>
+            <a:ext uri="{C572A759-6A51-4108-AA02-DFA0A04FC94B}">
+              <ma14:wrappingTextBoxFlag xmlns="" xmlns:m="http://schemas.openxmlformats.org/officeDocument/2006/math" xmlns:a14="http://schemas.microsoft.com/office/drawing/2010/main" xmlns:ma14="http://schemas.microsoft.com/office/mac/drawingml/2011/main" val="1"/>
+            </a:ext>
+          </a:extLst>
         </p:spPr>
-      </p:pic>
+        <p:txBody>
+          <a:bodyPr lIns="50800" tIns="50800" rIns="50800" bIns="50800" anchor="ctr">
+            <a:normAutofit/>
+          </a:bodyPr>
+          <a:lstStyle>
+            <a:lvl1pPr marL="0" marR="0" indent="0" algn="l" defTabSz="584200" rtl="0" latinLnBrk="0">
+              <a:lnSpc>
+                <a:spcPct val="120000"/>
+              </a:lnSpc>
+              <a:spcBef>
+                <a:spcPts val="0"/>
+              </a:spcBef>
+              <a:spcAft>
+                <a:spcPts val="0"/>
+              </a:spcAft>
+              <a:buClrTx/>
+              <a:buSzTx/>
+              <a:buFontTx/>
+              <a:buNone/>
+              <a:tabLst/>
+              <a:defRPr sz="3600" b="0" i="0" u="none" strike="noStrike" cap="all" spc="0" baseline="0">
+                <a:solidFill>
+                  <a:srgbClr val="00C7FC"/>
+                </a:solidFill>
+                <a:uFillTx/>
+                <a:latin typeface="Proxima Nova Extrabold"/>
+                <a:ea typeface="Proxima Nova Extrabold"/>
+                <a:cs typeface="Proxima Nova Extrabold"/>
+                <a:sym typeface="Proxima Nova Extrabold"/>
+              </a:defRPr>
+            </a:lvl1pPr>
+            <a:lvl2pPr marL="1371600" marR="0" indent="-685800" algn="l" defTabSz="584200" rtl="0" latinLnBrk="0">
+              <a:lnSpc>
+                <a:spcPct val="80000"/>
+              </a:lnSpc>
+              <a:spcBef>
+                <a:spcPts val="2400"/>
+              </a:spcBef>
+              <a:spcAft>
+                <a:spcPts val="0"/>
+              </a:spcAft>
+              <a:buClr>
+                <a:srgbClr val="57BEF0"/>
+              </a:buClr>
+              <a:buSzPct val="250000"/>
+              <a:buFontTx/>
+              <a:buChar char="-"/>
+              <a:tabLst/>
+              <a:defRPr sz="4200" b="1" i="0" u="none" strike="noStrike" cap="none" spc="0" baseline="0">
+                <a:solidFill>
+                  <a:srgbClr val="53585F"/>
+                </a:solidFill>
+                <a:uFillTx/>
+                <a:latin typeface="Proxima Nova"/>
+                <a:ea typeface="Proxima Nova"/>
+                <a:cs typeface="Proxima Nova"/>
+                <a:sym typeface="Proxima Nova"/>
+              </a:defRPr>
+            </a:lvl2pPr>
+            <a:lvl3pPr marL="2057400" marR="0" indent="-685800" algn="l" defTabSz="584200" rtl="0" latinLnBrk="0">
+              <a:lnSpc>
+                <a:spcPct val="80000"/>
+              </a:lnSpc>
+              <a:spcBef>
+                <a:spcPts val="2400"/>
+              </a:spcBef>
+              <a:spcAft>
+                <a:spcPts val="0"/>
+              </a:spcAft>
+              <a:buClr>
+                <a:srgbClr val="57BEF0"/>
+              </a:buClr>
+              <a:buSzPct val="250000"/>
+              <a:buFontTx/>
+              <a:buChar char="-"/>
+              <a:tabLst/>
+              <a:defRPr sz="4200" b="1" i="0" u="none" strike="noStrike" cap="none" spc="0" baseline="0">
+                <a:solidFill>
+                  <a:srgbClr val="53585F"/>
+                </a:solidFill>
+                <a:uFillTx/>
+                <a:latin typeface="Proxima Nova"/>
+                <a:ea typeface="Proxima Nova"/>
+                <a:cs typeface="Proxima Nova"/>
+                <a:sym typeface="Proxima Nova"/>
+              </a:defRPr>
+            </a:lvl3pPr>
+            <a:lvl4pPr marL="2743200" marR="0" indent="-685800" algn="l" defTabSz="584200" rtl="0" latinLnBrk="0">
+              <a:lnSpc>
+                <a:spcPct val="80000"/>
+              </a:lnSpc>
+              <a:spcBef>
+                <a:spcPts val="2400"/>
+              </a:spcBef>
+              <a:spcAft>
+                <a:spcPts val="0"/>
+              </a:spcAft>
+              <a:buClr>
+                <a:srgbClr val="57BEF0"/>
+              </a:buClr>
+              <a:buSzPct val="250000"/>
+              <a:buFontTx/>
+              <a:buChar char="-"/>
+              <a:tabLst/>
+              <a:defRPr sz="4200" b="1" i="0" u="none" strike="noStrike" cap="none" spc="0" baseline="0">
+                <a:solidFill>
+                  <a:srgbClr val="53585F"/>
+                </a:solidFill>
+                <a:uFillTx/>
+                <a:latin typeface="Proxima Nova"/>
+                <a:ea typeface="Proxima Nova"/>
+                <a:cs typeface="Proxima Nova"/>
+                <a:sym typeface="Proxima Nova"/>
+              </a:defRPr>
+            </a:lvl4pPr>
+            <a:lvl5pPr marL="3429000" marR="0" indent="-685800" algn="l" defTabSz="584200" rtl="0" latinLnBrk="0">
+              <a:lnSpc>
+                <a:spcPct val="80000"/>
+              </a:lnSpc>
+              <a:spcBef>
+                <a:spcPts val="2400"/>
+              </a:spcBef>
+              <a:spcAft>
+                <a:spcPts val="0"/>
+              </a:spcAft>
+              <a:buClr>
+                <a:srgbClr val="57BEF0"/>
+              </a:buClr>
+              <a:buSzPct val="250000"/>
+              <a:buFontTx/>
+              <a:buChar char="-"/>
+              <a:tabLst/>
+              <a:defRPr sz="4200" b="1" i="0" u="none" strike="noStrike" cap="none" spc="0" baseline="0">
+                <a:solidFill>
+                  <a:srgbClr val="53585F"/>
+                </a:solidFill>
+                <a:uFillTx/>
+                <a:latin typeface="Proxima Nova"/>
+                <a:ea typeface="Proxima Nova"/>
+                <a:cs typeface="Proxima Nova"/>
+                <a:sym typeface="Proxima Nova"/>
+              </a:defRPr>
+            </a:lvl5pPr>
+            <a:lvl6pPr marL="4114800" marR="0" indent="-685800" algn="l" defTabSz="584200" rtl="0" latinLnBrk="0">
+              <a:lnSpc>
+                <a:spcPct val="80000"/>
+              </a:lnSpc>
+              <a:spcBef>
+                <a:spcPts val="2400"/>
+              </a:spcBef>
+              <a:spcAft>
+                <a:spcPts val="0"/>
+              </a:spcAft>
+              <a:buClr>
+                <a:srgbClr val="57BEF0"/>
+              </a:buClr>
+              <a:buSzPct val="250000"/>
+              <a:buFontTx/>
+              <a:buChar char="-"/>
+              <a:tabLst/>
+              <a:defRPr sz="4200" b="1" i="0" u="none" strike="noStrike" cap="none" spc="0" baseline="0">
+                <a:solidFill>
+                  <a:srgbClr val="53585F"/>
+                </a:solidFill>
+                <a:uFillTx/>
+                <a:latin typeface="Proxima Nova"/>
+                <a:ea typeface="Proxima Nova"/>
+                <a:cs typeface="Proxima Nova"/>
+                <a:sym typeface="Proxima Nova"/>
+              </a:defRPr>
+            </a:lvl6pPr>
+            <a:lvl7pPr marL="4800600" marR="0" indent="-685800" algn="l" defTabSz="584200" rtl="0" latinLnBrk="0">
+              <a:lnSpc>
+                <a:spcPct val="80000"/>
+              </a:lnSpc>
+              <a:spcBef>
+                <a:spcPts val="2400"/>
+              </a:spcBef>
+              <a:spcAft>
+                <a:spcPts val="0"/>
+              </a:spcAft>
+              <a:buClr>
+                <a:srgbClr val="57BEF0"/>
+              </a:buClr>
+              <a:buSzPct val="250000"/>
+              <a:buFontTx/>
+              <a:buChar char="-"/>
+              <a:tabLst/>
+              <a:defRPr sz="4200" b="1" i="0" u="none" strike="noStrike" cap="none" spc="0" baseline="0">
+                <a:solidFill>
+                  <a:srgbClr val="53585F"/>
+                </a:solidFill>
+                <a:uFillTx/>
+                <a:latin typeface="Proxima Nova"/>
+                <a:ea typeface="Proxima Nova"/>
+                <a:cs typeface="Proxima Nova"/>
+                <a:sym typeface="Proxima Nova"/>
+              </a:defRPr>
+            </a:lvl7pPr>
+            <a:lvl8pPr marL="5486400" marR="0" indent="-685800" algn="l" defTabSz="584200" rtl="0" latinLnBrk="0">
+              <a:lnSpc>
+                <a:spcPct val="80000"/>
+              </a:lnSpc>
+              <a:spcBef>
+                <a:spcPts val="2400"/>
+              </a:spcBef>
+              <a:spcAft>
+                <a:spcPts val="0"/>
+              </a:spcAft>
+              <a:buClr>
+                <a:srgbClr val="57BEF0"/>
+              </a:buClr>
+              <a:buSzPct val="250000"/>
+              <a:buFontTx/>
+              <a:buChar char="-"/>
+              <a:tabLst/>
+              <a:defRPr sz="4200" b="1" i="0" u="none" strike="noStrike" cap="none" spc="0" baseline="0">
+                <a:solidFill>
+                  <a:srgbClr val="53585F"/>
+                </a:solidFill>
+                <a:uFillTx/>
+                <a:latin typeface="Proxima Nova"/>
+                <a:ea typeface="Proxima Nova"/>
+                <a:cs typeface="Proxima Nova"/>
+                <a:sym typeface="Proxima Nova"/>
+              </a:defRPr>
+            </a:lvl8pPr>
+            <a:lvl9pPr marL="6172200" marR="0" indent="-685800" algn="l" defTabSz="584200" rtl="0" latinLnBrk="0">
+              <a:lnSpc>
+                <a:spcPct val="80000"/>
+              </a:lnSpc>
+              <a:spcBef>
+                <a:spcPts val="2400"/>
+              </a:spcBef>
+              <a:spcAft>
+                <a:spcPts val="0"/>
+              </a:spcAft>
+              <a:buClr>
+                <a:srgbClr val="57BEF0"/>
+              </a:buClr>
+              <a:buSzPct val="250000"/>
+              <a:buFontTx/>
+              <a:buChar char="-"/>
+              <a:tabLst/>
+              <a:defRPr sz="4200" b="1" i="0" u="none" strike="noStrike" cap="none" spc="0" baseline="0">
+                <a:solidFill>
+                  <a:srgbClr val="53585F"/>
+                </a:solidFill>
+                <a:uFillTx/>
+                <a:latin typeface="Proxima Nova"/>
+                <a:ea typeface="Proxima Nova"/>
+                <a:cs typeface="Proxima Nova"/>
+                <a:sym typeface="Proxima Nova"/>
+              </a:defRPr>
+            </a:lvl9pPr>
+          </a:lstStyle>
+          <a:p>
+            <a:pPr defTabSz="344677" hangingPunct="1">
+              <a:defRPr sz="3775"/>
+            </a:pPr>
+            <a:r>
+              <a:rPr lang="en-GB" sz="6600" b="1" dirty="0">
+                <a:solidFill>
+                  <a:srgbClr val="FFFFFF"/>
+                </a:solidFill>
+              </a:rPr>
+              <a:t>Your turn</a:t>
+            </a:r>
+          </a:p>
+        </p:txBody>
+      </p:sp>
     </p:spTree>
+    <p:extLst>
+      <p:ext uri="{BB962C8B-B14F-4D97-AF65-F5344CB8AC3E}">
+        <p14:creationId xmlns:p14="http://schemas.microsoft.com/office/powerpoint/2010/main" val="4195568872"/>
+      </p:ext>
+    </p:extLst>
   </p:cSld>
   <p:clrMapOvr>
     <a:masterClrMapping/>
@@ -11481,7 +9567,7 @@
       </p:grpSpPr>
       <p:sp>
         <p:nvSpPr>
-          <p:cNvPr id="160" name="RECAP of instructions"/>
+          <p:cNvPr id="213" name="Your exam"/>
           <p:cNvSpPr txBox="1">
             <a:spLocks noGrp="1"/>
           </p:cNvSpPr>
@@ -11499,67 +9585,119 @@
           <a:lstStyle/>
           <a:p>
             <a:r>
-              <a:rPr b="1" dirty="0"/>
-              <a:t>RECAP of instructions</a:t>
+              <a:rPr lang="en-GB" b="1" dirty="0"/>
+              <a:t>Denial of Services (D</a:t>
             </a:r>
+            <a:r>
+              <a:rPr lang="en-GB" sz="9600" b="1" dirty="0"/>
+              <a:t>o</a:t>
+            </a:r>
+            <a:r>
+              <a:rPr lang="en-GB" b="1" dirty="0"/>
+              <a:t>S)</a:t>
+            </a:r>
+            <a:endParaRPr b="1" dirty="0"/>
           </a:p>
         </p:txBody>
       </p:sp>
-      <p:pic>
-        <p:nvPicPr>
-          <p:cNvPr id="161" name="Image" descr="Image"/>
-          <p:cNvPicPr>
-            <a:picLocks noChangeAspect="1"/>
-          </p:cNvPicPr>
-          <p:nvPr/>
-        </p:nvPicPr>
-        <p:blipFill>
-          <a:blip r:embed="rId3"/>
-          <a:stretch>
-            <a:fillRect/>
-          </a:stretch>
-        </p:blipFill>
-        <p:spPr>
-          <a:xfrm>
-            <a:off x="1234596" y="3054776"/>
-            <a:ext cx="9743246" cy="9516659"/>
-          </a:xfrm>
-          <a:prstGeom prst="rect">
-            <a:avLst/>
-          </a:prstGeom>
-          <a:ln w="12700">
-            <a:miter lim="400000"/>
-          </a:ln>
-        </p:spPr>
-      </p:pic>
-      <p:pic>
-        <p:nvPicPr>
-          <p:cNvPr id="162" name="Image" descr="Image"/>
-          <p:cNvPicPr>
-            <a:picLocks noChangeAspect="1"/>
-          </p:cNvPicPr>
-          <p:nvPr/>
-        </p:nvPicPr>
-        <p:blipFill>
-          <a:blip r:embed="rId4"/>
-          <a:stretch>
-            <a:fillRect/>
-          </a:stretch>
-        </p:blipFill>
-        <p:spPr>
-          <a:xfrm>
-            <a:off x="11437046" y="2967885"/>
-            <a:ext cx="11468101" cy="5549901"/>
-          </a:xfrm>
-          <a:prstGeom prst="rect">
-            <a:avLst/>
-          </a:prstGeom>
-          <a:ln w="12700">
-            <a:miter lim="400000"/>
-          </a:ln>
-        </p:spPr>
-      </p:pic>
+      <p:sp>
+        <p:nvSpPr>
+          <p:cNvPr id="3" name="Text Placeholder 2">
+            <a:extLst>
+              <a:ext uri="{FF2B5EF4-FFF2-40B4-BE49-F238E27FC236}">
+                <a16:creationId xmlns:a16="http://schemas.microsoft.com/office/drawing/2014/main" id="{2CBA9DE5-9EAE-A36C-8AE7-50D4845B518B}"/>
+              </a:ext>
+            </a:extLst>
+          </p:cNvPr>
+          <p:cNvSpPr>
+            <a:spLocks noGrp="1"/>
+          </p:cNvSpPr>
+          <p:nvPr>
+            <p:ph type="body" idx="1"/>
+          </p:nvPr>
+        </p:nvSpPr>
+        <p:spPr/>
+        <p:txBody>
+          <a:bodyPr/>
+          <a:lstStyle/>
+          <a:p>
+            <a:pPr marL="685800" indent="-685800">
+              <a:buFont typeface="Arial" panose="020B0604020202020204" pitchFamily="34" charset="0"/>
+              <a:buChar char="•"/>
+            </a:pPr>
+            <a:r>
+              <a:rPr lang="en-US" dirty="0">
+                <a:latin typeface="Avenir Medium" panose="02000503020000020003" pitchFamily="2" charset="0"/>
+              </a:rPr>
+              <a:t>Flooding a server </a:t>
+            </a:r>
+            <a:r>
+              <a:rPr lang="en-US" b="0" dirty="0">
+                <a:latin typeface="Avenir Medium" panose="02000503020000020003" pitchFamily="2" charset="0"/>
+              </a:rPr>
+              <a:t>with requests which it can’t respond to quickly enough.</a:t>
+            </a:r>
+          </a:p>
+          <a:p>
+            <a:pPr marL="685800" indent="-685800">
+              <a:buFont typeface="Arial" panose="020B0604020202020204" pitchFamily="34" charset="0"/>
+              <a:buChar char="•"/>
+            </a:pPr>
+            <a:r>
+              <a:rPr lang="en-US" b="0" dirty="0">
+                <a:latin typeface="Avenir Medium" panose="02000503020000020003" pitchFamily="2" charset="0"/>
+              </a:rPr>
+              <a:t>Can prevent a website from being accessible or cause the server to shut down.</a:t>
+            </a:r>
+          </a:p>
+          <a:p>
+            <a:pPr marL="685800" indent="-685800">
+              <a:buFont typeface="Arial" panose="020B0604020202020204" pitchFamily="34" charset="0"/>
+              <a:buChar char="•"/>
+            </a:pPr>
+            <a:r>
+              <a:rPr lang="en-US" b="0" dirty="0">
+                <a:latin typeface="Avenir Medium" panose="02000503020000020003" pitchFamily="2" charset="0"/>
+              </a:rPr>
+              <a:t>Let’s try it:</a:t>
+            </a:r>
+          </a:p>
+          <a:p>
+            <a:pPr lvl="1" indent="0"/>
+            <a:r>
+              <a:rPr lang="en-US" b="0" dirty="0">
+                <a:latin typeface="Avenir Medium" panose="02000503020000020003" pitchFamily="2" charset="0"/>
+              </a:rPr>
+              <a:t>			</a:t>
+            </a:r>
+            <a:r>
+              <a:rPr lang="en-US" b="0" dirty="0">
+                <a:latin typeface="Avenir Medium" panose="02000503020000020003" pitchFamily="2" charset="0"/>
+                <a:hlinkClick r:id="rId3"/>
+              </a:rPr>
+              <a:t>https://stormy-oasis-27277.herokuapp.com/</a:t>
+            </a:r>
+            <a:endParaRPr lang="en-US" b="0" dirty="0">
+              <a:latin typeface="Avenir Medium" panose="02000503020000020003" pitchFamily="2" charset="0"/>
+            </a:endParaRPr>
+          </a:p>
+          <a:p>
+            <a:pPr marL="685800" indent="-685800">
+              <a:buFont typeface="Arial" panose="020B0604020202020204" pitchFamily="34" charset="0"/>
+              <a:buChar char="•"/>
+            </a:pPr>
+            <a:endParaRPr lang="en-US" b="0" dirty="0">
+              <a:latin typeface="Avenir Medium" panose="02000503020000020003" pitchFamily="2" charset="0"/>
+            </a:endParaRPr>
+          </a:p>
+        </p:txBody>
+      </p:sp>
     </p:spTree>
+    <p:extLst>
+      <p:ext uri="{BB962C8B-B14F-4D97-AF65-F5344CB8AC3E}">
+        <p14:creationId xmlns:p14="http://schemas.microsoft.com/office/powerpoint/2010/main" val="4083101755"/>
+      </p:ext>
+    </p:extLst>
   </p:cSld>
   <p:clrMapOvr>
     <a:masterClrMapping/>
@@ -11587,49 +9725,7 @@
       </p:grpSpPr>
       <p:sp>
         <p:nvSpPr>
-          <p:cNvPr id="166" name="Rounded Rectangle"/>
-          <p:cNvSpPr/>
-          <p:nvPr/>
-        </p:nvSpPr>
-        <p:spPr>
-          <a:xfrm>
-            <a:off x="1495804" y="3384668"/>
-            <a:ext cx="10833724" cy="8898465"/>
-          </a:xfrm>
-          <a:prstGeom prst="roundRect">
-            <a:avLst>
-              <a:gd name="adj" fmla="val 11402"/>
-            </a:avLst>
-          </a:prstGeom>
-          <a:solidFill>
-            <a:schemeClr val="accent4"/>
-          </a:solidFill>
-          <a:ln w="12700">
-            <a:miter lim="400000"/>
-          </a:ln>
-        </p:spPr>
-        <p:txBody>
-          <a:bodyPr lIns="50800" tIns="50800" rIns="50800" bIns="50800" anchor="ctr"/>
-          <a:lstStyle/>
-          <a:p>
-            <a:pPr>
-              <a:lnSpc>
-                <a:spcPct val="120000"/>
-              </a:lnSpc>
-              <a:defRPr sz="3000" cap="all">
-                <a:latin typeface="Proxima Nova Extrabold"/>
-                <a:ea typeface="Proxima Nova Extrabold"/>
-                <a:cs typeface="Proxima Nova Extrabold"/>
-                <a:sym typeface="Proxima Nova Extrabold"/>
-              </a:defRPr>
-            </a:pPr>
-            <a:endParaRPr/>
-          </a:p>
-        </p:txBody>
-      </p:sp>
-      <p:sp>
-        <p:nvSpPr>
-          <p:cNvPr id="168" name="If  statements"/>
+          <p:cNvPr id="213" name="Your exam"/>
           <p:cNvSpPr txBox="1">
             <a:spLocks noGrp="1"/>
           </p:cNvSpPr>
@@ -11648,517 +9744,104 @@
           <a:p>
             <a:r>
               <a:rPr lang="en-GB" b="1" dirty="0"/>
-              <a:t>If  statements</a:t>
+              <a:t>Distributed D</a:t>
             </a:r>
+            <a:r>
+              <a:rPr lang="en-GB" sz="9600" b="1" dirty="0"/>
+              <a:t>o</a:t>
+            </a:r>
+            <a:r>
+              <a:rPr lang="en-GB" b="1" dirty="0"/>
+              <a:t>S (DD</a:t>
+            </a:r>
+            <a:r>
+              <a:rPr lang="en-GB" sz="9600" b="1" dirty="0"/>
+              <a:t>o</a:t>
+            </a:r>
+            <a:r>
+              <a:rPr lang="en-GB" b="1" dirty="0"/>
+              <a:t>S)</a:t>
+            </a:r>
+            <a:endParaRPr b="1" dirty="0"/>
           </a:p>
         </p:txBody>
       </p:sp>
       <p:sp>
         <p:nvSpPr>
-          <p:cNvPr id="172" name="if ...:…"/>
-          <p:cNvSpPr txBox="1"/>
-          <p:nvPr/>
-        </p:nvSpPr>
-        <p:spPr>
-          <a:xfrm>
-            <a:off x="3711456" y="4324827"/>
-            <a:ext cx="5219378" cy="2641749"/>
-          </a:xfrm>
-          <a:prstGeom prst="rect">
-            <a:avLst/>
-          </a:prstGeom>
-          <a:ln w="12700">
-            <a:miter lim="400000"/>
-          </a:ln>
-          <a:extLst>
-            <a:ext uri="{C572A759-6A51-4108-AA02-DFA0A04FC94B}">
-              <ma14:wrappingTextBoxFlag xmlns="" xmlns:m="http://schemas.openxmlformats.org/officeDocument/2006/math" xmlns:a14="http://schemas.microsoft.com/office/drawing/2010/main" xmlns:ma14="http://schemas.microsoft.com/office/mac/drawingml/2011/main" val="1"/>
-            </a:ext>
-          </a:extLst>
-        </p:spPr>
-        <p:txBody>
-          <a:bodyPr wrap="none" lIns="50800" tIns="50800" rIns="50800" bIns="50800" anchor="ctr">
-            <a:spAutoFit/>
-          </a:bodyPr>
-          <a:lstStyle/>
-          <a:p>
-            <a:pPr algn="l">
-              <a:defRPr sz="5500" b="1">
-                <a:latin typeface="Courier New"/>
-                <a:ea typeface="Courier New"/>
-                <a:cs typeface="Courier New"/>
-                <a:sym typeface="Courier New"/>
-              </a:defRPr>
-            </a:pPr>
-            <a:r>
-              <a:rPr dirty="0"/>
-              <a:t>if ...:</a:t>
-            </a:r>
-          </a:p>
-          <a:p>
-            <a:pPr lvl="1" algn="l">
-              <a:defRPr sz="5500" b="1">
-                <a:latin typeface="Courier New"/>
-                <a:ea typeface="Courier New"/>
-                <a:cs typeface="Courier New"/>
-                <a:sym typeface="Courier New"/>
-              </a:defRPr>
-            </a:pPr>
-            <a:r>
-              <a:rPr dirty="0">
-                <a:solidFill>
-                  <a:schemeClr val="bg2">
-                    <a:lumMod val="50000"/>
-                  </a:schemeClr>
-                </a:solidFill>
-              </a:rPr>
-              <a:t>#INNER CODE</a:t>
-            </a:r>
-          </a:p>
-          <a:p>
-            <a:pPr algn="l">
-              <a:defRPr sz="5500" b="1">
-                <a:latin typeface="Courier New"/>
-                <a:ea typeface="Courier New"/>
-                <a:cs typeface="Courier New"/>
-                <a:sym typeface="Courier New"/>
-              </a:defRPr>
-            </a:pPr>
-            <a:r>
-              <a:rPr dirty="0">
-                <a:solidFill>
-                  <a:schemeClr val="bg2">
-                    <a:lumMod val="50000"/>
-                  </a:schemeClr>
-                </a:solidFill>
-              </a:rPr>
-              <a:t># After Code</a:t>
-            </a:r>
-          </a:p>
-        </p:txBody>
-      </p:sp>
-      <p:grpSp>
-        <p:nvGrpSpPr>
-          <p:cNvPr id="3" name="Group 2">
+          <p:cNvPr id="3" name="Text Placeholder 2">
             <a:extLst>
               <a:ext uri="{FF2B5EF4-FFF2-40B4-BE49-F238E27FC236}">
-                <a16:creationId xmlns:a16="http://schemas.microsoft.com/office/drawing/2014/main" id="{8CAC60AD-7495-29AD-4C10-8873A2B30357}"/>
+                <a16:creationId xmlns:a16="http://schemas.microsoft.com/office/drawing/2014/main" id="{2CBA9DE5-9EAE-A36C-8AE7-50D4845B518B}"/>
               </a:ext>
             </a:extLst>
           </p:cNvPr>
-          <p:cNvGrpSpPr/>
-          <p:nvPr/>
-        </p:nvGrpSpPr>
-        <p:grpSpPr>
-          <a:xfrm>
-            <a:off x="13403780" y="3324269"/>
-            <a:ext cx="9761020" cy="8898465"/>
-            <a:chOff x="13093177" y="3384668"/>
-            <a:chExt cx="9761020" cy="8898465"/>
-          </a:xfrm>
-        </p:grpSpPr>
-        <p:sp>
-          <p:nvSpPr>
-            <p:cNvPr id="167" name="Rounded Rectangle"/>
-            <p:cNvSpPr/>
-            <p:nvPr/>
-          </p:nvSpPr>
-          <p:spPr>
-            <a:xfrm>
-              <a:off x="13093177" y="3384668"/>
-              <a:ext cx="9761020" cy="8898465"/>
-            </a:xfrm>
-            <a:prstGeom prst="roundRect">
-              <a:avLst>
-                <a:gd name="adj" fmla="val 11402"/>
-              </a:avLst>
-            </a:prstGeom>
-            <a:solidFill>
-              <a:schemeClr val="accent4"/>
-            </a:solidFill>
-            <a:ln w="12700">
-              <a:miter lim="400000"/>
-            </a:ln>
-          </p:spPr>
-          <p:txBody>
-            <a:bodyPr lIns="50800" tIns="50800" rIns="50800" bIns="50800" anchor="ctr"/>
-            <a:lstStyle/>
-            <a:p>
-              <a:pPr>
-                <a:lnSpc>
-                  <a:spcPct val="120000"/>
-                </a:lnSpc>
-                <a:defRPr sz="3000" cap="all">
-                  <a:latin typeface="Proxima Nova Extrabold"/>
-                  <a:ea typeface="Proxima Nova Extrabold"/>
-                  <a:cs typeface="Proxima Nova Extrabold"/>
-                  <a:sym typeface="Proxima Nova Extrabold"/>
-                </a:defRPr>
-              </a:pPr>
-              <a:endParaRPr/>
-            </a:p>
-          </p:txBody>
-        </p:sp>
-        <p:sp>
-          <p:nvSpPr>
-            <p:cNvPr id="170" name="If else"/>
-            <p:cNvSpPr txBox="1"/>
-            <p:nvPr/>
-          </p:nvSpPr>
-          <p:spPr>
-            <a:xfrm>
-              <a:off x="15822157" y="3849109"/>
-              <a:ext cx="4303059" cy="1566326"/>
-            </a:xfrm>
-            <a:prstGeom prst="rect">
-              <a:avLst/>
-            </a:prstGeom>
-            <a:solidFill>
-              <a:schemeClr val="accent4"/>
-            </a:solidFill>
-            <a:ln w="12700">
-              <a:miter lim="400000"/>
-            </a:ln>
-            <a:extLst>
-              <a:ext uri="{C572A759-6A51-4108-AA02-DFA0A04FC94B}">
-                <ma14:wrappingTextBoxFlag xmlns="" xmlns:m="http://schemas.openxmlformats.org/officeDocument/2006/math" xmlns:a14="http://schemas.microsoft.com/office/drawing/2010/main" xmlns:ma14="http://schemas.microsoft.com/office/mac/drawingml/2011/main" val="1"/>
-              </a:ext>
-            </a:extLst>
-          </p:spPr>
-          <p:txBody>
-            <a:bodyPr wrap="square" lIns="50800" tIns="50800" rIns="50800" bIns="50800" anchor="ctr">
-              <a:spAutoFit/>
-            </a:bodyPr>
-            <a:lstStyle>
-              <a:lvl1pPr algn="l">
-                <a:lnSpc>
-                  <a:spcPct val="80000"/>
-                </a:lnSpc>
-                <a:defRPr sz="11600" cap="all" spc="-116">
-                  <a:solidFill>
-                    <a:srgbClr val="00BFF3"/>
-                  </a:solidFill>
-                  <a:latin typeface="+mn-lt"/>
-                  <a:ea typeface="+mn-ea"/>
-                  <a:cs typeface="+mn-cs"/>
-                  <a:sym typeface="Druk Medium"/>
-                </a:defRPr>
-              </a:lvl1pPr>
-            </a:lstStyle>
-            <a:p>
-              <a:r>
-                <a:rPr dirty="0"/>
-                <a:t>If else</a:t>
-              </a:r>
-            </a:p>
-          </p:txBody>
-        </p:sp>
-        <p:sp>
-          <p:nvSpPr>
-            <p:cNvPr id="173" name="if &lt;Condition&gt;:…"/>
-            <p:cNvSpPr txBox="1"/>
-            <p:nvPr/>
-          </p:nvSpPr>
-          <p:spPr>
-            <a:xfrm>
-              <a:off x="15127775" y="6113022"/>
-              <a:ext cx="6450484" cy="4334520"/>
-            </a:xfrm>
-            <a:prstGeom prst="rect">
-              <a:avLst/>
-            </a:prstGeom>
-            <a:ln w="12700">
-              <a:miter lim="400000"/>
-            </a:ln>
-            <a:extLst>
-              <a:ext uri="{C572A759-6A51-4108-AA02-DFA0A04FC94B}">
-                <ma14:wrappingTextBoxFlag xmlns="" xmlns:m="http://schemas.openxmlformats.org/officeDocument/2006/math" xmlns:a14="http://schemas.microsoft.com/office/drawing/2010/main" xmlns:ma14="http://schemas.microsoft.com/office/mac/drawingml/2011/main" val="1"/>
-              </a:ext>
-            </a:extLst>
-          </p:spPr>
-          <p:txBody>
-            <a:bodyPr wrap="none" lIns="50800" tIns="50800" rIns="50800" bIns="50800" anchor="ctr">
-              <a:spAutoFit/>
-            </a:bodyPr>
-            <a:lstStyle/>
-            <a:p>
-              <a:pPr algn="l">
-                <a:defRPr sz="5500" b="1">
-                  <a:latin typeface="Courier New"/>
-                  <a:ea typeface="Courier New"/>
-                  <a:cs typeface="Courier New"/>
-                  <a:sym typeface="Courier New"/>
-                </a:defRPr>
-              </a:pPr>
-              <a:r>
-                <a:rPr dirty="0"/>
-                <a:t>if &lt;Condition&gt;:</a:t>
-              </a:r>
-            </a:p>
-            <a:p>
-              <a:pPr lvl="1" algn="l">
-                <a:defRPr sz="5500" b="1">
-                  <a:latin typeface="Courier New"/>
-                  <a:ea typeface="Courier New"/>
-                  <a:cs typeface="Courier New"/>
-                  <a:sym typeface="Courier New"/>
-                </a:defRPr>
-              </a:pPr>
-              <a:r>
-                <a:rPr dirty="0">
-                  <a:solidFill>
-                    <a:schemeClr val="bg2">
-                      <a:lumMod val="50000"/>
-                    </a:schemeClr>
-                  </a:solidFill>
-                </a:rPr>
-                <a:t># TRUE Code</a:t>
-              </a:r>
-            </a:p>
-            <a:p>
-              <a:pPr algn="l">
-                <a:defRPr sz="5500" b="1">
-                  <a:latin typeface="Courier New"/>
-                  <a:ea typeface="Courier New"/>
-                  <a:cs typeface="Courier New"/>
-                  <a:sym typeface="Courier New"/>
-                </a:defRPr>
-              </a:pPr>
-              <a:r>
-                <a:rPr dirty="0"/>
-                <a:t>else:</a:t>
-              </a:r>
-            </a:p>
-            <a:p>
-              <a:pPr lvl="1" algn="l">
-                <a:defRPr sz="5500" b="1">
-                  <a:latin typeface="Courier New"/>
-                  <a:ea typeface="Courier New"/>
-                  <a:cs typeface="Courier New"/>
-                  <a:sym typeface="Courier New"/>
-                </a:defRPr>
-              </a:pPr>
-              <a:r>
-                <a:rPr dirty="0">
-                  <a:solidFill>
-                    <a:schemeClr val="bg2">
-                      <a:lumMod val="50000"/>
-                    </a:schemeClr>
-                  </a:solidFill>
-                </a:rPr>
-                <a:t># FALSE Code</a:t>
-              </a:r>
-            </a:p>
-            <a:p>
-              <a:pPr algn="l">
-                <a:defRPr sz="5500" b="1">
-                  <a:latin typeface="Courier New"/>
-                  <a:ea typeface="Courier New"/>
-                  <a:cs typeface="Courier New"/>
-                  <a:sym typeface="Courier New"/>
-                </a:defRPr>
-              </a:pPr>
-              <a:r>
-                <a:rPr dirty="0"/>
-                <a:t># After Code</a:t>
-              </a:r>
-            </a:p>
-          </p:txBody>
-        </p:sp>
-      </p:grpSp>
-      <p:grpSp>
-        <p:nvGrpSpPr>
-          <p:cNvPr id="4" name="Group 3">
-            <a:extLst>
-              <a:ext uri="{FF2B5EF4-FFF2-40B4-BE49-F238E27FC236}">
-                <a16:creationId xmlns:a16="http://schemas.microsoft.com/office/drawing/2014/main" id="{92A1DF72-51BD-2D12-4671-8E4A3A36BF8B}"/>
-              </a:ext>
-            </a:extLst>
-          </p:cNvPr>
-          <p:cNvGrpSpPr/>
-          <p:nvPr/>
-        </p:nvGrpSpPr>
-        <p:grpSpPr>
-          <a:xfrm>
-            <a:off x="2137301" y="7661013"/>
-            <a:ext cx="9221552" cy="3565079"/>
-            <a:chOff x="1814576" y="7661013"/>
-            <a:chExt cx="9221552" cy="3565079"/>
-          </a:xfrm>
-        </p:grpSpPr>
-        <p:sp>
-          <p:nvSpPr>
-            <p:cNvPr id="171" name="CMP ...…"/>
-            <p:cNvSpPr txBox="1"/>
-            <p:nvPr/>
-          </p:nvSpPr>
-          <p:spPr>
-            <a:xfrm>
-              <a:off x="2854401" y="7661013"/>
-              <a:ext cx="8181727" cy="3565079"/>
-            </a:xfrm>
-            <a:prstGeom prst="rect">
-              <a:avLst/>
-            </a:prstGeom>
-            <a:ln w="12700">
-              <a:miter lim="400000"/>
-            </a:ln>
-            <a:extLst>
-              <a:ext uri="{C572A759-6A51-4108-AA02-DFA0A04FC94B}">
-                <ma14:wrappingTextBoxFlag xmlns="" xmlns:m="http://schemas.openxmlformats.org/officeDocument/2006/math" xmlns:a14="http://schemas.microsoft.com/office/drawing/2010/main" xmlns:ma14="http://schemas.microsoft.com/office/mac/drawingml/2011/main" val="1"/>
-              </a:ext>
-            </a:extLst>
-          </p:spPr>
-          <p:txBody>
-            <a:bodyPr wrap="none" lIns="50800" tIns="50800" rIns="50800" bIns="50800" anchor="ctr">
-              <a:spAutoFit/>
-            </a:bodyPr>
-            <a:lstStyle/>
-            <a:p>
-              <a:pPr lvl="1" algn="l">
-                <a:defRPr sz="4500" b="1">
-                  <a:latin typeface="Courier New"/>
-                  <a:ea typeface="Courier New"/>
-                  <a:cs typeface="Courier New"/>
-                  <a:sym typeface="Courier New"/>
-                </a:defRPr>
-              </a:pPr>
-              <a:r>
-                <a:rPr dirty="0"/>
-                <a:t>CMP ...</a:t>
-              </a:r>
-            </a:p>
-            <a:p>
-              <a:pPr lvl="1" algn="l">
-                <a:defRPr sz="4500" b="1">
-                  <a:latin typeface="Courier New"/>
-                  <a:ea typeface="Courier New"/>
-                  <a:cs typeface="Courier New"/>
-                  <a:sym typeface="Courier New"/>
-                </a:defRPr>
-              </a:pPr>
-              <a:r>
-                <a:rPr dirty="0"/>
-                <a:t>B&lt;NOT Condition&gt; label</a:t>
-              </a:r>
-            </a:p>
-            <a:p>
-              <a:pPr lvl="1" algn="l">
-                <a:defRPr sz="4500" b="1">
-                  <a:latin typeface="Courier New"/>
-                  <a:ea typeface="Courier New"/>
-                  <a:cs typeface="Courier New"/>
-                  <a:sym typeface="Courier New"/>
-                </a:defRPr>
-              </a:pPr>
-              <a:r>
-                <a:rPr dirty="0">
-                  <a:solidFill>
-                    <a:schemeClr val="bg2">
-                      <a:lumMod val="50000"/>
-                    </a:schemeClr>
-                  </a:solidFill>
-                </a:rPr>
-                <a:t># Inner Code</a:t>
-              </a:r>
-            </a:p>
-            <a:p>
-              <a:pPr algn="l">
-                <a:defRPr sz="4500" b="1">
-                  <a:latin typeface="Courier New"/>
-                  <a:ea typeface="Courier New"/>
-                  <a:cs typeface="Courier New"/>
-                  <a:sym typeface="Courier New"/>
-                </a:defRPr>
-              </a:pPr>
-              <a:r>
-                <a:rPr dirty="0"/>
-                <a:t>label:</a:t>
-              </a:r>
-            </a:p>
-            <a:p>
-              <a:pPr lvl="1" algn="l">
-                <a:defRPr sz="4500" b="1">
-                  <a:latin typeface="Courier New"/>
-                  <a:ea typeface="Courier New"/>
-                  <a:cs typeface="Courier New"/>
-                  <a:sym typeface="Courier New"/>
-                </a:defRPr>
-              </a:pPr>
-              <a:r>
-                <a:rPr dirty="0">
-                  <a:solidFill>
-                    <a:schemeClr val="bg2">
-                      <a:lumMod val="50000"/>
-                    </a:schemeClr>
-                  </a:solidFill>
-                </a:rPr>
-                <a:t># After</a:t>
-              </a:r>
-            </a:p>
-          </p:txBody>
-        </p:sp>
-        <p:sp>
-          <p:nvSpPr>
-            <p:cNvPr id="175" name="Connection Line"/>
-            <p:cNvSpPr/>
-            <p:nvPr/>
-          </p:nvSpPr>
-          <p:spPr>
-            <a:xfrm>
-              <a:off x="1814576" y="8879296"/>
-              <a:ext cx="1452063" cy="1179314"/>
-            </a:xfrm>
-            <a:custGeom>
-              <a:avLst/>
-              <a:gdLst/>
-              <a:ahLst/>
-              <a:cxnLst>
-                <a:cxn ang="0">
-                  <a:pos x="wd2" y="hd2"/>
-                </a:cxn>
-                <a:cxn ang="5400000">
-                  <a:pos x="wd2" y="hd2"/>
-                </a:cxn>
-                <a:cxn ang="10800000">
-                  <a:pos x="wd2" y="hd2"/>
-                </a:cxn>
-                <a:cxn ang="16200000">
-                  <a:pos x="wd2" y="hd2"/>
-                </a:cxn>
-              </a:cxnLst>
-              <a:rect l="0" t="0" r="r" b="b"/>
-              <a:pathLst>
-                <a:path w="16353" h="19238" extrusionOk="0">
-                  <a:moveTo>
-                    <a:pt x="16353" y="809"/>
-                  </a:moveTo>
-                  <a:cubicBezTo>
-                    <a:pt x="-3340" y="-2362"/>
-                    <a:pt x="-5247" y="3781"/>
-                    <a:pt x="10632" y="19238"/>
-                  </a:cubicBezTo>
-                </a:path>
-              </a:pathLst>
-            </a:custGeom>
-            <a:ln w="101600">
-              <a:solidFill>
-                <a:schemeClr val="accent5"/>
-              </a:solidFill>
-              <a:miter lim="400000"/>
-              <a:tailEnd type="triangle"/>
-            </a:ln>
-          </p:spPr>
-          <p:txBody>
-            <a:bodyPr/>
-            <a:lstStyle/>
-            <a:p>
-              <a:endParaRPr/>
-            </a:p>
-          </p:txBody>
-        </p:sp>
-      </p:grpSp>
+          <p:cNvSpPr>
+            <a:spLocks noGrp="1"/>
+          </p:cNvSpPr>
+          <p:nvPr>
+            <p:ph type="body" idx="1"/>
+          </p:nvPr>
+        </p:nvSpPr>
+        <p:spPr/>
+        <p:txBody>
+          <a:bodyPr/>
+          <a:lstStyle/>
+          <a:p>
+            <a:pPr marL="685800" indent="-685800">
+              <a:buFont typeface="Arial" panose="020B0604020202020204" pitchFamily="34" charset="0"/>
+              <a:buChar char="•"/>
+            </a:pPr>
+            <a:r>
+              <a:rPr lang="en-US" b="0" dirty="0">
+                <a:latin typeface="Avenir Medium" panose="02000503020000020003" pitchFamily="2" charset="0"/>
+              </a:rPr>
+              <a:t>Uses a large number of computers to carry out the attack.</a:t>
+            </a:r>
+          </a:p>
+          <a:p>
+            <a:pPr marL="685800" indent="-685800">
+              <a:buFont typeface="Arial" panose="020B0604020202020204" pitchFamily="34" charset="0"/>
+              <a:buChar char="•"/>
+            </a:pPr>
+            <a:r>
+              <a:rPr lang="en-US" b="0" dirty="0">
+                <a:latin typeface="Avenir Medium" panose="02000503020000020003" pitchFamily="2" charset="0"/>
+              </a:rPr>
+              <a:t>This is more effective as it can generate more traffic and its harder for a server to block.</a:t>
+            </a:r>
+          </a:p>
+          <a:p>
+            <a:pPr marL="685800" indent="-685800">
+              <a:buFont typeface="Arial" panose="020B0604020202020204" pitchFamily="34" charset="0"/>
+              <a:buChar char="•"/>
+            </a:pPr>
+            <a:r>
+              <a:rPr lang="en-US" b="0" dirty="0">
+                <a:latin typeface="Avenir Medium" panose="02000503020000020003" pitchFamily="2" charset="0"/>
+              </a:rPr>
+              <a:t>Often uses Botnets</a:t>
+            </a:r>
+          </a:p>
+          <a:p>
+            <a:pPr marL="685800" lvl="4">
+              <a:buFont typeface="Arial" panose="020B0604020202020204" pitchFamily="34" charset="0"/>
+              <a:buChar char="•"/>
+            </a:pPr>
+            <a:r>
+              <a:rPr lang="en-US" b="0" dirty="0">
+                <a:latin typeface="Avenir Medium" panose="02000503020000020003" pitchFamily="2" charset="0"/>
+              </a:rPr>
+              <a:t>Uses “Zombie Computers” that have been infected giving 					hackers control over a computer.</a:t>
+            </a:r>
+          </a:p>
+        </p:txBody>
+      </p:sp>
     </p:spTree>
+    <p:extLst>
+      <p:ext uri="{BB962C8B-B14F-4D97-AF65-F5344CB8AC3E}">
+        <p14:creationId xmlns:p14="http://schemas.microsoft.com/office/powerpoint/2010/main" val="4024734688"/>
+      </p:ext>
+    </p:extLst>
   </p:cSld>
   <p:clrMapOvr>
     <a:masterClrMapping/>
@@ -12186,207 +9869,7 @@
       </p:grpSpPr>
       <p:sp>
         <p:nvSpPr>
-          <p:cNvPr id="179" name="Rounded Rectangle"/>
-          <p:cNvSpPr/>
-          <p:nvPr/>
-        </p:nvSpPr>
-        <p:spPr>
-          <a:xfrm>
-            <a:off x="1495804" y="3384668"/>
-            <a:ext cx="10833724" cy="8898465"/>
-          </a:xfrm>
-          <a:prstGeom prst="roundRect">
-            <a:avLst>
-              <a:gd name="adj" fmla="val 11402"/>
-            </a:avLst>
-          </a:prstGeom>
-          <a:solidFill>
-            <a:schemeClr val="accent4"/>
-          </a:solidFill>
-          <a:ln w="12700">
-            <a:miter lim="400000"/>
-          </a:ln>
-        </p:spPr>
-        <p:txBody>
-          <a:bodyPr lIns="50800" tIns="50800" rIns="50800" bIns="50800" anchor="ctr"/>
-          <a:lstStyle/>
-          <a:p>
-            <a:pPr>
-              <a:lnSpc>
-                <a:spcPct val="120000"/>
-              </a:lnSpc>
-              <a:defRPr sz="3000" cap="all">
-                <a:latin typeface="Proxima Nova Extrabold"/>
-                <a:ea typeface="Proxima Nova Extrabold"/>
-                <a:cs typeface="Proxima Nova Extrabold"/>
-                <a:sym typeface="Proxima Nova Extrabold"/>
-              </a:defRPr>
-            </a:pPr>
-            <a:endParaRPr/>
-          </a:p>
-        </p:txBody>
-      </p:sp>
-      <p:sp>
-        <p:nvSpPr>
-          <p:cNvPr id="181" name="x = 0…"/>
-          <p:cNvSpPr txBox="1"/>
-          <p:nvPr/>
-        </p:nvSpPr>
-        <p:spPr>
-          <a:xfrm>
-            <a:off x="4490733" y="3853305"/>
-            <a:ext cx="4305983" cy="4902201"/>
-          </a:xfrm>
-          <a:prstGeom prst="rect">
-            <a:avLst/>
-          </a:prstGeom>
-          <a:ln w="12700">
-            <a:miter lim="400000"/>
-          </a:ln>
-          <a:extLst>
-            <a:ext uri="{C572A759-6A51-4108-AA02-DFA0A04FC94B}">
-              <ma14:wrappingTextBoxFlag xmlns="" xmlns:m="http://schemas.openxmlformats.org/officeDocument/2006/math" xmlns:a14="http://schemas.microsoft.com/office/drawing/2010/main" xmlns:ma14="http://schemas.microsoft.com/office/mac/drawingml/2011/main" val="1"/>
-            </a:ext>
-          </a:extLst>
-        </p:spPr>
-        <p:txBody>
-          <a:bodyPr wrap="none" lIns="50800" tIns="50800" rIns="50800" bIns="50800" anchor="ctr">
-            <a:spAutoFit/>
-          </a:bodyPr>
-          <a:lstStyle/>
-          <a:p>
-            <a:pPr algn="l">
-              <a:defRPr sz="5500" b="1">
-                <a:latin typeface="Courier New"/>
-                <a:ea typeface="Courier New"/>
-                <a:cs typeface="Courier New"/>
-                <a:sym typeface="Courier New"/>
-              </a:defRPr>
-            </a:pPr>
-            <a:r>
-              <a:rPr dirty="0"/>
-              <a:t>x = 0</a:t>
-            </a:r>
-          </a:p>
-          <a:p>
-            <a:pPr algn="l">
-              <a:defRPr sz="5500" b="1">
-                <a:latin typeface="Courier New"/>
-                <a:ea typeface="Courier New"/>
-                <a:cs typeface="Courier New"/>
-                <a:sym typeface="Courier New"/>
-              </a:defRPr>
-            </a:pPr>
-            <a:r>
-              <a:rPr dirty="0"/>
-              <a:t>if y == 7:</a:t>
-            </a:r>
-          </a:p>
-          <a:p>
-            <a:pPr lvl="1" algn="l">
-              <a:defRPr sz="5500" b="1">
-                <a:latin typeface="Courier New"/>
-                <a:ea typeface="Courier New"/>
-                <a:cs typeface="Courier New"/>
-                <a:sym typeface="Courier New"/>
-              </a:defRPr>
-            </a:pPr>
-            <a:r>
-              <a:rPr dirty="0"/>
-              <a:t>x = 100</a:t>
-            </a:r>
-          </a:p>
-          <a:p>
-            <a:pPr algn="l">
-              <a:defRPr sz="5500" b="1">
-                <a:latin typeface="Courier New"/>
-                <a:ea typeface="Courier New"/>
-                <a:cs typeface="Courier New"/>
-                <a:sym typeface="Courier New"/>
-              </a:defRPr>
-            </a:pPr>
-            <a:r>
-              <a:rPr dirty="0"/>
-              <a:t>else:</a:t>
-            </a:r>
-          </a:p>
-          <a:p>
-            <a:pPr lvl="1" algn="l">
-              <a:defRPr sz="5500" b="1">
-                <a:latin typeface="Courier New"/>
-                <a:ea typeface="Courier New"/>
-                <a:cs typeface="Courier New"/>
-                <a:sym typeface="Courier New"/>
-              </a:defRPr>
-            </a:pPr>
-            <a:r>
-              <a:rPr dirty="0"/>
-              <a:t>x = 10</a:t>
-            </a:r>
-          </a:p>
-        </p:txBody>
-      </p:sp>
-      <p:sp>
-        <p:nvSpPr>
-          <p:cNvPr id="182" name="Use R0 for x…"/>
-          <p:cNvSpPr txBox="1"/>
-          <p:nvPr/>
-        </p:nvSpPr>
-        <p:spPr>
-          <a:xfrm>
-            <a:off x="3968395" y="9268369"/>
-            <a:ext cx="5350657" cy="2501901"/>
-          </a:xfrm>
-          <a:prstGeom prst="rect">
-            <a:avLst/>
-          </a:prstGeom>
-          <a:ln w="12700">
-            <a:miter lim="400000"/>
-          </a:ln>
-          <a:extLst>
-            <a:ext uri="{C572A759-6A51-4108-AA02-DFA0A04FC94B}">
-              <ma14:wrappingTextBoxFlag xmlns="" xmlns:m="http://schemas.openxmlformats.org/officeDocument/2006/math" xmlns:a14="http://schemas.microsoft.com/office/drawing/2010/main" xmlns:ma14="http://schemas.microsoft.com/office/mac/drawingml/2011/main" val="1"/>
-            </a:ext>
-          </a:extLst>
-        </p:spPr>
-        <p:txBody>
-          <a:bodyPr lIns="50800" tIns="50800" rIns="50800" bIns="50800" anchor="ctr">
-            <a:spAutoFit/>
-          </a:bodyPr>
-          <a:lstStyle/>
-          <a:p>
-            <a:pPr algn="l">
-              <a:defRPr sz="5500" b="1">
-                <a:latin typeface="Courier New"/>
-                <a:ea typeface="Courier New"/>
-                <a:cs typeface="Courier New"/>
-                <a:sym typeface="Courier New"/>
-              </a:defRPr>
-            </a:pPr>
-            <a:r>
-              <a:rPr dirty="0"/>
-              <a:t>Use R0 for x</a:t>
-            </a:r>
-          </a:p>
-          <a:p>
-            <a:pPr algn="l">
-              <a:defRPr sz="5500" b="1">
-                <a:latin typeface="Courier New"/>
-                <a:ea typeface="Courier New"/>
-                <a:cs typeface="Courier New"/>
-                <a:sym typeface="Courier New"/>
-              </a:defRPr>
-            </a:pPr>
-            <a:r>
-              <a:rPr dirty="0"/>
-              <a:t>Use R1 for y</a:t>
-            </a:r>
-          </a:p>
-        </p:txBody>
-      </p:sp>
-      <p:sp>
-        <p:nvSpPr>
-          <p:cNvPr id="183" name="Your Turn"/>
+          <p:cNvPr id="213" name="Your exam"/>
           <p:cNvSpPr txBox="1">
             <a:spLocks noGrp="1"/>
           </p:cNvSpPr>
@@ -12404,13 +9887,69 @@
           <a:lstStyle/>
           <a:p>
             <a:r>
-              <a:rPr b="1" dirty="0"/>
-              <a:t>Your Turn</a:t>
+              <a:rPr lang="en-GB" b="1" dirty="0"/>
+              <a:t>Brute force attack</a:t>
+            </a:r>
+            <a:endParaRPr b="1" dirty="0"/>
+          </a:p>
+        </p:txBody>
+      </p:sp>
+      <p:sp>
+        <p:nvSpPr>
+          <p:cNvPr id="3" name="Text Placeholder 2">
+            <a:extLst>
+              <a:ext uri="{FF2B5EF4-FFF2-40B4-BE49-F238E27FC236}">
+                <a16:creationId xmlns:a16="http://schemas.microsoft.com/office/drawing/2014/main" id="{2CBA9DE5-9EAE-A36C-8AE7-50D4845B518B}"/>
+              </a:ext>
+            </a:extLst>
+          </p:cNvPr>
+          <p:cNvSpPr>
+            <a:spLocks noGrp="1"/>
+          </p:cNvSpPr>
+          <p:nvPr>
+            <p:ph type="body" idx="1"/>
+          </p:nvPr>
+        </p:nvSpPr>
+        <p:spPr/>
+        <p:txBody>
+          <a:bodyPr/>
+          <a:lstStyle/>
+          <a:p>
+            <a:pPr marL="685800" indent="-685800">
+              <a:buFont typeface="Arial" panose="020B0604020202020204" pitchFamily="34" charset="0"/>
+              <a:buChar char="•"/>
+            </a:pPr>
+            <a:r>
+              <a:rPr lang="en-US" b="0" dirty="0">
+                <a:latin typeface="Avenir Medium" panose="02000503020000020003" pitchFamily="2" charset="0"/>
+                <a:hlinkClick r:id="rId3"/>
+              </a:rPr>
+              <a:t>https://stormy-oasis-27277.herokuapp.com/</a:t>
+            </a:r>
+            <a:endParaRPr lang="en-US" b="0" dirty="0">
+              <a:latin typeface="Avenir Medium" panose="02000503020000020003" pitchFamily="2" charset="0"/>
+            </a:endParaRPr>
+          </a:p>
+          <a:p>
+            <a:pPr marL="685800" indent="-685800">
+              <a:buFont typeface="Arial" panose="020B0604020202020204" pitchFamily="34" charset="0"/>
+              <a:buChar char="•"/>
+            </a:pPr>
+            <a:r>
+              <a:rPr lang="en-US" b="0" dirty="0">
+                <a:latin typeface="Avenir Medium" panose="02000503020000020003" pitchFamily="2" charset="0"/>
+              </a:rPr>
+              <a:t>Head over to the website and see if you can crack the passwords:</a:t>
             </a:r>
           </a:p>
         </p:txBody>
       </p:sp>
     </p:spTree>
+    <p:extLst>
+      <p:ext uri="{BB962C8B-B14F-4D97-AF65-F5344CB8AC3E}">
+        <p14:creationId xmlns:p14="http://schemas.microsoft.com/office/powerpoint/2010/main" val="3353889252"/>
+      </p:ext>
+    </p:extLst>
   </p:cSld>
   <p:clrMapOvr>
     <a:masterClrMapping/>

</xml_diff>